<commit_message>
added describiton of first 3 threads
</commit_message>
<xml_diff>
--- a/ProjectDescribtions/MicroinformaticProgrammDescribtion.pptx
+++ b/ProjectDescribtions/MicroinformaticProgrammDescribtion.pptx
@@ -6,6 +6,9 @@
   </p:sldMasterIdLst>
   <p:sldIdLst>
     <p:sldId id="256" r:id="rId2"/>
+    <p:sldId id="257" r:id="rId3"/>
+    <p:sldId id="258" r:id="rId4"/>
+    <p:sldId id="259" r:id="rId5"/>
   </p:sldIdLst>
   <p:sldSz cx="12192000" cy="6858000"/>
   <p:notesSz cx="6858000" cy="9144000"/>
@@ -104,6 +107,11 @@
       </a:defRPr>
     </a:lvl9pPr>
   </p:defaultTextStyle>
+  <p:extLst>
+    <p:ext uri="{EFAFB233-063F-42B5-8137-9DF3F51BA10A}">
+      <p15:sldGuideLst xmlns:p15="http://schemas.microsoft.com/office/powerpoint/2012/main"/>
+    </p:ext>
+  </p:extLst>
 </p:presentation>
 </file>
 
@@ -238,7 +246,7 @@
           <a:p>
             <a:fld id="{4B81FC2C-06AA-4CA1-9EDF-0E3D25B84E21}" type="datetimeFigureOut">
               <a:rPr lang="de-CH" smtClean="0"/>
-              <a:t>08.04.2020</a:t>
+              <a:t>09.04.2020</a:t>
             </a:fld>
             <a:endParaRPr lang="de-CH"/>
           </a:p>
@@ -408,7 +416,7 @@
           <a:p>
             <a:fld id="{4B81FC2C-06AA-4CA1-9EDF-0E3D25B84E21}" type="datetimeFigureOut">
               <a:rPr lang="de-CH" smtClean="0"/>
-              <a:t>08.04.2020</a:t>
+              <a:t>09.04.2020</a:t>
             </a:fld>
             <a:endParaRPr lang="de-CH"/>
           </a:p>
@@ -588,7 +596,7 @@
           <a:p>
             <a:fld id="{4B81FC2C-06AA-4CA1-9EDF-0E3D25B84E21}" type="datetimeFigureOut">
               <a:rPr lang="de-CH" smtClean="0"/>
-              <a:t>08.04.2020</a:t>
+              <a:t>09.04.2020</a:t>
             </a:fld>
             <a:endParaRPr lang="de-CH"/>
           </a:p>
@@ -758,7 +766,7 @@
           <a:p>
             <a:fld id="{4B81FC2C-06AA-4CA1-9EDF-0E3D25B84E21}" type="datetimeFigureOut">
               <a:rPr lang="de-CH" smtClean="0"/>
-              <a:t>08.04.2020</a:t>
+              <a:t>09.04.2020</a:t>
             </a:fld>
             <a:endParaRPr lang="de-CH"/>
           </a:p>
@@ -1004,7 +1012,7 @@
           <a:p>
             <a:fld id="{4B81FC2C-06AA-4CA1-9EDF-0E3D25B84E21}" type="datetimeFigureOut">
               <a:rPr lang="de-CH" smtClean="0"/>
-              <a:t>08.04.2020</a:t>
+              <a:t>09.04.2020</a:t>
             </a:fld>
             <a:endParaRPr lang="de-CH"/>
           </a:p>
@@ -1236,7 +1244,7 @@
           <a:p>
             <a:fld id="{4B81FC2C-06AA-4CA1-9EDF-0E3D25B84E21}" type="datetimeFigureOut">
               <a:rPr lang="de-CH" smtClean="0"/>
-              <a:t>08.04.2020</a:t>
+              <a:t>09.04.2020</a:t>
             </a:fld>
             <a:endParaRPr lang="de-CH"/>
           </a:p>
@@ -1603,7 +1611,7 @@
           <a:p>
             <a:fld id="{4B81FC2C-06AA-4CA1-9EDF-0E3D25B84E21}" type="datetimeFigureOut">
               <a:rPr lang="de-CH" smtClean="0"/>
-              <a:t>08.04.2020</a:t>
+              <a:t>09.04.2020</a:t>
             </a:fld>
             <a:endParaRPr lang="de-CH"/>
           </a:p>
@@ -1721,7 +1729,7 @@
           <a:p>
             <a:fld id="{4B81FC2C-06AA-4CA1-9EDF-0E3D25B84E21}" type="datetimeFigureOut">
               <a:rPr lang="de-CH" smtClean="0"/>
-              <a:t>08.04.2020</a:t>
+              <a:t>09.04.2020</a:t>
             </a:fld>
             <a:endParaRPr lang="de-CH"/>
           </a:p>
@@ -1816,7 +1824,7 @@
           <a:p>
             <a:fld id="{4B81FC2C-06AA-4CA1-9EDF-0E3D25B84E21}" type="datetimeFigureOut">
               <a:rPr lang="de-CH" smtClean="0"/>
-              <a:t>08.04.2020</a:t>
+              <a:t>09.04.2020</a:t>
             </a:fld>
             <a:endParaRPr lang="de-CH"/>
           </a:p>
@@ -2093,7 +2101,7 @@
           <a:p>
             <a:fld id="{4B81FC2C-06AA-4CA1-9EDF-0E3D25B84E21}" type="datetimeFigureOut">
               <a:rPr lang="de-CH" smtClean="0"/>
-              <a:t>08.04.2020</a:t>
+              <a:t>09.04.2020</a:t>
             </a:fld>
             <a:endParaRPr lang="de-CH"/>
           </a:p>
@@ -2346,7 +2354,7 @@
           <a:p>
             <a:fld id="{4B81FC2C-06AA-4CA1-9EDF-0E3D25B84E21}" type="datetimeFigureOut">
               <a:rPr lang="de-CH" smtClean="0"/>
-              <a:t>08.04.2020</a:t>
+              <a:t>09.04.2020</a:t>
             </a:fld>
             <a:endParaRPr lang="de-CH"/>
           </a:p>
@@ -2559,7 +2567,7 @@
           <a:p>
             <a:fld id="{4B81FC2C-06AA-4CA1-9EDF-0E3D25B84E21}" type="datetimeFigureOut">
               <a:rPr lang="de-CH" smtClean="0"/>
-              <a:t>08.04.2020</a:t>
+              <a:t>09.04.2020</a:t>
             </a:fld>
             <a:endParaRPr lang="de-CH"/>
           </a:p>
@@ -2972,10 +2980,10 @@
         </p:nvGrpSpPr>
         <p:grpSpPr>
           <a:xfrm>
-            <a:off x="644781" y="345412"/>
-            <a:ext cx="1103870" cy="1501234"/>
-            <a:chOff x="756465" y="407516"/>
-            <a:chExt cx="1103870" cy="1501234"/>
+            <a:off x="1155319" y="748408"/>
+            <a:ext cx="1103871" cy="1501234"/>
+            <a:chOff x="756464" y="407516"/>
+            <a:chExt cx="1103871" cy="1501234"/>
           </a:xfrm>
         </p:grpSpPr>
         <p:sp>
@@ -3163,7 +3171,7 @@
           </p:nvSpPr>
           <p:spPr>
             <a:xfrm>
-              <a:off x="756466" y="1323975"/>
+              <a:off x="756464" y="1319210"/>
               <a:ext cx="1103869" cy="584775"/>
             </a:xfrm>
             <a:prstGeom prst="rect">
@@ -3214,7 +3222,7 @@
         </p:nvGrpSpPr>
         <p:grpSpPr>
           <a:xfrm>
-            <a:off x="3160710" y="227709"/>
+            <a:off x="5506400" y="475278"/>
             <a:ext cx="1103871" cy="953595"/>
             <a:chOff x="3135310" y="531341"/>
             <a:chExt cx="1103871" cy="953595"/>
@@ -3407,15 +3415,14 @@
         <p:nvCxnSpPr>
           <p:cNvPr id="21" name="Gewinkelte Verbindung 20"/>
           <p:cNvCxnSpPr>
-            <a:stCxn id="13" idx="1"/>
-            <a:endCxn id="7" idx="3"/>
+            <a:stCxn id="14" idx="1"/>
           </p:cNvCxnSpPr>
           <p:nvPr/>
         </p:nvCxnSpPr>
         <p:spPr>
-          <a:xfrm rot="10800000" flipV="1">
-            <a:off x="1748651" y="735540"/>
-            <a:ext cx="1412060" cy="363923"/>
+          <a:xfrm rot="10800000">
+            <a:off x="2259188" y="882050"/>
+            <a:ext cx="3247212" cy="377546"/>
           </a:xfrm>
           <a:prstGeom prst="bentConnector3">
             <a:avLst>
@@ -3449,8 +3456,8 @@
         </p:nvSpPr>
         <p:spPr>
           <a:xfrm>
-            <a:off x="2608045" y="612173"/>
-            <a:ext cx="349250" cy="184666"/>
+            <a:off x="3902094" y="1090317"/>
+            <a:ext cx="1243946" cy="184666"/>
           </a:xfrm>
           <a:prstGeom prst="rect">
             <a:avLst/>
@@ -3464,10 +3471,10 @@
           <a:lstStyle/>
           <a:p>
             <a:r>
-              <a:rPr lang="de-CH" sz="600" dirty="0" err="1" smtClean="0"/>
-              <a:t>Stop</a:t>
-            </a:r>
-            <a:endParaRPr lang="de-CH" sz="600" dirty="0"/>
+              <a:rPr lang="en-GB" sz="600" dirty="0" smtClean="0"/>
+              <a:t>Stop robot if object is detected</a:t>
+            </a:r>
+            <a:endParaRPr lang="en-GB" sz="600" dirty="0"/>
           </a:p>
         </p:txBody>
       </p:sp>
@@ -3479,7 +3486,7 @@
         </p:nvGrpSpPr>
         <p:grpSpPr>
           <a:xfrm>
-            <a:off x="644780" y="2178330"/>
+            <a:off x="2045229" y="2744378"/>
             <a:ext cx="1103871" cy="1200329"/>
             <a:chOff x="3160707" y="1470034"/>
             <a:chExt cx="1103871" cy="1200329"/>
@@ -3523,7 +3530,11 @@
             <a:p>
               <a:r>
                 <a:rPr lang="en-GB" sz="1000" b="1" dirty="0" smtClean="0"/>
-                <a:t>Sound direction detection</a:t>
+                <a:t>Sound direction </a:t>
+              </a:r>
+              <a:r>
+                <a:rPr lang="en-GB" sz="1000" b="1" dirty="0" smtClean="0"/>
+                <a:t>detection-thread</a:t>
               </a:r>
               <a:endParaRPr lang="en-GB" sz="1000" b="1" dirty="0"/>
             </a:p>
@@ -3659,16 +3670,618 @@
           </p:txBody>
         </p:sp>
       </p:grpSp>
-      <p:sp>
-        <p:nvSpPr>
-          <p:cNvPr id="40" name="Textfeld 39"/>
+      <p:grpSp>
+        <p:nvGrpSpPr>
+          <p:cNvPr id="51" name="Gruppieren 50"/>
+          <p:cNvGrpSpPr/>
+          <p:nvPr/>
+        </p:nvGrpSpPr>
+        <p:grpSpPr>
+          <a:xfrm>
+            <a:off x="4252982" y="4611007"/>
+            <a:ext cx="1103871" cy="1200329"/>
+            <a:chOff x="3160708" y="3118130"/>
+            <a:chExt cx="1103871" cy="1200329"/>
+          </a:xfrm>
+        </p:grpSpPr>
+        <p:sp>
+          <p:nvSpPr>
+            <p:cNvPr id="40" name="Textfeld 39"/>
+            <p:cNvSpPr txBox="1"/>
+            <p:nvPr/>
+          </p:nvSpPr>
+          <p:spPr>
+            <a:xfrm>
+              <a:off x="3160710" y="3118130"/>
+              <a:ext cx="1103869" cy="400110"/>
+            </a:xfrm>
+            <a:prstGeom prst="rect">
+              <a:avLst/>
+            </a:prstGeom>
+            <a:ln w="9525"/>
+          </p:spPr>
+          <p:style>
+            <a:lnRef idx="2">
+              <a:schemeClr val="dk1"/>
+            </a:lnRef>
+            <a:fillRef idx="1">
+              <a:schemeClr val="lt1"/>
+            </a:fillRef>
+            <a:effectRef idx="0">
+              <a:schemeClr val="dk1"/>
+            </a:effectRef>
+            <a:fontRef idx="minor">
+              <a:schemeClr val="dk1"/>
+            </a:fontRef>
+          </p:style>
+          <p:txBody>
+            <a:bodyPr wrap="square" rtlCol="0">
+              <a:spAutoFit/>
+            </a:bodyPr>
+            <a:lstStyle/>
+            <a:p>
+              <a:r>
+                <a:rPr lang="en-GB" sz="1000" b="1" dirty="0" smtClean="0"/>
+                <a:t>Free direction </a:t>
+              </a:r>
+              <a:r>
+                <a:rPr lang="en-GB" sz="1000" b="1" dirty="0" smtClean="0"/>
+                <a:t>detection-thread</a:t>
+              </a:r>
+              <a:endParaRPr lang="en-GB" sz="1000" b="1" dirty="0"/>
+            </a:p>
+          </p:txBody>
+        </p:sp>
+        <p:sp>
+          <p:nvSpPr>
+            <p:cNvPr id="41" name="Rechteck 40"/>
+            <p:cNvSpPr/>
+            <p:nvPr/>
+          </p:nvSpPr>
+          <p:spPr>
+            <a:xfrm>
+              <a:off x="3160709" y="3118130"/>
+              <a:ext cx="1103869" cy="1200329"/>
+            </a:xfrm>
+            <a:prstGeom prst="rect">
+              <a:avLst/>
+            </a:prstGeom>
+            <a:noFill/>
+          </p:spPr>
+          <p:style>
+            <a:lnRef idx="2">
+              <a:schemeClr val="dk1">
+                <a:shade val="50000"/>
+              </a:schemeClr>
+            </a:lnRef>
+            <a:fillRef idx="1">
+              <a:schemeClr val="dk1"/>
+            </a:fillRef>
+            <a:effectRef idx="0">
+              <a:schemeClr val="dk1"/>
+            </a:effectRef>
+            <a:fontRef idx="minor">
+              <a:schemeClr val="lt1"/>
+            </a:fontRef>
+          </p:style>
+          <p:txBody>
+            <a:bodyPr rtlCol="0" anchor="ctr"/>
+            <a:lstStyle/>
+            <a:p>
+              <a:pPr algn="ctr"/>
+              <a:endParaRPr lang="de-CH"/>
+            </a:p>
+          </p:txBody>
+        </p:sp>
+        <p:sp>
+          <p:nvSpPr>
+            <p:cNvPr id="42" name="Textfeld 41"/>
+            <p:cNvSpPr txBox="1"/>
+            <p:nvPr/>
+          </p:nvSpPr>
+          <p:spPr>
+            <a:xfrm>
+              <a:off x="3160709" y="3518240"/>
+              <a:ext cx="1103869" cy="215444"/>
+            </a:xfrm>
+            <a:prstGeom prst="rect">
+              <a:avLst/>
+            </a:prstGeom>
+            <a:ln w="3175"/>
+          </p:spPr>
+          <p:style>
+            <a:lnRef idx="2">
+              <a:schemeClr val="dk1"/>
+            </a:lnRef>
+            <a:fillRef idx="1">
+              <a:schemeClr val="lt1"/>
+            </a:fillRef>
+            <a:effectRef idx="0">
+              <a:schemeClr val="dk1"/>
+            </a:effectRef>
+            <a:fontRef idx="minor">
+              <a:schemeClr val="dk1"/>
+            </a:fontRef>
+          </p:style>
+          <p:txBody>
+            <a:bodyPr wrap="square" rtlCol="0">
+              <a:spAutoFit/>
+            </a:bodyPr>
+            <a:lstStyle/>
+            <a:p>
+              <a:r>
+                <a:rPr lang="en-GB" sz="800" dirty="0" smtClean="0"/>
+                <a:t>Uses </a:t>
+              </a:r>
+              <a:r>
+                <a:rPr lang="en-GB" sz="800" dirty="0" err="1" smtClean="0"/>
+                <a:t>ToF</a:t>
+              </a:r>
+              <a:r>
+                <a:rPr lang="en-GB" sz="800" dirty="0" smtClean="0"/>
+                <a:t>-sensor</a:t>
+              </a:r>
+              <a:endParaRPr lang="en-GB" sz="800" dirty="0"/>
+            </a:p>
+          </p:txBody>
+        </p:sp>
+        <p:sp>
+          <p:nvSpPr>
+            <p:cNvPr id="43" name="Textfeld 42"/>
+            <p:cNvSpPr txBox="1"/>
+            <p:nvPr/>
+          </p:nvSpPr>
+          <p:spPr>
+            <a:xfrm>
+              <a:off x="3160708" y="3732180"/>
+              <a:ext cx="1103869" cy="584775"/>
+            </a:xfrm>
+            <a:prstGeom prst="rect">
+              <a:avLst/>
+            </a:prstGeom>
+            <a:ln w="3175"/>
+          </p:spPr>
+          <p:style>
+            <a:lnRef idx="2">
+              <a:schemeClr val="dk1"/>
+            </a:lnRef>
+            <a:fillRef idx="1">
+              <a:schemeClr val="lt1"/>
+            </a:fillRef>
+            <a:effectRef idx="0">
+              <a:schemeClr val="dk1"/>
+            </a:effectRef>
+            <a:fontRef idx="minor">
+              <a:schemeClr val="dk1"/>
+            </a:fontRef>
+          </p:style>
+          <p:txBody>
+            <a:bodyPr wrap="square" rtlCol="0">
+              <a:spAutoFit/>
+            </a:bodyPr>
+            <a:lstStyle/>
+            <a:p>
+              <a:r>
+                <a:rPr lang="en-GB" sz="800" dirty="0" smtClean="0"/>
+                <a:t>When object is encountered rotates robot to search for free space(180)</a:t>
+              </a:r>
+              <a:endParaRPr lang="en-GB" sz="800" dirty="0"/>
+            </a:p>
+          </p:txBody>
+        </p:sp>
+      </p:grpSp>
+      <p:grpSp>
+        <p:nvGrpSpPr>
+          <p:cNvPr id="20" name="Gruppieren 19"/>
+          <p:cNvGrpSpPr/>
+          <p:nvPr/>
+        </p:nvGrpSpPr>
+        <p:grpSpPr>
+          <a:xfrm>
+            <a:off x="6742652" y="5653636"/>
+            <a:ext cx="1103871" cy="615555"/>
+            <a:chOff x="4572767" y="2755863"/>
+            <a:chExt cx="1103871" cy="615555"/>
+          </a:xfrm>
+        </p:grpSpPr>
+        <p:sp>
+          <p:nvSpPr>
+            <p:cNvPr id="25" name="Textfeld 24"/>
+            <p:cNvSpPr txBox="1"/>
+            <p:nvPr/>
+          </p:nvSpPr>
+          <p:spPr>
+            <a:xfrm>
+              <a:off x="4572769" y="2755863"/>
+              <a:ext cx="1103869" cy="400110"/>
+            </a:xfrm>
+            <a:prstGeom prst="rect">
+              <a:avLst/>
+            </a:prstGeom>
+            <a:ln w="9525"/>
+          </p:spPr>
+          <p:style>
+            <a:lnRef idx="2">
+              <a:schemeClr val="dk1"/>
+            </a:lnRef>
+            <a:fillRef idx="1">
+              <a:schemeClr val="lt1"/>
+            </a:fillRef>
+            <a:effectRef idx="0">
+              <a:schemeClr val="dk1"/>
+            </a:effectRef>
+            <a:fontRef idx="minor">
+              <a:schemeClr val="dk1"/>
+            </a:fontRef>
+          </p:style>
+          <p:txBody>
+            <a:bodyPr wrap="square" rtlCol="0">
+              <a:spAutoFit/>
+            </a:bodyPr>
+            <a:lstStyle/>
+            <a:p>
+              <a:r>
+                <a:rPr lang="en-GB" sz="1000" b="1" dirty="0" err="1" smtClean="0"/>
+                <a:t>ToF</a:t>
+              </a:r>
+              <a:r>
+                <a:rPr lang="en-GB" sz="1000" b="1" dirty="0" smtClean="0"/>
+                <a:t>-Sensor-thread</a:t>
+              </a:r>
+              <a:endParaRPr lang="en-GB" sz="1000" b="1" dirty="0"/>
+            </a:p>
+          </p:txBody>
+        </p:sp>
+        <p:sp>
+          <p:nvSpPr>
+            <p:cNvPr id="26" name="Rechteck 25"/>
+            <p:cNvSpPr/>
+            <p:nvPr/>
+          </p:nvSpPr>
+          <p:spPr>
+            <a:xfrm>
+              <a:off x="4572768" y="2755864"/>
+              <a:ext cx="1103869" cy="615554"/>
+            </a:xfrm>
+            <a:prstGeom prst="rect">
+              <a:avLst/>
+            </a:prstGeom>
+            <a:noFill/>
+          </p:spPr>
+          <p:style>
+            <a:lnRef idx="2">
+              <a:schemeClr val="dk1">
+                <a:shade val="50000"/>
+              </a:schemeClr>
+            </a:lnRef>
+            <a:fillRef idx="1">
+              <a:schemeClr val="dk1"/>
+            </a:fillRef>
+            <a:effectRef idx="0">
+              <a:schemeClr val="dk1"/>
+            </a:effectRef>
+            <a:fontRef idx="minor">
+              <a:schemeClr val="lt1"/>
+            </a:fontRef>
+          </p:style>
+          <p:txBody>
+            <a:bodyPr rtlCol="0" anchor="ctr"/>
+            <a:lstStyle/>
+            <a:p>
+              <a:pPr algn="ctr"/>
+              <a:endParaRPr lang="de-CH"/>
+            </a:p>
+          </p:txBody>
+        </p:sp>
+        <p:sp>
+          <p:nvSpPr>
+            <p:cNvPr id="30" name="Textfeld 29"/>
+            <p:cNvSpPr txBox="1"/>
+            <p:nvPr/>
+          </p:nvSpPr>
+          <p:spPr>
+            <a:xfrm>
+              <a:off x="4572767" y="3155973"/>
+              <a:ext cx="1103869" cy="215444"/>
+            </a:xfrm>
+            <a:prstGeom prst="rect">
+              <a:avLst/>
+            </a:prstGeom>
+            <a:ln w="3175"/>
+          </p:spPr>
+          <p:style>
+            <a:lnRef idx="2">
+              <a:schemeClr val="dk1"/>
+            </a:lnRef>
+            <a:fillRef idx="1">
+              <a:schemeClr val="lt1"/>
+            </a:fillRef>
+            <a:effectRef idx="0">
+              <a:schemeClr val="dk1"/>
+            </a:effectRef>
+            <a:fontRef idx="minor">
+              <a:schemeClr val="dk1"/>
+            </a:fontRef>
+          </p:style>
+          <p:txBody>
+            <a:bodyPr wrap="square" rtlCol="0">
+              <a:spAutoFit/>
+            </a:bodyPr>
+            <a:lstStyle/>
+            <a:p>
+              <a:r>
+                <a:rPr lang="en-GB" sz="800" dirty="0" smtClean="0"/>
+                <a:t>Measures distances</a:t>
+              </a:r>
+              <a:endParaRPr lang="en-GB" sz="800" dirty="0"/>
+            </a:p>
+          </p:txBody>
+        </p:sp>
+      </p:grpSp>
+      <p:cxnSp>
+        <p:nvCxnSpPr>
+          <p:cNvPr id="10" name="Gewinkelte Verbindung 9"/>
+          <p:cNvCxnSpPr>
+            <a:stCxn id="14" idx="2"/>
+            <a:endCxn id="47" idx="0"/>
+          </p:cNvCxnSpPr>
+          <p:nvPr/>
+        </p:nvCxnSpPr>
+        <p:spPr>
+          <a:xfrm rot="5400000">
+            <a:off x="5431112" y="1424784"/>
+            <a:ext cx="623135" cy="631312"/>
+          </a:xfrm>
+          <a:prstGeom prst="bentConnector3">
+            <a:avLst/>
+          </a:prstGeom>
+          <a:ln>
+            <a:tailEnd type="triangle"/>
+          </a:ln>
+        </p:spPr>
+        <p:style>
+          <a:lnRef idx="1">
+            <a:schemeClr val="accent1"/>
+          </a:lnRef>
+          <a:fillRef idx="0">
+            <a:schemeClr val="accent1"/>
+          </a:fillRef>
+          <a:effectRef idx="0">
+            <a:schemeClr val="accent1"/>
+          </a:effectRef>
+          <a:fontRef idx="minor">
+            <a:schemeClr val="tx1"/>
+          </a:fontRef>
+        </p:style>
+      </p:cxnSp>
+      <p:grpSp>
+        <p:nvGrpSpPr>
+          <p:cNvPr id="15" name="Gruppieren 14"/>
+          <p:cNvGrpSpPr/>
+          <p:nvPr/>
+        </p:nvGrpSpPr>
+        <p:grpSpPr>
+          <a:xfrm>
+            <a:off x="7978905" y="637399"/>
+            <a:ext cx="1103871" cy="615555"/>
+            <a:chOff x="4439204" y="226364"/>
+            <a:chExt cx="1103871" cy="615555"/>
+          </a:xfrm>
+        </p:grpSpPr>
+        <p:sp>
+          <p:nvSpPr>
+            <p:cNvPr id="32" name="Textfeld 31"/>
+            <p:cNvSpPr txBox="1"/>
+            <p:nvPr/>
+          </p:nvSpPr>
+          <p:spPr>
+            <a:xfrm>
+              <a:off x="4439206" y="226364"/>
+              <a:ext cx="1103869" cy="400110"/>
+            </a:xfrm>
+            <a:prstGeom prst="rect">
+              <a:avLst/>
+            </a:prstGeom>
+            <a:ln w="9525"/>
+          </p:spPr>
+          <p:style>
+            <a:lnRef idx="2">
+              <a:schemeClr val="dk1"/>
+            </a:lnRef>
+            <a:fillRef idx="1">
+              <a:schemeClr val="lt1"/>
+            </a:fillRef>
+            <a:effectRef idx="0">
+              <a:schemeClr val="dk1"/>
+            </a:effectRef>
+            <a:fontRef idx="minor">
+              <a:schemeClr val="dk1"/>
+            </a:fontRef>
+          </p:style>
+          <p:txBody>
+            <a:bodyPr wrap="square" rtlCol="0">
+              <a:spAutoFit/>
+            </a:bodyPr>
+            <a:lstStyle/>
+            <a:p>
+              <a:r>
+                <a:rPr lang="en-GB" sz="1000" b="1" dirty="0" smtClean="0"/>
+                <a:t>IR-sensor-reading-thread</a:t>
+              </a:r>
+              <a:endParaRPr lang="en-GB" sz="1000" b="1" dirty="0"/>
+            </a:p>
+          </p:txBody>
+        </p:sp>
+        <p:sp>
+          <p:nvSpPr>
+            <p:cNvPr id="33" name="Rechteck 32"/>
+            <p:cNvSpPr/>
+            <p:nvPr/>
+          </p:nvSpPr>
+          <p:spPr>
+            <a:xfrm>
+              <a:off x="4439205" y="226365"/>
+              <a:ext cx="1103869" cy="615554"/>
+            </a:xfrm>
+            <a:prstGeom prst="rect">
+              <a:avLst/>
+            </a:prstGeom>
+            <a:noFill/>
+          </p:spPr>
+          <p:style>
+            <a:lnRef idx="2">
+              <a:schemeClr val="dk1">
+                <a:shade val="50000"/>
+              </a:schemeClr>
+            </a:lnRef>
+            <a:fillRef idx="1">
+              <a:schemeClr val="dk1"/>
+            </a:fillRef>
+            <a:effectRef idx="0">
+              <a:schemeClr val="dk1"/>
+            </a:effectRef>
+            <a:fontRef idx="minor">
+              <a:schemeClr val="lt1"/>
+            </a:fontRef>
+          </p:style>
+          <p:txBody>
+            <a:bodyPr rtlCol="0" anchor="ctr"/>
+            <a:lstStyle/>
+            <a:p>
+              <a:pPr algn="ctr"/>
+              <a:endParaRPr lang="de-CH"/>
+            </a:p>
+          </p:txBody>
+        </p:sp>
+        <p:sp>
+          <p:nvSpPr>
+            <p:cNvPr id="39" name="Textfeld 38"/>
+            <p:cNvSpPr txBox="1"/>
+            <p:nvPr/>
+          </p:nvSpPr>
+          <p:spPr>
+            <a:xfrm>
+              <a:off x="4439204" y="626474"/>
+              <a:ext cx="1103869" cy="215444"/>
+            </a:xfrm>
+            <a:prstGeom prst="rect">
+              <a:avLst/>
+            </a:prstGeom>
+            <a:ln w="3175"/>
+          </p:spPr>
+          <p:style>
+            <a:lnRef idx="2">
+              <a:schemeClr val="dk1"/>
+            </a:lnRef>
+            <a:fillRef idx="1">
+              <a:schemeClr val="lt1"/>
+            </a:fillRef>
+            <a:effectRef idx="0">
+              <a:schemeClr val="dk1"/>
+            </a:effectRef>
+            <a:fontRef idx="minor">
+              <a:schemeClr val="dk1"/>
+            </a:fontRef>
+          </p:style>
+          <p:txBody>
+            <a:bodyPr wrap="square" rtlCol="0">
+              <a:spAutoFit/>
+            </a:bodyPr>
+            <a:lstStyle/>
+            <a:p>
+              <a:r>
+                <a:rPr lang="en-GB" sz="800" dirty="0" smtClean="0"/>
+                <a:t>Measures distances</a:t>
+              </a:r>
+              <a:endParaRPr lang="en-GB" sz="800" dirty="0"/>
+            </a:p>
+          </p:txBody>
+        </p:sp>
+      </p:grpSp>
+      <p:cxnSp>
+        <p:nvCxnSpPr>
+          <p:cNvPr id="44" name="Gewinkelte Verbindung 43"/>
+          <p:cNvCxnSpPr>
+            <a:stCxn id="33" idx="1"/>
+            <a:endCxn id="12" idx="3"/>
+          </p:cNvCxnSpPr>
+          <p:nvPr/>
+        </p:nvCxnSpPr>
+        <p:spPr>
+          <a:xfrm rot="10800000">
+            <a:off x="6610270" y="675333"/>
+            <a:ext cx="1368636" cy="269844"/>
+          </a:xfrm>
+          <a:prstGeom prst="bentConnector3">
+            <a:avLst>
+              <a:gd name="adj1" fmla="val 50000"/>
+            </a:avLst>
+          </a:prstGeom>
+          <a:ln>
+            <a:tailEnd type="triangle"/>
+          </a:ln>
+        </p:spPr>
+        <p:style>
+          <a:lnRef idx="1">
+            <a:schemeClr val="accent1"/>
+          </a:lnRef>
+          <a:fillRef idx="0">
+            <a:schemeClr val="accent1"/>
+          </a:fillRef>
+          <a:effectRef idx="0">
+            <a:schemeClr val="accent1"/>
+          </a:effectRef>
+          <a:fontRef idx="minor">
+            <a:schemeClr val="tx1"/>
+          </a:fontRef>
+        </p:style>
+      </p:cxnSp>
+      <p:cxnSp>
+        <p:nvCxnSpPr>
+          <p:cNvPr id="23" name="Gewinkelte Verbindung 22"/>
+          <p:cNvCxnSpPr>
+            <a:stCxn id="26" idx="1"/>
+            <a:endCxn id="43" idx="3"/>
+          </p:cNvCxnSpPr>
+          <p:nvPr/>
+        </p:nvCxnSpPr>
+        <p:spPr>
+          <a:xfrm rot="10800000">
+            <a:off x="5356851" y="5517446"/>
+            <a:ext cx="1385802" cy="443969"/>
+          </a:xfrm>
+          <a:prstGeom prst="bentConnector3">
+            <a:avLst/>
+          </a:prstGeom>
+          <a:ln>
+            <a:tailEnd type="triangle"/>
+          </a:ln>
+        </p:spPr>
+        <p:style>
+          <a:lnRef idx="1">
+            <a:schemeClr val="accent1"/>
+          </a:lnRef>
+          <a:fillRef idx="0">
+            <a:schemeClr val="accent1"/>
+          </a:fillRef>
+          <a:effectRef idx="0">
+            <a:schemeClr val="accent1"/>
+          </a:effectRef>
+          <a:fontRef idx="minor">
+            <a:schemeClr val="tx1"/>
+          </a:fontRef>
+        </p:style>
+      </p:cxnSp>
+      <p:sp>
+        <p:nvSpPr>
+          <p:cNvPr id="46" name="Textfeld 45"/>
           <p:cNvSpPr txBox="1"/>
           <p:nvPr/>
         </p:nvSpPr>
         <p:spPr>
           <a:xfrm>
-            <a:off x="2540257" y="2178329"/>
-            <a:ext cx="1103869" cy="400110"/>
+            <a:off x="4875089" y="2052009"/>
+            <a:ext cx="1103869" cy="246221"/>
           </a:xfrm>
           <a:prstGeom prst="rect">
             <a:avLst/>
@@ -3697,7 +4310,7 @@
           <a:p>
             <a:r>
               <a:rPr lang="en-GB" sz="1000" b="1" dirty="0" smtClean="0"/>
-              <a:t>Free direction detection</a:t>
+              <a:t>Main-thread</a:t>
             </a:r>
             <a:endParaRPr lang="en-GB" sz="1000" b="1" dirty="0"/>
           </a:p>
@@ -3705,14 +4318,14 @@
       </p:sp>
       <p:sp>
         <p:nvSpPr>
-          <p:cNvPr id="41" name="Rechteck 40"/>
+          <p:cNvPr id="47" name="Rechteck 46"/>
           <p:cNvSpPr/>
           <p:nvPr/>
         </p:nvSpPr>
         <p:spPr>
           <a:xfrm>
-            <a:off x="2540256" y="2178329"/>
-            <a:ext cx="1103869" cy="1200329"/>
+            <a:off x="4875088" y="2052008"/>
+            <a:ext cx="1103869" cy="2083110"/>
           </a:xfrm>
           <a:prstGeom prst="rect">
             <a:avLst/>
@@ -3746,53 +4359,13 @@
       </p:sp>
       <p:sp>
         <p:nvSpPr>
-          <p:cNvPr id="42" name="Textfeld 41"/>
+          <p:cNvPr id="48" name="Textfeld 47"/>
           <p:cNvSpPr txBox="1"/>
           <p:nvPr/>
         </p:nvSpPr>
         <p:spPr>
           <a:xfrm>
-            <a:off x="2540256" y="2578439"/>
-            <a:ext cx="1103869" cy="215444"/>
-          </a:xfrm>
-          <a:prstGeom prst="rect">
-            <a:avLst/>
-          </a:prstGeom>
-          <a:ln w="3175"/>
-        </p:spPr>
-        <p:style>
-          <a:lnRef idx="2">
-            <a:schemeClr val="dk1"/>
-          </a:lnRef>
-          <a:fillRef idx="1">
-            <a:schemeClr val="lt1"/>
-          </a:fillRef>
-          <a:effectRef idx="0">
-            <a:schemeClr val="dk1"/>
-          </a:effectRef>
-          <a:fontRef idx="minor">
-            <a:schemeClr val="dk1"/>
-          </a:fontRef>
-        </p:style>
-        <p:txBody>
-          <a:bodyPr wrap="square" rtlCol="0">
-            <a:spAutoFit/>
-          </a:bodyPr>
-          <a:lstStyle/>
-          <a:p>
-            <a:endParaRPr lang="en-GB" sz="800" dirty="0"/>
-          </a:p>
-        </p:txBody>
-      </p:sp>
-      <p:sp>
-        <p:nvSpPr>
-          <p:cNvPr id="43" name="Textfeld 42"/>
-          <p:cNvSpPr txBox="1"/>
-          <p:nvPr/>
-        </p:nvSpPr>
-        <p:spPr>
-          <a:xfrm>
-            <a:off x="2540255" y="2916993"/>
+            <a:off x="4875087" y="2298230"/>
             <a:ext cx="1103869" cy="461665"/>
           </a:xfrm>
           <a:prstGeom prst="rect">
@@ -3822,9 +4395,937 @@
           <a:p>
             <a:r>
               <a:rPr lang="en-GB" sz="800" dirty="0" smtClean="0"/>
-              <a:t>Gives the relative direction of the Sound</a:t>
+              <a:t>Calculate travel direction(bug algorithm)</a:t>
             </a:r>
             <a:endParaRPr lang="en-GB" sz="800" dirty="0"/>
+          </a:p>
+        </p:txBody>
+      </p:sp>
+      <p:sp>
+        <p:nvSpPr>
+          <p:cNvPr id="49" name="Textfeld 48"/>
+          <p:cNvSpPr txBox="1"/>
+          <p:nvPr/>
+        </p:nvSpPr>
+        <p:spPr>
+          <a:xfrm>
+            <a:off x="4874823" y="2755074"/>
+            <a:ext cx="1103869" cy="338554"/>
+          </a:xfrm>
+          <a:prstGeom prst="rect">
+            <a:avLst/>
+          </a:prstGeom>
+          <a:ln w="3175"/>
+        </p:spPr>
+        <p:style>
+          <a:lnRef idx="2">
+            <a:schemeClr val="dk1"/>
+          </a:lnRef>
+          <a:fillRef idx="1">
+            <a:schemeClr val="lt1"/>
+          </a:fillRef>
+          <a:effectRef idx="0">
+            <a:schemeClr val="dk1"/>
+          </a:effectRef>
+          <a:fontRef idx="minor">
+            <a:schemeClr val="dk1"/>
+          </a:fontRef>
+        </p:style>
+        <p:txBody>
+          <a:bodyPr wrap="square" rtlCol="0">
+            <a:spAutoFit/>
+          </a:bodyPr>
+          <a:lstStyle/>
+          <a:p>
+            <a:r>
+              <a:rPr lang="en-GB" sz="800" dirty="0" smtClean="0"/>
+              <a:t>Prepare Event data to send</a:t>
+            </a:r>
+            <a:endParaRPr lang="en-GB" sz="800" dirty="0"/>
+          </a:p>
+        </p:txBody>
+      </p:sp>
+      <p:cxnSp>
+        <p:nvCxnSpPr>
+          <p:cNvPr id="54" name="Gewinkelte Verbindung 53"/>
+          <p:cNvCxnSpPr>
+            <a:stCxn id="48" idx="1"/>
+            <a:endCxn id="8" idx="3"/>
+          </p:cNvCxnSpPr>
+          <p:nvPr/>
+        </p:nvCxnSpPr>
+        <p:spPr>
+          <a:xfrm rot="10800000">
+            <a:off x="2259189" y="1952491"/>
+            <a:ext cx="2615899" cy="576573"/>
+          </a:xfrm>
+          <a:prstGeom prst="bentConnector3">
+            <a:avLst>
+              <a:gd name="adj1" fmla="val 50000"/>
+            </a:avLst>
+          </a:prstGeom>
+          <a:ln>
+            <a:tailEnd type="triangle"/>
+          </a:ln>
+        </p:spPr>
+        <p:style>
+          <a:lnRef idx="1">
+            <a:schemeClr val="accent1"/>
+          </a:lnRef>
+          <a:fillRef idx="0">
+            <a:schemeClr val="accent1"/>
+          </a:fillRef>
+          <a:effectRef idx="0">
+            <a:schemeClr val="accent1"/>
+          </a:effectRef>
+          <a:fontRef idx="minor">
+            <a:schemeClr val="tx1"/>
+          </a:fontRef>
+        </p:style>
+      </p:cxnSp>
+      <p:cxnSp>
+        <p:nvCxnSpPr>
+          <p:cNvPr id="58" name="Gewinkelte Verbindung 57"/>
+          <p:cNvCxnSpPr>
+            <a:stCxn id="36" idx="3"/>
+            <a:endCxn id="47" idx="1"/>
+          </p:cNvCxnSpPr>
+          <p:nvPr/>
+        </p:nvCxnSpPr>
+        <p:spPr>
+          <a:xfrm flipV="1">
+            <a:off x="3149099" y="3093563"/>
+            <a:ext cx="1725989" cy="220202"/>
+          </a:xfrm>
+          <a:prstGeom prst="bentConnector3">
+            <a:avLst/>
+          </a:prstGeom>
+          <a:ln>
+            <a:tailEnd type="triangle"/>
+          </a:ln>
+        </p:spPr>
+        <p:style>
+          <a:lnRef idx="1">
+            <a:schemeClr val="accent1"/>
+          </a:lnRef>
+          <a:fillRef idx="0">
+            <a:schemeClr val="accent1"/>
+          </a:fillRef>
+          <a:effectRef idx="0">
+            <a:schemeClr val="accent1"/>
+          </a:effectRef>
+          <a:fontRef idx="minor">
+            <a:schemeClr val="tx1"/>
+          </a:fontRef>
+        </p:style>
+      </p:cxnSp>
+      <p:cxnSp>
+        <p:nvCxnSpPr>
+          <p:cNvPr id="60" name="Gewinkelte Verbindung 59"/>
+          <p:cNvCxnSpPr>
+            <a:stCxn id="40" idx="0"/>
+            <a:endCxn id="47" idx="2"/>
+          </p:cNvCxnSpPr>
+          <p:nvPr/>
+        </p:nvCxnSpPr>
+        <p:spPr>
+          <a:xfrm rot="5400000" flipH="1" flipV="1">
+            <a:off x="4878027" y="4062011"/>
+            <a:ext cx="475889" cy="622104"/>
+          </a:xfrm>
+          <a:prstGeom prst="bentConnector3">
+            <a:avLst/>
+          </a:prstGeom>
+          <a:ln>
+            <a:tailEnd type="triangle"/>
+          </a:ln>
+        </p:spPr>
+        <p:style>
+          <a:lnRef idx="1">
+            <a:schemeClr val="accent1"/>
+          </a:lnRef>
+          <a:fillRef idx="0">
+            <a:schemeClr val="accent1"/>
+          </a:fillRef>
+          <a:effectRef idx="0">
+            <a:schemeClr val="accent1"/>
+          </a:effectRef>
+          <a:fontRef idx="minor">
+            <a:schemeClr val="tx1"/>
+          </a:fontRef>
+        </p:style>
+      </p:cxnSp>
+      <p:cxnSp>
+        <p:nvCxnSpPr>
+          <p:cNvPr id="65" name="Gewinkelte Verbindung 64"/>
+          <p:cNvCxnSpPr>
+            <a:stCxn id="41" idx="1"/>
+            <a:endCxn id="4" idx="2"/>
+          </p:cNvCxnSpPr>
+          <p:nvPr/>
+        </p:nvCxnSpPr>
+        <p:spPr>
+          <a:xfrm rot="10800000">
+            <a:off x="1707255" y="2249642"/>
+            <a:ext cx="2545728" cy="2961530"/>
+          </a:xfrm>
+          <a:prstGeom prst="bentConnector2">
+            <a:avLst/>
+          </a:prstGeom>
+          <a:ln>
+            <a:tailEnd type="triangle"/>
+          </a:ln>
+        </p:spPr>
+        <p:style>
+          <a:lnRef idx="1">
+            <a:schemeClr val="accent1"/>
+          </a:lnRef>
+          <a:fillRef idx="0">
+            <a:schemeClr val="accent1"/>
+          </a:fillRef>
+          <a:effectRef idx="0">
+            <a:schemeClr val="accent1"/>
+          </a:effectRef>
+          <a:fontRef idx="minor">
+            <a:schemeClr val="tx1"/>
+          </a:fontRef>
+        </p:style>
+      </p:cxnSp>
+      <p:sp>
+        <p:nvSpPr>
+          <p:cNvPr id="74" name="Textfeld 73"/>
+          <p:cNvSpPr txBox="1"/>
+          <p:nvPr/>
+        </p:nvSpPr>
+        <p:spPr>
+          <a:xfrm>
+            <a:off x="4874823" y="3103404"/>
+            <a:ext cx="1103869" cy="338554"/>
+          </a:xfrm>
+          <a:prstGeom prst="rect">
+            <a:avLst/>
+          </a:prstGeom>
+          <a:ln w="3175"/>
+        </p:spPr>
+        <p:style>
+          <a:lnRef idx="2">
+            <a:schemeClr val="dk1"/>
+          </a:lnRef>
+          <a:fillRef idx="1">
+            <a:schemeClr val="lt1"/>
+          </a:fillRef>
+          <a:effectRef idx="0">
+            <a:schemeClr val="dk1"/>
+          </a:effectRef>
+          <a:fontRef idx="minor">
+            <a:schemeClr val="dk1"/>
+          </a:fontRef>
+        </p:style>
+        <p:txBody>
+          <a:bodyPr wrap="square" rtlCol="0">
+            <a:spAutoFit/>
+          </a:bodyPr>
+          <a:lstStyle/>
+          <a:p>
+            <a:r>
+              <a:rPr lang="en-GB" sz="800" dirty="0" smtClean="0"/>
+              <a:t>Send Data to computer</a:t>
+            </a:r>
+            <a:endParaRPr lang="en-GB" sz="800" dirty="0"/>
+          </a:p>
+        </p:txBody>
+      </p:sp>
+      <p:sp>
+        <p:nvSpPr>
+          <p:cNvPr id="81" name="Textfeld 80"/>
+          <p:cNvSpPr txBox="1"/>
+          <p:nvPr/>
+        </p:nvSpPr>
+        <p:spPr>
+          <a:xfrm>
+            <a:off x="4874823" y="3447762"/>
+            <a:ext cx="1103869" cy="338554"/>
+          </a:xfrm>
+          <a:prstGeom prst="rect">
+            <a:avLst/>
+          </a:prstGeom>
+          <a:ln w="3175"/>
+        </p:spPr>
+        <p:style>
+          <a:lnRef idx="2">
+            <a:schemeClr val="dk1"/>
+          </a:lnRef>
+          <a:fillRef idx="1">
+            <a:schemeClr val="lt1"/>
+          </a:fillRef>
+          <a:effectRef idx="0">
+            <a:schemeClr val="dk1"/>
+          </a:effectRef>
+          <a:fontRef idx="minor">
+            <a:schemeClr val="dk1"/>
+          </a:fontRef>
+        </p:style>
+        <p:txBody>
+          <a:bodyPr wrap="square" rtlCol="0">
+            <a:spAutoFit/>
+          </a:bodyPr>
+          <a:lstStyle/>
+          <a:p>
+            <a:r>
+              <a:rPr lang="en-GB" sz="800" dirty="0" smtClean="0"/>
+              <a:t>Decide if treasure </a:t>
+            </a:r>
+            <a:r>
+              <a:rPr lang="en-GB" sz="800" dirty="0" smtClean="0"/>
+              <a:t>was found</a:t>
+            </a:r>
+            <a:endParaRPr lang="en-GB" sz="800" dirty="0"/>
+          </a:p>
+        </p:txBody>
+      </p:sp>
+      <p:sp>
+        <p:nvSpPr>
+          <p:cNvPr id="82" name="Textfeld 81"/>
+          <p:cNvSpPr txBox="1"/>
+          <p:nvPr/>
+        </p:nvSpPr>
+        <p:spPr>
+          <a:xfrm>
+            <a:off x="4874823" y="3800607"/>
+            <a:ext cx="1103869" cy="338554"/>
+          </a:xfrm>
+          <a:prstGeom prst="rect">
+            <a:avLst/>
+          </a:prstGeom>
+          <a:ln w="3175"/>
+        </p:spPr>
+        <p:style>
+          <a:lnRef idx="2">
+            <a:schemeClr val="dk1"/>
+          </a:lnRef>
+          <a:fillRef idx="1">
+            <a:schemeClr val="lt1"/>
+          </a:fillRef>
+          <a:effectRef idx="0">
+            <a:schemeClr val="dk1"/>
+          </a:effectRef>
+          <a:fontRef idx="minor">
+            <a:schemeClr val="dk1"/>
+          </a:fontRef>
+        </p:style>
+        <p:txBody>
+          <a:bodyPr wrap="square" rtlCol="0">
+            <a:spAutoFit/>
+          </a:bodyPr>
+          <a:lstStyle/>
+          <a:p>
+            <a:r>
+              <a:rPr lang="en-GB" sz="800" dirty="0" smtClean="0"/>
+              <a:t>(play sound/take pictures)</a:t>
+            </a:r>
+            <a:endParaRPr lang="en-GB" sz="800" dirty="0"/>
+          </a:p>
+        </p:txBody>
+      </p:sp>
+      <p:sp>
+        <p:nvSpPr>
+          <p:cNvPr id="83" name="Textfeld 82"/>
+          <p:cNvSpPr txBox="1"/>
+          <p:nvPr/>
+        </p:nvSpPr>
+        <p:spPr>
+          <a:xfrm>
+            <a:off x="5393098" y="1705873"/>
+            <a:ext cx="1243946" cy="276999"/>
+          </a:xfrm>
+          <a:prstGeom prst="rect">
+            <a:avLst/>
+          </a:prstGeom>
+          <a:noFill/>
+        </p:spPr>
+        <p:txBody>
+          <a:bodyPr wrap="square" rtlCol="0">
+            <a:spAutoFit/>
+          </a:bodyPr>
+          <a:lstStyle/>
+          <a:p>
+            <a:r>
+              <a:rPr lang="en-GB" sz="600" dirty="0" smtClean="0"/>
+              <a:t>Indicates if an object is detected</a:t>
+            </a:r>
+          </a:p>
+          <a:p>
+            <a:r>
+              <a:rPr lang="en-GB" sz="600" dirty="0" smtClean="0"/>
+              <a:t>Gives relative direction of object</a:t>
+            </a:r>
+            <a:endParaRPr lang="en-GB" sz="600" dirty="0"/>
+          </a:p>
+        </p:txBody>
+      </p:sp>
+      <p:sp>
+        <p:nvSpPr>
+          <p:cNvPr id="84" name="Textfeld 83"/>
+          <p:cNvSpPr txBox="1"/>
+          <p:nvPr/>
+        </p:nvSpPr>
+        <p:spPr>
+          <a:xfrm>
+            <a:off x="6788944" y="914837"/>
+            <a:ext cx="1243946" cy="184666"/>
+          </a:xfrm>
+          <a:prstGeom prst="rect">
+            <a:avLst/>
+          </a:prstGeom>
+          <a:noFill/>
+        </p:spPr>
+        <p:txBody>
+          <a:bodyPr wrap="square" rtlCol="0">
+            <a:spAutoFit/>
+          </a:bodyPr>
+          <a:lstStyle/>
+          <a:p>
+            <a:r>
+              <a:rPr lang="en-GB" sz="600" dirty="0" smtClean="0"/>
+              <a:t>Sensor data of the 8 sensors</a:t>
+            </a:r>
+            <a:endParaRPr lang="en-GB" sz="600" dirty="0"/>
+          </a:p>
+        </p:txBody>
+      </p:sp>
+      <p:sp>
+        <p:nvSpPr>
+          <p:cNvPr id="85" name="Textfeld 84"/>
+          <p:cNvSpPr txBox="1"/>
+          <p:nvPr/>
+        </p:nvSpPr>
+        <p:spPr>
+          <a:xfrm>
+            <a:off x="3631009" y="2322281"/>
+            <a:ext cx="1243946" cy="276999"/>
+          </a:xfrm>
+          <a:prstGeom prst="rect">
+            <a:avLst/>
+          </a:prstGeom>
+          <a:noFill/>
+        </p:spPr>
+        <p:txBody>
+          <a:bodyPr wrap="square" rtlCol="0">
+            <a:spAutoFit/>
+          </a:bodyPr>
+          <a:lstStyle/>
+          <a:p>
+            <a:r>
+              <a:rPr lang="en-GB" sz="600" dirty="0" smtClean="0"/>
+              <a:t>Give direction of travel</a:t>
+            </a:r>
+          </a:p>
+          <a:p>
+            <a:r>
+              <a:rPr lang="en-GB" sz="600" dirty="0" smtClean="0"/>
+              <a:t>stops robot</a:t>
+            </a:r>
+            <a:endParaRPr lang="en-GB" sz="600" dirty="0"/>
+          </a:p>
+        </p:txBody>
+      </p:sp>
+      <p:sp>
+        <p:nvSpPr>
+          <p:cNvPr id="86" name="Textfeld 85"/>
+          <p:cNvSpPr txBox="1"/>
+          <p:nvPr/>
+        </p:nvSpPr>
+        <p:spPr>
+          <a:xfrm>
+            <a:off x="3700914" y="2931463"/>
+            <a:ext cx="1243946" cy="184666"/>
+          </a:xfrm>
+          <a:prstGeom prst="rect">
+            <a:avLst/>
+          </a:prstGeom>
+          <a:noFill/>
+        </p:spPr>
+        <p:txBody>
+          <a:bodyPr wrap="square" rtlCol="0">
+            <a:spAutoFit/>
+          </a:bodyPr>
+          <a:lstStyle/>
+          <a:p>
+            <a:r>
+              <a:rPr lang="en-GB" sz="600" dirty="0" smtClean="0"/>
+              <a:t>Relative direction of the sound</a:t>
+            </a:r>
+            <a:endParaRPr lang="en-GB" sz="600" dirty="0"/>
+          </a:p>
+        </p:txBody>
+      </p:sp>
+      <p:cxnSp>
+        <p:nvCxnSpPr>
+          <p:cNvPr id="87" name="Gewinkelte Verbindung 86"/>
+          <p:cNvCxnSpPr>
+            <a:stCxn id="4" idx="3"/>
+            <a:endCxn id="46" idx="1"/>
+          </p:cNvCxnSpPr>
+          <p:nvPr/>
+        </p:nvCxnSpPr>
+        <p:spPr>
+          <a:xfrm>
+            <a:off x="2259190" y="1508803"/>
+            <a:ext cx="2615899" cy="666317"/>
+          </a:xfrm>
+          <a:prstGeom prst="bentConnector3">
+            <a:avLst>
+              <a:gd name="adj1" fmla="val 65293"/>
+            </a:avLst>
+          </a:prstGeom>
+          <a:ln>
+            <a:tailEnd type="triangle"/>
+          </a:ln>
+        </p:spPr>
+        <p:style>
+          <a:lnRef idx="1">
+            <a:schemeClr val="accent1"/>
+          </a:lnRef>
+          <a:fillRef idx="0">
+            <a:schemeClr val="accent1"/>
+          </a:fillRef>
+          <a:effectRef idx="0">
+            <a:schemeClr val="accent1"/>
+          </a:effectRef>
+          <a:fontRef idx="minor">
+            <a:schemeClr val="tx1"/>
+          </a:fontRef>
+        </p:style>
+      </p:cxnSp>
+      <p:sp>
+        <p:nvSpPr>
+          <p:cNvPr id="96" name="Textfeld 95"/>
+          <p:cNvSpPr txBox="1"/>
+          <p:nvPr/>
+        </p:nvSpPr>
+        <p:spPr>
+          <a:xfrm>
+            <a:off x="2426886" y="1369219"/>
+            <a:ext cx="1243946" cy="276999"/>
+          </a:xfrm>
+          <a:prstGeom prst="rect">
+            <a:avLst/>
+          </a:prstGeom>
+          <a:noFill/>
+        </p:spPr>
+        <p:txBody>
+          <a:bodyPr wrap="square" rtlCol="0">
+            <a:spAutoFit/>
+          </a:bodyPr>
+          <a:lstStyle/>
+          <a:p>
+            <a:r>
+              <a:rPr lang="en-GB" sz="600" dirty="0" smtClean="0"/>
+              <a:t>Gives the </a:t>
+            </a:r>
+            <a:r>
+              <a:rPr lang="en-GB" sz="600" dirty="0" err="1" smtClean="0"/>
+              <a:t>x,y</a:t>
+            </a:r>
+            <a:r>
+              <a:rPr lang="en-GB" sz="600" dirty="0" smtClean="0"/>
+              <a:t>-position</a:t>
+            </a:r>
+          </a:p>
+          <a:p>
+            <a:r>
+              <a:rPr lang="en-GB" sz="600" dirty="0" smtClean="0"/>
+              <a:t>Gives the bearing of the robot</a:t>
+            </a:r>
+            <a:endParaRPr lang="en-GB" sz="600" dirty="0"/>
+          </a:p>
+        </p:txBody>
+      </p:sp>
+      <p:cxnSp>
+        <p:nvCxnSpPr>
+          <p:cNvPr id="102" name="Gewinkelte Verbindung 101"/>
+          <p:cNvCxnSpPr>
+            <a:endCxn id="40" idx="3"/>
+          </p:cNvCxnSpPr>
+          <p:nvPr/>
+        </p:nvCxnSpPr>
+        <p:spPr>
+          <a:xfrm rot="5400000">
+            <a:off x="5214696" y="4283079"/>
+            <a:ext cx="670140" cy="385826"/>
+          </a:xfrm>
+          <a:prstGeom prst="bentConnector2">
+            <a:avLst/>
+          </a:prstGeom>
+          <a:ln>
+            <a:tailEnd type="triangle"/>
+          </a:ln>
+        </p:spPr>
+        <p:style>
+          <a:lnRef idx="1">
+            <a:schemeClr val="accent1"/>
+          </a:lnRef>
+          <a:fillRef idx="0">
+            <a:schemeClr val="accent1"/>
+          </a:fillRef>
+          <a:effectRef idx="0">
+            <a:schemeClr val="accent1"/>
+          </a:effectRef>
+          <a:fontRef idx="minor">
+            <a:schemeClr val="tx1"/>
+          </a:fontRef>
+        </p:style>
+      </p:cxnSp>
+      <p:sp>
+        <p:nvSpPr>
+          <p:cNvPr id="104" name="Textfeld 103"/>
+          <p:cNvSpPr txBox="1"/>
+          <p:nvPr/>
+        </p:nvSpPr>
+        <p:spPr>
+          <a:xfrm>
+            <a:off x="5498706" y="5357624"/>
+            <a:ext cx="1243946" cy="184666"/>
+          </a:xfrm>
+          <a:prstGeom prst="rect">
+            <a:avLst/>
+          </a:prstGeom>
+          <a:noFill/>
+        </p:spPr>
+        <p:txBody>
+          <a:bodyPr wrap="square" rtlCol="0">
+            <a:spAutoFit/>
+          </a:bodyPr>
+          <a:lstStyle/>
+          <a:p>
+            <a:r>
+              <a:rPr lang="en-GB" sz="600" dirty="0" smtClean="0"/>
+              <a:t>gives distance data</a:t>
+            </a:r>
+            <a:endParaRPr lang="en-GB" sz="600" dirty="0"/>
+          </a:p>
+        </p:txBody>
+      </p:sp>
+      <p:cxnSp>
+        <p:nvCxnSpPr>
+          <p:cNvPr id="120" name="Gewinkelte Verbindung 119"/>
+          <p:cNvCxnSpPr>
+            <a:stCxn id="48" idx="3"/>
+            <a:endCxn id="121" idx="1"/>
+          </p:cNvCxnSpPr>
+          <p:nvPr/>
+        </p:nvCxnSpPr>
+        <p:spPr>
+          <a:xfrm>
+            <a:off x="5978956" y="2529063"/>
+            <a:ext cx="983184" cy="124232"/>
+          </a:xfrm>
+          <a:prstGeom prst="bentConnector3">
+            <a:avLst/>
+          </a:prstGeom>
+          <a:ln>
+            <a:tailEnd type="triangle"/>
+          </a:ln>
+        </p:spPr>
+        <p:style>
+          <a:lnRef idx="1">
+            <a:schemeClr val="accent4"/>
+          </a:lnRef>
+          <a:fillRef idx="0">
+            <a:schemeClr val="accent4"/>
+          </a:fillRef>
+          <a:effectRef idx="0">
+            <a:schemeClr val="accent4"/>
+          </a:effectRef>
+          <a:fontRef idx="minor">
+            <a:schemeClr val="tx1"/>
+          </a:fontRef>
+        </p:style>
+      </p:cxnSp>
+      <p:sp>
+        <p:nvSpPr>
+          <p:cNvPr id="121" name="Textfeld 120"/>
+          <p:cNvSpPr txBox="1"/>
+          <p:nvPr/>
+        </p:nvSpPr>
+        <p:spPr>
+          <a:xfrm>
+            <a:off x="6962140" y="2330129"/>
+            <a:ext cx="1466850" cy="646331"/>
+          </a:xfrm>
+          <a:prstGeom prst="rect">
+            <a:avLst/>
+          </a:prstGeom>
+          <a:noFill/>
+        </p:spPr>
+        <p:txBody>
+          <a:bodyPr wrap="square" rtlCol="0">
+            <a:spAutoFit/>
+          </a:bodyPr>
+          <a:lstStyle/>
+          <a:p>
+            <a:r>
+              <a:rPr lang="de-CH" sz="900" dirty="0" smtClean="0"/>
+              <a:t>Travel so </a:t>
+            </a:r>
+            <a:r>
+              <a:rPr lang="de-CH" sz="900" dirty="0" err="1" smtClean="0"/>
+              <a:t>that</a:t>
+            </a:r>
+            <a:r>
+              <a:rPr lang="de-CH" sz="900" dirty="0" smtClean="0"/>
+              <a:t> </a:t>
+            </a:r>
+            <a:r>
+              <a:rPr lang="de-CH" sz="900" dirty="0" err="1" smtClean="0"/>
+              <a:t>the</a:t>
+            </a:r>
+            <a:r>
+              <a:rPr lang="de-CH" sz="900" dirty="0" smtClean="0"/>
+              <a:t> </a:t>
+            </a:r>
+            <a:r>
+              <a:rPr lang="de-CH" sz="900" dirty="0" err="1" smtClean="0"/>
+              <a:t>object</a:t>
+            </a:r>
+            <a:r>
+              <a:rPr lang="de-CH" sz="900" dirty="0" smtClean="0"/>
+              <a:t> </a:t>
+            </a:r>
+            <a:r>
+              <a:rPr lang="de-CH" sz="900" dirty="0" err="1" smtClean="0"/>
+              <a:t>is</a:t>
+            </a:r>
+            <a:r>
+              <a:rPr lang="de-CH" sz="900" dirty="0" smtClean="0"/>
+              <a:t> at +- 90°.</a:t>
+            </a:r>
+          </a:p>
+          <a:p>
+            <a:r>
+              <a:rPr lang="de-CH" sz="900" dirty="0" err="1" smtClean="0"/>
+              <a:t>And</a:t>
+            </a:r>
+            <a:r>
+              <a:rPr lang="de-CH" sz="900" dirty="0" smtClean="0"/>
+              <a:t> </a:t>
+            </a:r>
+            <a:r>
+              <a:rPr lang="de-CH" sz="900" dirty="0" err="1" smtClean="0"/>
+              <a:t>then</a:t>
+            </a:r>
+            <a:r>
+              <a:rPr lang="de-CH" sz="900" dirty="0" smtClean="0"/>
+              <a:t>  in </a:t>
+            </a:r>
+            <a:r>
+              <a:rPr lang="de-CH" sz="900" dirty="0" err="1" smtClean="0"/>
+              <a:t>the</a:t>
+            </a:r>
+            <a:r>
+              <a:rPr lang="de-CH" sz="900" dirty="0" smtClean="0"/>
+              <a:t> </a:t>
+            </a:r>
+            <a:r>
+              <a:rPr lang="de-CH" sz="900" dirty="0" err="1" smtClean="0"/>
+              <a:t>direction</a:t>
+            </a:r>
+            <a:r>
+              <a:rPr lang="de-CH" sz="900" dirty="0" smtClean="0"/>
+              <a:t> </a:t>
+            </a:r>
+            <a:r>
+              <a:rPr lang="de-CH" sz="900" dirty="0" err="1" smtClean="0"/>
+              <a:t>of</a:t>
+            </a:r>
+            <a:r>
+              <a:rPr lang="de-CH" sz="900" dirty="0" smtClean="0"/>
+              <a:t> </a:t>
+            </a:r>
+            <a:r>
+              <a:rPr lang="de-CH" sz="900" dirty="0" err="1" smtClean="0"/>
+              <a:t>free</a:t>
+            </a:r>
+            <a:r>
+              <a:rPr lang="de-CH" sz="900" dirty="0" smtClean="0"/>
+              <a:t> </a:t>
+            </a:r>
+            <a:r>
+              <a:rPr lang="de-CH" sz="900" dirty="0" err="1" smtClean="0"/>
+              <a:t>space</a:t>
+            </a:r>
+            <a:r>
+              <a:rPr lang="de-CH" sz="900" dirty="0" smtClean="0"/>
+              <a:t> </a:t>
+            </a:r>
+            <a:r>
+              <a:rPr lang="de-CH" sz="900" dirty="0" err="1" smtClean="0"/>
+              <a:t>and</a:t>
+            </a:r>
+            <a:r>
+              <a:rPr lang="de-CH" sz="900" dirty="0" smtClean="0"/>
+              <a:t> </a:t>
+            </a:r>
+            <a:r>
+              <a:rPr lang="de-CH" sz="900" dirty="0" err="1" smtClean="0"/>
+              <a:t>sound</a:t>
+            </a:r>
+            <a:endParaRPr lang="de-CH" sz="900" dirty="0"/>
+          </a:p>
+        </p:txBody>
+      </p:sp>
+      <p:sp>
+        <p:nvSpPr>
+          <p:cNvPr id="123" name="Textfeld 122"/>
+          <p:cNvSpPr txBox="1"/>
+          <p:nvPr/>
+        </p:nvSpPr>
+        <p:spPr>
+          <a:xfrm>
+            <a:off x="4322887" y="4143271"/>
+            <a:ext cx="1243946" cy="276999"/>
+          </a:xfrm>
+          <a:prstGeom prst="rect">
+            <a:avLst/>
+          </a:prstGeom>
+          <a:noFill/>
+        </p:spPr>
+        <p:txBody>
+          <a:bodyPr wrap="square" rtlCol="0">
+            <a:spAutoFit/>
+          </a:bodyPr>
+          <a:lstStyle/>
+          <a:p>
+            <a:r>
+              <a:rPr lang="en-GB" sz="600" dirty="0" smtClean="0"/>
+              <a:t>Gives 2 bearing and distances to the next free space. </a:t>
+            </a:r>
+            <a:endParaRPr lang="en-GB" sz="600" dirty="0"/>
+          </a:p>
+        </p:txBody>
+      </p:sp>
+      <p:sp>
+        <p:nvSpPr>
+          <p:cNvPr id="129" name="Textfeld 128"/>
+          <p:cNvSpPr txBox="1"/>
+          <p:nvPr/>
+        </p:nvSpPr>
+        <p:spPr>
+          <a:xfrm>
+            <a:off x="5742679" y="4641785"/>
+            <a:ext cx="1243946" cy="184666"/>
+          </a:xfrm>
+          <a:prstGeom prst="rect">
+            <a:avLst/>
+          </a:prstGeom>
+          <a:noFill/>
+        </p:spPr>
+        <p:txBody>
+          <a:bodyPr wrap="square" rtlCol="0">
+            <a:spAutoFit/>
+          </a:bodyPr>
+          <a:lstStyle/>
+          <a:p>
+            <a:r>
+              <a:rPr lang="en-GB" sz="600" dirty="0" smtClean="0"/>
+              <a:t>Gives bearing of object</a:t>
+            </a:r>
+            <a:endParaRPr lang="en-GB" sz="600" dirty="0"/>
+          </a:p>
+        </p:txBody>
+      </p:sp>
+      <p:sp>
+        <p:nvSpPr>
+          <p:cNvPr id="130" name="Textfeld 129"/>
+          <p:cNvSpPr txBox="1"/>
+          <p:nvPr/>
+        </p:nvSpPr>
+        <p:spPr>
+          <a:xfrm>
+            <a:off x="3631009" y="5064226"/>
+            <a:ext cx="656925" cy="184666"/>
+          </a:xfrm>
+          <a:prstGeom prst="rect">
+            <a:avLst/>
+          </a:prstGeom>
+          <a:noFill/>
+        </p:spPr>
+        <p:txBody>
+          <a:bodyPr wrap="square" rtlCol="0">
+            <a:spAutoFit/>
+          </a:bodyPr>
+          <a:lstStyle/>
+          <a:p>
+            <a:r>
+              <a:rPr lang="en-GB" sz="600" dirty="0" smtClean="0"/>
+              <a:t>Rotates robot</a:t>
+            </a:r>
+            <a:endParaRPr lang="en-GB" sz="600" dirty="0"/>
+          </a:p>
+        </p:txBody>
+      </p:sp>
+      <p:cxnSp>
+        <p:nvCxnSpPr>
+          <p:cNvPr id="132" name="Gewinkelte Verbindung 131"/>
+          <p:cNvCxnSpPr/>
+          <p:nvPr/>
+        </p:nvCxnSpPr>
+        <p:spPr>
+          <a:xfrm rot="5400000" flipH="1" flipV="1">
+            <a:off x="5044868" y="1530044"/>
+            <a:ext cx="623136" cy="420793"/>
+          </a:xfrm>
+          <a:prstGeom prst="bentConnector3">
+            <a:avLst>
+              <a:gd name="adj1" fmla="val 64674"/>
+            </a:avLst>
+          </a:prstGeom>
+          <a:ln>
+            <a:tailEnd type="triangle"/>
+          </a:ln>
+        </p:spPr>
+        <p:style>
+          <a:lnRef idx="1">
+            <a:schemeClr val="accent1"/>
+          </a:lnRef>
+          <a:fillRef idx="0">
+            <a:schemeClr val="accent1"/>
+          </a:fillRef>
+          <a:effectRef idx="0">
+            <a:schemeClr val="accent1"/>
+          </a:effectRef>
+          <a:fontRef idx="minor">
+            <a:schemeClr val="tx1"/>
+          </a:fontRef>
+        </p:style>
+      </p:cxnSp>
+      <p:sp>
+        <p:nvSpPr>
+          <p:cNvPr id="135" name="Textfeld 134"/>
+          <p:cNvSpPr txBox="1"/>
+          <p:nvPr/>
+        </p:nvSpPr>
+        <p:spPr>
+          <a:xfrm>
+            <a:off x="4758125" y="1517815"/>
+            <a:ext cx="778745" cy="276999"/>
+          </a:xfrm>
+          <a:prstGeom prst="rect">
+            <a:avLst/>
+          </a:prstGeom>
+          <a:noFill/>
+        </p:spPr>
+        <p:txBody>
+          <a:bodyPr wrap="square" rtlCol="0">
+            <a:spAutoFit/>
+          </a:bodyPr>
+          <a:lstStyle/>
+          <a:p>
+            <a:r>
+              <a:rPr lang="en-GB" sz="600" dirty="0" smtClean="0"/>
+              <a:t>Release the motors</a:t>
+            </a:r>
+            <a:endParaRPr lang="en-GB" sz="600" dirty="0"/>
           </a:p>
         </p:txBody>
       </p:sp>
@@ -3832,6 +5333,2328 @@
     <p:extLst>
       <p:ext uri="{BB962C8B-B14F-4D97-AF65-F5344CB8AC3E}">
         <p14:creationId xmlns:p14="http://schemas.microsoft.com/office/powerpoint/2010/main" val="3287418416"/>
+      </p:ext>
+    </p:extLst>
+  </p:cSld>
+  <p:clrMapOvr>
+    <a:masterClrMapping/>
+  </p:clrMapOvr>
+</p:sld>
+</file>
+
+<file path=ppt/slides/slide2.xml><?xml version="1.0" encoding="utf-8"?>
+<p:sld xmlns:a="http://schemas.openxmlformats.org/drawingml/2006/main" xmlns:r="http://schemas.openxmlformats.org/officeDocument/2006/relationships" xmlns:p="http://schemas.openxmlformats.org/presentationml/2006/main">
+  <p:cSld>
+    <p:spTree>
+      <p:nvGrpSpPr>
+        <p:cNvPr id="1" name=""/>
+        <p:cNvGrpSpPr/>
+        <p:nvPr/>
+      </p:nvGrpSpPr>
+      <p:grpSpPr>
+        <a:xfrm>
+          <a:off x="0" y="0"/>
+          <a:ext cx="0" cy="0"/>
+          <a:chOff x="0" y="0"/>
+          <a:chExt cx="0" cy="0"/>
+        </a:xfrm>
+      </p:grpSpPr>
+      <p:sp>
+        <p:nvSpPr>
+          <p:cNvPr id="4" name="Textfeld 3"/>
+          <p:cNvSpPr txBox="1"/>
+          <p:nvPr/>
+        </p:nvSpPr>
+        <p:spPr>
+          <a:xfrm>
+            <a:off x="449580" y="259080"/>
+            <a:ext cx="4351020" cy="369332"/>
+          </a:xfrm>
+          <a:prstGeom prst="rect">
+            <a:avLst/>
+          </a:prstGeom>
+          <a:noFill/>
+        </p:spPr>
+        <p:txBody>
+          <a:bodyPr wrap="square" rtlCol="0">
+            <a:spAutoFit/>
+          </a:bodyPr>
+          <a:lstStyle/>
+          <a:p>
+            <a:r>
+              <a:rPr lang="de-CH" dirty="0" smtClean="0"/>
+              <a:t>Sound </a:t>
+            </a:r>
+            <a:r>
+              <a:rPr lang="de-CH" dirty="0" err="1" smtClean="0"/>
+              <a:t>direction</a:t>
+            </a:r>
+            <a:r>
+              <a:rPr lang="de-CH" dirty="0" smtClean="0"/>
+              <a:t> </a:t>
+            </a:r>
+            <a:r>
+              <a:rPr lang="de-CH" dirty="0" err="1" smtClean="0"/>
+              <a:t>detection</a:t>
+            </a:r>
+            <a:r>
+              <a:rPr lang="de-CH" dirty="0" smtClean="0"/>
+              <a:t> </a:t>
+            </a:r>
+            <a:r>
+              <a:rPr lang="de-CH" dirty="0" err="1" smtClean="0"/>
+              <a:t>thread</a:t>
+            </a:r>
+            <a:r>
+              <a:rPr lang="de-CH" dirty="0" smtClean="0"/>
+              <a:t> </a:t>
+            </a:r>
+            <a:r>
+              <a:rPr lang="de-CH" dirty="0" err="1" smtClean="0"/>
+              <a:t>functions</a:t>
+            </a:r>
+            <a:endParaRPr lang="de-CH" dirty="0"/>
+          </a:p>
+        </p:txBody>
+      </p:sp>
+      <p:sp>
+        <p:nvSpPr>
+          <p:cNvPr id="7" name="Textfeld 6"/>
+          <p:cNvSpPr txBox="1"/>
+          <p:nvPr/>
+        </p:nvSpPr>
+        <p:spPr>
+          <a:xfrm>
+            <a:off x="556260" y="940475"/>
+            <a:ext cx="4655820" cy="2585323"/>
+          </a:xfrm>
+          <a:prstGeom prst="rect">
+            <a:avLst/>
+          </a:prstGeom>
+          <a:noFill/>
+          <a:ln>
+            <a:solidFill>
+              <a:schemeClr val="tx1"/>
+            </a:solidFill>
+          </a:ln>
+        </p:spPr>
+        <p:txBody>
+          <a:bodyPr wrap="square" rtlCol="0">
+            <a:spAutoFit/>
+          </a:bodyPr>
+          <a:lstStyle/>
+          <a:p>
+            <a:r>
+              <a:rPr lang="de-CH" dirty="0" err="1" smtClean="0"/>
+              <a:t>processAudioData</a:t>
+            </a:r>
+            <a:r>
+              <a:rPr lang="de-CH" dirty="0" smtClean="0"/>
+              <a:t>:</a:t>
+            </a:r>
+          </a:p>
+          <a:p>
+            <a:r>
+              <a:rPr lang="de-CH" dirty="0" smtClean="0"/>
+              <a:t>+</a:t>
+            </a:r>
+            <a:r>
+              <a:rPr lang="de-CH" dirty="0" err="1" smtClean="0"/>
+              <a:t>relativeAngle</a:t>
+            </a:r>
+            <a:endParaRPr lang="de-CH" dirty="0" smtClean="0"/>
+          </a:p>
+          <a:p>
+            <a:r>
+              <a:rPr lang="de-CH" dirty="0" smtClean="0">
+                <a:solidFill>
+                  <a:srgbClr val="92D050"/>
+                </a:solidFill>
+              </a:rPr>
+              <a:t>-</a:t>
+            </a:r>
+            <a:r>
+              <a:rPr lang="de-CH" dirty="0" err="1" smtClean="0">
+                <a:solidFill>
+                  <a:srgbClr val="92D050"/>
+                </a:solidFill>
+              </a:rPr>
+              <a:t>fills</a:t>
+            </a:r>
+            <a:r>
+              <a:rPr lang="de-CH" dirty="0" smtClean="0">
+                <a:solidFill>
+                  <a:srgbClr val="92D050"/>
+                </a:solidFill>
+              </a:rPr>
+              <a:t> </a:t>
+            </a:r>
+            <a:r>
+              <a:rPr lang="de-CH" dirty="0" err="1" smtClean="0">
+                <a:solidFill>
+                  <a:srgbClr val="92D050"/>
+                </a:solidFill>
+              </a:rPr>
+              <a:t>the</a:t>
+            </a:r>
+            <a:r>
+              <a:rPr lang="de-CH" dirty="0" smtClean="0">
+                <a:solidFill>
+                  <a:srgbClr val="92D050"/>
+                </a:solidFill>
+              </a:rPr>
+              <a:t> </a:t>
+            </a:r>
+            <a:r>
+              <a:rPr lang="de-CH" dirty="0" err="1" smtClean="0">
+                <a:solidFill>
+                  <a:srgbClr val="92D050"/>
+                </a:solidFill>
+              </a:rPr>
+              <a:t>buffer</a:t>
+            </a:r>
+            <a:endParaRPr lang="de-CH" dirty="0" smtClean="0">
+              <a:solidFill>
+                <a:srgbClr val="92D050"/>
+              </a:solidFill>
+            </a:endParaRPr>
+          </a:p>
+          <a:p>
+            <a:r>
+              <a:rPr lang="de-CH" dirty="0" smtClean="0">
+                <a:solidFill>
+                  <a:srgbClr val="92D050"/>
+                </a:solidFill>
+              </a:rPr>
+              <a:t>-</a:t>
+            </a:r>
+            <a:r>
+              <a:rPr lang="de-CH" dirty="0" err="1" smtClean="0">
+                <a:solidFill>
+                  <a:srgbClr val="92D050"/>
+                </a:solidFill>
+              </a:rPr>
+              <a:t>call</a:t>
+            </a:r>
+            <a:r>
+              <a:rPr lang="de-CH" dirty="0" smtClean="0">
+                <a:solidFill>
+                  <a:srgbClr val="92D050"/>
+                </a:solidFill>
+              </a:rPr>
+              <a:t> </a:t>
+            </a:r>
+            <a:r>
+              <a:rPr lang="de-CH" dirty="0" err="1" smtClean="0">
+                <a:solidFill>
+                  <a:srgbClr val="92D050"/>
+                </a:solidFill>
+              </a:rPr>
+              <a:t>fft-function</a:t>
+            </a:r>
+            <a:endParaRPr lang="de-CH" dirty="0" smtClean="0">
+              <a:solidFill>
+                <a:srgbClr val="92D050"/>
+              </a:solidFill>
+            </a:endParaRPr>
+          </a:p>
+          <a:p>
+            <a:r>
+              <a:rPr lang="de-CH" dirty="0" smtClean="0"/>
+              <a:t>-filter out all </a:t>
+            </a:r>
+            <a:r>
+              <a:rPr lang="de-CH" dirty="0" err="1" smtClean="0"/>
+              <a:t>unwanted</a:t>
+            </a:r>
+            <a:r>
+              <a:rPr lang="de-CH" dirty="0" smtClean="0"/>
+              <a:t> </a:t>
+            </a:r>
+            <a:r>
+              <a:rPr lang="de-CH" dirty="0" err="1" smtClean="0"/>
+              <a:t>frequencys</a:t>
+            </a:r>
+            <a:r>
+              <a:rPr lang="de-CH" dirty="0" smtClean="0"/>
+              <a:t> (</a:t>
+            </a:r>
+            <a:r>
+              <a:rPr lang="de-CH" dirty="0" err="1" smtClean="0">
+                <a:solidFill>
+                  <a:srgbClr val="FF0000"/>
+                </a:solidFill>
+              </a:rPr>
+              <a:t>fanny</a:t>
+            </a:r>
+            <a:r>
+              <a:rPr lang="de-CH" dirty="0" smtClean="0"/>
+              <a:t>)</a:t>
+            </a:r>
+          </a:p>
+          <a:p>
+            <a:r>
+              <a:rPr lang="de-CH" dirty="0" smtClean="0"/>
+              <a:t>-</a:t>
+            </a:r>
+            <a:r>
+              <a:rPr lang="de-CH" dirty="0" err="1" smtClean="0"/>
+              <a:t>call</a:t>
+            </a:r>
+            <a:r>
+              <a:rPr lang="de-CH" dirty="0"/>
+              <a:t> </a:t>
+            </a:r>
+            <a:r>
+              <a:rPr lang="de-CH" dirty="0" smtClean="0"/>
+              <a:t>a </a:t>
+            </a:r>
+            <a:r>
+              <a:rPr lang="de-CH" dirty="0" err="1" smtClean="0"/>
+              <a:t>function</a:t>
+            </a:r>
+            <a:r>
+              <a:rPr lang="de-CH" dirty="0" smtClean="0"/>
+              <a:t> </a:t>
+            </a:r>
+            <a:r>
+              <a:rPr lang="de-CH" dirty="0" err="1" smtClean="0"/>
+              <a:t>to</a:t>
+            </a:r>
+            <a:r>
+              <a:rPr lang="de-CH" dirty="0" smtClean="0"/>
+              <a:t> </a:t>
+            </a:r>
+            <a:r>
+              <a:rPr lang="de-CH" dirty="0" err="1" smtClean="0"/>
+              <a:t>calculate</a:t>
+            </a:r>
+            <a:r>
+              <a:rPr lang="de-CH" dirty="0" smtClean="0"/>
+              <a:t> </a:t>
+            </a:r>
+            <a:r>
+              <a:rPr lang="de-CH" dirty="0" err="1" smtClean="0"/>
+              <a:t>phase</a:t>
+            </a:r>
+            <a:r>
+              <a:rPr lang="de-CH" dirty="0" smtClean="0"/>
+              <a:t> </a:t>
+            </a:r>
+            <a:r>
+              <a:rPr lang="de-CH" dirty="0" err="1" smtClean="0"/>
+              <a:t>shift</a:t>
+            </a:r>
+            <a:r>
+              <a:rPr lang="de-CH" dirty="0" smtClean="0"/>
+              <a:t> </a:t>
+            </a:r>
+            <a:r>
+              <a:rPr lang="de-CH" dirty="0" err="1" smtClean="0"/>
+              <a:t>between</a:t>
+            </a:r>
+            <a:r>
+              <a:rPr lang="de-CH" dirty="0" smtClean="0"/>
+              <a:t> </a:t>
+            </a:r>
+            <a:r>
+              <a:rPr lang="de-CH" dirty="0" err="1" smtClean="0"/>
+              <a:t>microphones</a:t>
+            </a:r>
+            <a:endParaRPr lang="de-CH" dirty="0" smtClean="0"/>
+          </a:p>
+          <a:p>
+            <a:r>
+              <a:rPr lang="de-CH" dirty="0" smtClean="0"/>
+              <a:t>-</a:t>
+            </a:r>
+            <a:r>
+              <a:rPr lang="de-CH" dirty="0" err="1" smtClean="0"/>
+              <a:t>call</a:t>
+            </a:r>
+            <a:r>
+              <a:rPr lang="de-CH" dirty="0" smtClean="0"/>
+              <a:t> </a:t>
+            </a:r>
+            <a:r>
+              <a:rPr lang="de-CH" dirty="0" err="1" smtClean="0"/>
+              <a:t>function</a:t>
+            </a:r>
+            <a:r>
+              <a:rPr lang="de-CH" dirty="0" smtClean="0"/>
+              <a:t> </a:t>
+            </a:r>
+            <a:r>
+              <a:rPr lang="de-CH" dirty="0" err="1" smtClean="0"/>
+              <a:t>to</a:t>
+            </a:r>
+            <a:r>
+              <a:rPr lang="de-CH" dirty="0" smtClean="0"/>
+              <a:t> </a:t>
+            </a:r>
+            <a:r>
+              <a:rPr lang="de-CH" dirty="0" err="1" smtClean="0"/>
+              <a:t>calculate</a:t>
+            </a:r>
+            <a:r>
+              <a:rPr lang="de-CH" dirty="0" smtClean="0"/>
+              <a:t> </a:t>
+            </a:r>
+            <a:r>
+              <a:rPr lang="de-CH" dirty="0" err="1" smtClean="0"/>
+              <a:t>the</a:t>
+            </a:r>
+            <a:r>
+              <a:rPr lang="de-CH" dirty="0" smtClean="0"/>
+              <a:t> </a:t>
+            </a:r>
+            <a:r>
+              <a:rPr lang="de-CH" dirty="0" err="1" smtClean="0"/>
+              <a:t>direction</a:t>
+            </a:r>
+            <a:r>
+              <a:rPr lang="de-CH" dirty="0" smtClean="0"/>
+              <a:t> </a:t>
+            </a:r>
+            <a:r>
+              <a:rPr lang="de-CH" dirty="0" err="1" smtClean="0"/>
+              <a:t>of</a:t>
+            </a:r>
+            <a:r>
+              <a:rPr lang="de-CH" dirty="0" smtClean="0"/>
+              <a:t> </a:t>
+            </a:r>
+            <a:r>
+              <a:rPr lang="de-CH" dirty="0" err="1" smtClean="0"/>
+              <a:t>the</a:t>
+            </a:r>
+            <a:r>
+              <a:rPr lang="de-CH" dirty="0" smtClean="0"/>
+              <a:t> </a:t>
+            </a:r>
+            <a:r>
+              <a:rPr lang="de-CH" dirty="0" err="1" smtClean="0"/>
+              <a:t>sound</a:t>
+            </a:r>
+            <a:r>
+              <a:rPr lang="de-CH" dirty="0" smtClean="0"/>
+              <a:t>(</a:t>
+            </a:r>
+            <a:r>
+              <a:rPr lang="de-CH" dirty="0" err="1" smtClean="0"/>
+              <a:t>maybe</a:t>
+            </a:r>
+            <a:r>
+              <a:rPr lang="de-CH" dirty="0" smtClean="0"/>
+              <a:t> </a:t>
+            </a:r>
+            <a:r>
+              <a:rPr lang="de-CH" dirty="0" err="1" smtClean="0"/>
+              <a:t>distance</a:t>
+            </a:r>
+            <a:r>
+              <a:rPr lang="de-CH" dirty="0" smtClean="0"/>
+              <a:t>)</a:t>
+            </a:r>
+            <a:endParaRPr lang="de-CH" dirty="0"/>
+          </a:p>
+        </p:txBody>
+      </p:sp>
+      <p:sp>
+        <p:nvSpPr>
+          <p:cNvPr id="8" name="Textfeld 7"/>
+          <p:cNvSpPr txBox="1"/>
+          <p:nvPr/>
+        </p:nvSpPr>
+        <p:spPr>
+          <a:xfrm>
+            <a:off x="6301740" y="940475"/>
+            <a:ext cx="4732020" cy="1754326"/>
+          </a:xfrm>
+          <a:prstGeom prst="rect">
+            <a:avLst/>
+          </a:prstGeom>
+          <a:noFill/>
+          <a:ln>
+            <a:solidFill>
+              <a:schemeClr val="tx1"/>
+            </a:solidFill>
+          </a:ln>
+        </p:spPr>
+        <p:txBody>
+          <a:bodyPr wrap="square" rtlCol="0">
+            <a:spAutoFit/>
+          </a:bodyPr>
+          <a:lstStyle/>
+          <a:p>
+            <a:r>
+              <a:rPr lang="en-GB" dirty="0" err="1" smtClean="0"/>
+              <a:t>MicrophonePhaseShift</a:t>
+            </a:r>
+            <a:r>
+              <a:rPr lang="en-GB" dirty="0" smtClean="0"/>
+              <a:t> :</a:t>
+            </a:r>
+          </a:p>
+          <a:p>
+            <a:r>
+              <a:rPr lang="en-GB" dirty="0" smtClean="0"/>
+              <a:t>-takes one complex number from the </a:t>
+            </a:r>
+            <a:r>
+              <a:rPr lang="en-GB" dirty="0" err="1" smtClean="0"/>
+              <a:t>fft</a:t>
+            </a:r>
+            <a:r>
+              <a:rPr lang="en-GB" dirty="0" smtClean="0"/>
+              <a:t> calculations of each microphone</a:t>
+            </a:r>
+          </a:p>
+          <a:p>
+            <a:r>
+              <a:rPr lang="en-GB" dirty="0" smtClean="0"/>
+              <a:t>-calculates the Phase between the signals of the microphone</a:t>
+            </a:r>
+          </a:p>
+          <a:p>
+            <a:endParaRPr lang="en-GB" dirty="0"/>
+          </a:p>
+        </p:txBody>
+      </p:sp>
+      <p:sp>
+        <p:nvSpPr>
+          <p:cNvPr id="11" name="Textfeld 10"/>
+          <p:cNvSpPr txBox="1"/>
+          <p:nvPr/>
+        </p:nvSpPr>
+        <p:spPr>
+          <a:xfrm>
+            <a:off x="6301740" y="2979955"/>
+            <a:ext cx="4732020" cy="1200329"/>
+          </a:xfrm>
+          <a:prstGeom prst="rect">
+            <a:avLst/>
+          </a:prstGeom>
+          <a:noFill/>
+          <a:ln>
+            <a:solidFill>
+              <a:schemeClr val="tx1"/>
+            </a:solidFill>
+          </a:ln>
+        </p:spPr>
+        <p:txBody>
+          <a:bodyPr wrap="square" rtlCol="0">
+            <a:spAutoFit/>
+          </a:bodyPr>
+          <a:lstStyle/>
+          <a:p>
+            <a:r>
+              <a:rPr lang="de-CH" dirty="0" err="1" smtClean="0"/>
+              <a:t>CalculateRelativeAngle</a:t>
+            </a:r>
+            <a:endParaRPr lang="de-CH" dirty="0" smtClean="0"/>
+          </a:p>
+          <a:p>
+            <a:r>
+              <a:rPr lang="de-CH" dirty="0" smtClean="0"/>
+              <a:t>-takes </a:t>
+            </a:r>
+            <a:r>
+              <a:rPr lang="de-CH" dirty="0" err="1" smtClean="0"/>
+              <a:t>the</a:t>
+            </a:r>
+            <a:r>
+              <a:rPr lang="de-CH" dirty="0" smtClean="0"/>
+              <a:t> </a:t>
+            </a:r>
+            <a:r>
+              <a:rPr lang="de-CH" dirty="0" err="1" smtClean="0"/>
+              <a:t>phase</a:t>
+            </a:r>
+            <a:r>
+              <a:rPr lang="de-CH" dirty="0" smtClean="0"/>
+              <a:t> </a:t>
+            </a:r>
+            <a:r>
+              <a:rPr lang="de-CH" dirty="0" err="1" smtClean="0"/>
+              <a:t>from</a:t>
+            </a:r>
+            <a:r>
+              <a:rPr lang="de-CH" dirty="0" smtClean="0"/>
+              <a:t> </a:t>
+            </a:r>
+            <a:r>
+              <a:rPr lang="de-CH" dirty="0" err="1" smtClean="0"/>
+              <a:t>each</a:t>
+            </a:r>
+            <a:r>
+              <a:rPr lang="de-CH" dirty="0" smtClean="0"/>
+              <a:t> </a:t>
+            </a:r>
+            <a:r>
+              <a:rPr lang="de-CH" dirty="0" err="1" smtClean="0"/>
+              <a:t>microphone</a:t>
+            </a:r>
+            <a:endParaRPr lang="de-CH" dirty="0" smtClean="0"/>
+          </a:p>
+          <a:p>
+            <a:r>
+              <a:rPr lang="de-CH" dirty="0" smtClean="0"/>
+              <a:t>-</a:t>
+            </a:r>
+            <a:r>
+              <a:rPr lang="de-CH" dirty="0" err="1" smtClean="0"/>
+              <a:t>calculates</a:t>
+            </a:r>
+            <a:r>
+              <a:rPr lang="de-CH" dirty="0" smtClean="0"/>
+              <a:t> angle </a:t>
+            </a:r>
+            <a:r>
+              <a:rPr lang="de-CH" dirty="0" err="1" smtClean="0"/>
+              <a:t>from</a:t>
+            </a:r>
+            <a:r>
+              <a:rPr lang="de-CH" dirty="0" smtClean="0"/>
+              <a:t> </a:t>
+            </a:r>
+            <a:r>
+              <a:rPr lang="de-CH" dirty="0" err="1" smtClean="0"/>
+              <a:t>phaseshift</a:t>
+            </a:r>
+            <a:endParaRPr lang="de-CH" dirty="0" smtClean="0"/>
+          </a:p>
+          <a:p>
+            <a:r>
+              <a:rPr lang="de-CH" dirty="0" smtClean="0"/>
+              <a:t>-(</a:t>
+            </a:r>
+            <a:r>
+              <a:rPr lang="de-CH" dirty="0" err="1" smtClean="0"/>
+              <a:t>maybe</a:t>
+            </a:r>
+            <a:r>
+              <a:rPr lang="de-CH" dirty="0" smtClean="0"/>
+              <a:t> </a:t>
+            </a:r>
+            <a:r>
+              <a:rPr lang="de-CH" dirty="0" err="1" smtClean="0"/>
+              <a:t>distance</a:t>
+            </a:r>
+            <a:r>
+              <a:rPr lang="de-CH" dirty="0" smtClean="0"/>
+              <a:t>)</a:t>
+            </a:r>
+            <a:endParaRPr lang="de-CH" dirty="0"/>
+          </a:p>
+        </p:txBody>
+      </p:sp>
+      <p:sp>
+        <p:nvSpPr>
+          <p:cNvPr id="12" name="Textfeld 11"/>
+          <p:cNvSpPr txBox="1"/>
+          <p:nvPr/>
+        </p:nvSpPr>
+        <p:spPr>
+          <a:xfrm>
+            <a:off x="556260" y="3837861"/>
+            <a:ext cx="2644140" cy="1200329"/>
+          </a:xfrm>
+          <a:prstGeom prst="rect">
+            <a:avLst/>
+          </a:prstGeom>
+          <a:noFill/>
+          <a:ln>
+            <a:solidFill>
+              <a:schemeClr val="tx1"/>
+            </a:solidFill>
+          </a:ln>
+        </p:spPr>
+        <p:txBody>
+          <a:bodyPr wrap="square" rtlCol="0">
+            <a:spAutoFit/>
+          </a:bodyPr>
+          <a:lstStyle/>
+          <a:p>
+            <a:r>
+              <a:rPr lang="de-CH" dirty="0" err="1" smtClean="0"/>
+              <a:t>getRelativeAngle</a:t>
+            </a:r>
+            <a:r>
+              <a:rPr lang="de-CH" dirty="0" smtClean="0"/>
+              <a:t> (</a:t>
+            </a:r>
+            <a:r>
+              <a:rPr lang="de-CH" dirty="0" err="1" smtClean="0">
+                <a:solidFill>
+                  <a:srgbClr val="FF0000"/>
+                </a:solidFill>
+              </a:rPr>
+              <a:t>fanny</a:t>
+            </a:r>
+            <a:r>
+              <a:rPr lang="de-CH" dirty="0" smtClean="0"/>
+              <a:t>):</a:t>
+            </a:r>
+          </a:p>
+          <a:p>
+            <a:r>
+              <a:rPr lang="de-CH" dirty="0" smtClean="0"/>
+              <a:t>-</a:t>
+            </a:r>
+            <a:r>
+              <a:rPr lang="de-CH" dirty="0" err="1" smtClean="0"/>
+              <a:t>gets</a:t>
+            </a:r>
+            <a:r>
+              <a:rPr lang="de-CH" dirty="0" smtClean="0"/>
+              <a:t> </a:t>
+            </a:r>
+            <a:r>
+              <a:rPr lang="de-CH" dirty="0" err="1" smtClean="0"/>
+              <a:t>the</a:t>
+            </a:r>
+            <a:r>
+              <a:rPr lang="de-CH" dirty="0" smtClean="0"/>
+              <a:t> </a:t>
+            </a:r>
+            <a:r>
+              <a:rPr lang="de-CH" dirty="0" err="1" smtClean="0"/>
+              <a:t>calculated</a:t>
+            </a:r>
+            <a:r>
+              <a:rPr lang="de-CH" dirty="0" smtClean="0"/>
+              <a:t> angle </a:t>
+            </a:r>
+            <a:r>
+              <a:rPr lang="de-CH" dirty="0" err="1" smtClean="0"/>
+              <a:t>and</a:t>
+            </a:r>
+            <a:r>
+              <a:rPr lang="de-CH" dirty="0" smtClean="0"/>
+              <a:t> </a:t>
+            </a:r>
+            <a:r>
+              <a:rPr lang="de-CH" dirty="0" err="1" smtClean="0"/>
+              <a:t>gives</a:t>
+            </a:r>
+            <a:r>
+              <a:rPr lang="de-CH" dirty="0" smtClean="0"/>
+              <a:t> </a:t>
+            </a:r>
+            <a:r>
+              <a:rPr lang="de-CH" dirty="0" err="1" smtClean="0"/>
+              <a:t>it</a:t>
+            </a:r>
+            <a:r>
+              <a:rPr lang="de-CH" dirty="0" smtClean="0"/>
+              <a:t> </a:t>
+            </a:r>
+            <a:r>
+              <a:rPr lang="de-CH" dirty="0" err="1" smtClean="0"/>
+              <a:t>to</a:t>
+            </a:r>
+            <a:r>
+              <a:rPr lang="de-CH" dirty="0" smtClean="0"/>
+              <a:t> </a:t>
+            </a:r>
+            <a:r>
+              <a:rPr lang="de-CH" dirty="0" err="1" smtClean="0"/>
+              <a:t>the</a:t>
+            </a:r>
+            <a:r>
+              <a:rPr lang="de-CH" dirty="0" smtClean="0"/>
+              <a:t> </a:t>
+            </a:r>
+            <a:r>
+              <a:rPr lang="de-CH" dirty="0" err="1" smtClean="0"/>
+              <a:t>invoking</a:t>
+            </a:r>
+            <a:r>
+              <a:rPr lang="de-CH" dirty="0" smtClean="0"/>
+              <a:t> </a:t>
+            </a:r>
+            <a:r>
+              <a:rPr lang="de-CH" dirty="0" err="1" smtClean="0"/>
+              <a:t>function</a:t>
+            </a:r>
+            <a:endParaRPr lang="de-CH" dirty="0"/>
+          </a:p>
+        </p:txBody>
+      </p:sp>
+    </p:spTree>
+    <p:extLst>
+      <p:ext uri="{BB962C8B-B14F-4D97-AF65-F5344CB8AC3E}">
+        <p14:creationId xmlns:p14="http://schemas.microsoft.com/office/powerpoint/2010/main" val="2573535053"/>
+      </p:ext>
+    </p:extLst>
+  </p:cSld>
+  <p:clrMapOvr>
+    <a:masterClrMapping/>
+  </p:clrMapOvr>
+</p:sld>
+</file>
+
+<file path=ppt/slides/slide3.xml><?xml version="1.0" encoding="utf-8"?>
+<p:sld xmlns:a="http://schemas.openxmlformats.org/drawingml/2006/main" xmlns:r="http://schemas.openxmlformats.org/officeDocument/2006/relationships" xmlns:p="http://schemas.openxmlformats.org/presentationml/2006/main">
+  <p:cSld>
+    <p:spTree>
+      <p:nvGrpSpPr>
+        <p:cNvPr id="1" name=""/>
+        <p:cNvGrpSpPr/>
+        <p:nvPr/>
+      </p:nvGrpSpPr>
+      <p:grpSpPr>
+        <a:xfrm>
+          <a:off x="0" y="0"/>
+          <a:ext cx="0" cy="0"/>
+          <a:chOff x="0" y="0"/>
+          <a:chExt cx="0" cy="0"/>
+        </a:xfrm>
+      </p:grpSpPr>
+      <p:sp>
+        <p:nvSpPr>
+          <p:cNvPr id="2" name="Titel 1"/>
+          <p:cNvSpPr>
+            <a:spLocks noGrp="1"/>
+          </p:cNvSpPr>
+          <p:nvPr>
+            <p:ph type="title"/>
+          </p:nvPr>
+        </p:nvSpPr>
+        <p:spPr>
+          <a:xfrm>
+            <a:off x="777240" y="800100"/>
+            <a:ext cx="10515600" cy="312420"/>
+          </a:xfrm>
+        </p:spPr>
+        <p:txBody>
+          <a:bodyPr>
+            <a:normAutofit fontScale="90000"/>
+          </a:bodyPr>
+          <a:lstStyle/>
+          <a:p>
+            <a:r>
+              <a:rPr lang="en-GB" sz="1800" b="1" dirty="0" smtClean="0"/>
+              <a:t>IR-</a:t>
+            </a:r>
+            <a:r>
+              <a:rPr lang="en-GB" sz="1800" b="1" dirty="0" err="1" smtClean="0"/>
+              <a:t>Proxysensor</a:t>
+            </a:r>
+            <a:r>
+              <a:rPr lang="en-GB" sz="1800" b="1" dirty="0" smtClean="0"/>
+              <a:t>-thread</a:t>
+            </a:r>
+            <a:endParaRPr lang="de-CH" sz="1800" dirty="0"/>
+          </a:p>
+        </p:txBody>
+      </p:sp>
+      <p:sp>
+        <p:nvSpPr>
+          <p:cNvPr id="4" name="Textfeld 3"/>
+          <p:cNvSpPr txBox="1"/>
+          <p:nvPr/>
+        </p:nvSpPr>
+        <p:spPr>
+          <a:xfrm>
+            <a:off x="777240" y="1394044"/>
+            <a:ext cx="4533357" cy="1754326"/>
+          </a:xfrm>
+          <a:prstGeom prst="rect">
+            <a:avLst/>
+          </a:prstGeom>
+          <a:noFill/>
+          <a:ln>
+            <a:solidFill>
+              <a:schemeClr val="tx1"/>
+            </a:solidFill>
+          </a:ln>
+        </p:spPr>
+        <p:txBody>
+          <a:bodyPr wrap="none" rtlCol="0">
+            <a:spAutoFit/>
+          </a:bodyPr>
+          <a:lstStyle/>
+          <a:p>
+            <a:r>
+              <a:rPr lang="de-CH" dirty="0" smtClean="0"/>
+              <a:t>Thread </a:t>
+            </a:r>
+            <a:r>
+              <a:rPr lang="de-CH" dirty="0" err="1" smtClean="0"/>
+              <a:t>function</a:t>
+            </a:r>
+            <a:r>
+              <a:rPr lang="de-CH" dirty="0" smtClean="0"/>
+              <a:t>:</a:t>
+            </a:r>
+          </a:p>
+          <a:p>
+            <a:r>
+              <a:rPr lang="de-CH" dirty="0" smtClean="0"/>
+              <a:t>-starts </a:t>
+            </a:r>
+            <a:r>
+              <a:rPr lang="de-CH" dirty="0" err="1" smtClean="0"/>
+              <a:t>the</a:t>
+            </a:r>
+            <a:r>
+              <a:rPr lang="de-CH" dirty="0" smtClean="0"/>
+              <a:t> IR-Sensor-</a:t>
+            </a:r>
+            <a:r>
+              <a:rPr lang="de-CH" dirty="0" err="1" smtClean="0"/>
+              <a:t>reading</a:t>
+            </a:r>
+            <a:r>
+              <a:rPr lang="de-CH" dirty="0" smtClean="0"/>
+              <a:t>-thread</a:t>
+            </a:r>
+          </a:p>
+          <a:p>
+            <a:r>
+              <a:rPr lang="de-CH" dirty="0" smtClean="0"/>
+              <a:t>-</a:t>
+            </a:r>
+            <a:r>
+              <a:rPr lang="de-CH" dirty="0" err="1" smtClean="0"/>
+              <a:t>get</a:t>
+            </a:r>
+            <a:r>
+              <a:rPr lang="de-CH" dirty="0" smtClean="0"/>
+              <a:t> </a:t>
+            </a:r>
+            <a:r>
+              <a:rPr lang="de-CH" dirty="0" err="1" smtClean="0"/>
+              <a:t>data</a:t>
+            </a:r>
+            <a:r>
+              <a:rPr lang="de-CH" dirty="0" smtClean="0"/>
+              <a:t> </a:t>
+            </a:r>
+            <a:r>
+              <a:rPr lang="de-CH" dirty="0" err="1" smtClean="0"/>
+              <a:t>from</a:t>
+            </a:r>
+            <a:r>
+              <a:rPr lang="de-CH" dirty="0" smtClean="0"/>
+              <a:t> </a:t>
+            </a:r>
+            <a:r>
+              <a:rPr lang="de-CH" dirty="0" err="1" smtClean="0"/>
+              <a:t>each</a:t>
+            </a:r>
+            <a:r>
+              <a:rPr lang="de-CH" dirty="0" smtClean="0"/>
+              <a:t> </a:t>
+            </a:r>
+            <a:r>
+              <a:rPr lang="de-CH" dirty="0" err="1" smtClean="0"/>
+              <a:t>sensor</a:t>
+            </a:r>
+            <a:endParaRPr lang="de-CH" dirty="0" smtClean="0"/>
+          </a:p>
+          <a:p>
+            <a:r>
+              <a:rPr lang="de-CH" dirty="0" smtClean="0"/>
+              <a:t>-</a:t>
+            </a:r>
+            <a:r>
+              <a:rPr lang="de-CH" dirty="0" err="1" smtClean="0"/>
+              <a:t>calculate</a:t>
+            </a:r>
+            <a:r>
+              <a:rPr lang="de-CH" dirty="0" smtClean="0"/>
+              <a:t> </a:t>
+            </a:r>
+            <a:r>
+              <a:rPr lang="de-CH" dirty="0" err="1" smtClean="0"/>
+              <a:t>if</a:t>
+            </a:r>
+            <a:r>
+              <a:rPr lang="de-CH" dirty="0" smtClean="0"/>
+              <a:t> </a:t>
+            </a:r>
+            <a:r>
+              <a:rPr lang="de-CH" dirty="0" err="1" smtClean="0"/>
+              <a:t>object</a:t>
+            </a:r>
+            <a:r>
+              <a:rPr lang="de-CH" dirty="0" smtClean="0"/>
+              <a:t> </a:t>
+            </a:r>
+            <a:r>
+              <a:rPr lang="de-CH" dirty="0" err="1" smtClean="0"/>
+              <a:t>is</a:t>
+            </a:r>
+            <a:r>
+              <a:rPr lang="de-CH" dirty="0" smtClean="0"/>
+              <a:t> </a:t>
+            </a:r>
+            <a:r>
+              <a:rPr lang="de-CH" dirty="0" err="1" smtClean="0"/>
+              <a:t>present</a:t>
+            </a:r>
+            <a:r>
+              <a:rPr lang="de-CH" dirty="0" smtClean="0"/>
+              <a:t> </a:t>
+            </a:r>
+            <a:r>
+              <a:rPr lang="de-CH" dirty="0" err="1" smtClean="0"/>
+              <a:t>and</a:t>
+            </a:r>
+            <a:r>
+              <a:rPr lang="de-CH" dirty="0" smtClean="0"/>
+              <a:t> </a:t>
+            </a:r>
+            <a:r>
+              <a:rPr lang="de-CH" dirty="0" err="1" smtClean="0"/>
+              <a:t>the</a:t>
+            </a:r>
+            <a:r>
+              <a:rPr lang="de-CH" dirty="0" smtClean="0"/>
+              <a:t> </a:t>
+            </a:r>
+            <a:r>
+              <a:rPr lang="de-CH" dirty="0" err="1" smtClean="0"/>
+              <a:t>direction</a:t>
+            </a:r>
+            <a:endParaRPr lang="de-CH" dirty="0" smtClean="0"/>
+          </a:p>
+          <a:p>
+            <a:r>
+              <a:rPr lang="de-CH" dirty="0" smtClean="0"/>
+              <a:t>-</a:t>
+            </a:r>
+            <a:r>
+              <a:rPr lang="de-CH" dirty="0" err="1" smtClean="0"/>
+              <a:t>stop</a:t>
+            </a:r>
+            <a:r>
+              <a:rPr lang="de-CH" dirty="0" smtClean="0"/>
+              <a:t> </a:t>
+            </a:r>
+            <a:r>
+              <a:rPr lang="de-CH" dirty="0" err="1" smtClean="0"/>
+              <a:t>robot</a:t>
+            </a:r>
+            <a:r>
+              <a:rPr lang="de-CH" dirty="0" smtClean="0"/>
+              <a:t> </a:t>
+            </a:r>
+            <a:r>
+              <a:rPr lang="de-CH" dirty="0" err="1" smtClean="0"/>
+              <a:t>if</a:t>
+            </a:r>
+            <a:r>
+              <a:rPr lang="de-CH" dirty="0" smtClean="0"/>
+              <a:t> </a:t>
+            </a:r>
+            <a:r>
+              <a:rPr lang="de-CH" dirty="0" err="1" smtClean="0"/>
+              <a:t>object</a:t>
+            </a:r>
+            <a:r>
+              <a:rPr lang="de-CH" dirty="0" smtClean="0"/>
+              <a:t> </a:t>
+            </a:r>
+            <a:r>
+              <a:rPr lang="de-CH" dirty="0" err="1" smtClean="0"/>
+              <a:t>is</a:t>
+            </a:r>
+            <a:r>
+              <a:rPr lang="de-CH" dirty="0" smtClean="0"/>
+              <a:t> </a:t>
+            </a:r>
+            <a:r>
+              <a:rPr lang="de-CH" dirty="0" err="1" smtClean="0"/>
+              <a:t>detected</a:t>
+            </a:r>
+            <a:endParaRPr lang="de-CH" dirty="0" smtClean="0"/>
+          </a:p>
+          <a:p>
+            <a:endParaRPr lang="de-CH" dirty="0"/>
+          </a:p>
+        </p:txBody>
+      </p:sp>
+      <p:sp>
+        <p:nvSpPr>
+          <p:cNvPr id="5" name="Textfeld 4"/>
+          <p:cNvSpPr txBox="1"/>
+          <p:nvPr/>
+        </p:nvSpPr>
+        <p:spPr>
+          <a:xfrm>
+            <a:off x="780778" y="3329940"/>
+            <a:ext cx="2667000" cy="923330"/>
+          </a:xfrm>
+          <a:prstGeom prst="rect">
+            <a:avLst/>
+          </a:prstGeom>
+          <a:noFill/>
+          <a:ln>
+            <a:solidFill>
+              <a:schemeClr val="tx1"/>
+            </a:solidFill>
+          </a:ln>
+        </p:spPr>
+        <p:txBody>
+          <a:bodyPr wrap="square" rtlCol="0">
+            <a:spAutoFit/>
+          </a:bodyPr>
+          <a:lstStyle/>
+          <a:p>
+            <a:r>
+              <a:rPr lang="de-CH" dirty="0" err="1" smtClean="0"/>
+              <a:t>getObjectPresence</a:t>
+            </a:r>
+            <a:r>
+              <a:rPr lang="de-CH" dirty="0" smtClean="0"/>
+              <a:t>:</a:t>
+            </a:r>
+          </a:p>
+          <a:p>
+            <a:r>
+              <a:rPr lang="de-CH" dirty="0" smtClean="0"/>
+              <a:t>-</a:t>
+            </a:r>
+            <a:r>
+              <a:rPr lang="de-CH" dirty="0" err="1" smtClean="0"/>
+              <a:t>says</a:t>
+            </a:r>
+            <a:r>
+              <a:rPr lang="de-CH" dirty="0" smtClean="0"/>
+              <a:t> </a:t>
+            </a:r>
+            <a:r>
+              <a:rPr lang="de-CH" dirty="0" err="1" smtClean="0"/>
+              <a:t>if</a:t>
+            </a:r>
+            <a:r>
+              <a:rPr lang="de-CH" dirty="0" smtClean="0"/>
+              <a:t> </a:t>
+            </a:r>
+            <a:r>
+              <a:rPr lang="de-CH" dirty="0" err="1" smtClean="0"/>
+              <a:t>object</a:t>
+            </a:r>
+            <a:r>
+              <a:rPr lang="de-CH" dirty="0" smtClean="0"/>
+              <a:t> </a:t>
+            </a:r>
+            <a:r>
+              <a:rPr lang="de-CH" dirty="0" err="1" smtClean="0"/>
+              <a:t>is</a:t>
+            </a:r>
+            <a:r>
+              <a:rPr lang="de-CH" dirty="0" smtClean="0"/>
+              <a:t> </a:t>
+            </a:r>
+            <a:r>
+              <a:rPr lang="de-CH" dirty="0" err="1" smtClean="0"/>
+              <a:t>present</a:t>
+            </a:r>
+            <a:r>
+              <a:rPr lang="de-CH" dirty="0" smtClean="0"/>
+              <a:t> </a:t>
+            </a:r>
+            <a:r>
+              <a:rPr lang="de-CH" dirty="0" err="1" smtClean="0"/>
+              <a:t>or</a:t>
+            </a:r>
+            <a:r>
+              <a:rPr lang="de-CH" dirty="0" smtClean="0"/>
+              <a:t> not</a:t>
+            </a:r>
+            <a:endParaRPr lang="de-CH" dirty="0"/>
+          </a:p>
+        </p:txBody>
+      </p:sp>
+      <p:sp>
+        <p:nvSpPr>
+          <p:cNvPr id="6" name="Textfeld 5"/>
+          <p:cNvSpPr txBox="1"/>
+          <p:nvPr/>
+        </p:nvSpPr>
+        <p:spPr>
+          <a:xfrm>
+            <a:off x="777240" y="4488180"/>
+            <a:ext cx="2834640" cy="923330"/>
+          </a:xfrm>
+          <a:prstGeom prst="rect">
+            <a:avLst/>
+          </a:prstGeom>
+          <a:noFill/>
+          <a:ln>
+            <a:solidFill>
+              <a:schemeClr val="tx1"/>
+            </a:solidFill>
+          </a:ln>
+        </p:spPr>
+        <p:txBody>
+          <a:bodyPr wrap="square" rtlCol="0">
+            <a:spAutoFit/>
+          </a:bodyPr>
+          <a:lstStyle/>
+          <a:p>
+            <a:r>
+              <a:rPr lang="de-CH" dirty="0" err="1" smtClean="0"/>
+              <a:t>getObjectDirection</a:t>
+            </a:r>
+            <a:r>
+              <a:rPr lang="de-CH" dirty="0" smtClean="0"/>
+              <a:t>(</a:t>
+            </a:r>
+            <a:r>
+              <a:rPr lang="de-CH" dirty="0" err="1" smtClean="0">
+                <a:solidFill>
+                  <a:srgbClr val="FF0000"/>
+                </a:solidFill>
+              </a:rPr>
+              <a:t>fanny</a:t>
+            </a:r>
+            <a:r>
+              <a:rPr lang="de-CH" dirty="0" smtClean="0"/>
+              <a:t>):</a:t>
+            </a:r>
+          </a:p>
+          <a:p>
+            <a:r>
+              <a:rPr lang="de-CH" dirty="0" smtClean="0"/>
+              <a:t>-</a:t>
+            </a:r>
+            <a:r>
+              <a:rPr lang="de-CH" dirty="0" err="1" smtClean="0"/>
+              <a:t>gives</a:t>
+            </a:r>
+            <a:r>
+              <a:rPr lang="de-CH" dirty="0" smtClean="0"/>
+              <a:t> </a:t>
+            </a:r>
+            <a:r>
+              <a:rPr lang="de-CH" dirty="0" err="1" smtClean="0"/>
+              <a:t>you</a:t>
+            </a:r>
+            <a:r>
+              <a:rPr lang="de-CH" dirty="0" smtClean="0"/>
+              <a:t> </a:t>
+            </a:r>
+            <a:r>
+              <a:rPr lang="de-CH" dirty="0" err="1" smtClean="0"/>
+              <a:t>the</a:t>
+            </a:r>
+            <a:r>
+              <a:rPr lang="de-CH" dirty="0" smtClean="0"/>
+              <a:t> </a:t>
+            </a:r>
+            <a:r>
+              <a:rPr lang="de-CH" dirty="0" err="1" smtClean="0"/>
+              <a:t>rough</a:t>
+            </a:r>
+            <a:r>
+              <a:rPr lang="de-CH" dirty="0" smtClean="0"/>
+              <a:t> </a:t>
+            </a:r>
+            <a:r>
+              <a:rPr lang="de-CH" dirty="0" err="1" smtClean="0"/>
+              <a:t>direction</a:t>
+            </a:r>
+            <a:r>
+              <a:rPr lang="de-CH" dirty="0" smtClean="0"/>
+              <a:t> </a:t>
+            </a:r>
+            <a:r>
+              <a:rPr lang="de-CH" dirty="0" err="1" smtClean="0"/>
+              <a:t>of</a:t>
+            </a:r>
+            <a:r>
+              <a:rPr lang="de-CH" dirty="0" smtClean="0"/>
+              <a:t> </a:t>
+            </a:r>
+            <a:r>
+              <a:rPr lang="de-CH" dirty="0" err="1" smtClean="0"/>
+              <a:t>the</a:t>
+            </a:r>
+            <a:r>
+              <a:rPr lang="de-CH" dirty="0" smtClean="0"/>
+              <a:t> </a:t>
+            </a:r>
+            <a:r>
+              <a:rPr lang="de-CH" dirty="0" err="1" smtClean="0"/>
+              <a:t>object</a:t>
+            </a:r>
+            <a:endParaRPr lang="de-CH" dirty="0"/>
+          </a:p>
+        </p:txBody>
+      </p:sp>
+      <p:sp>
+        <p:nvSpPr>
+          <p:cNvPr id="8" name="Textfeld 7"/>
+          <p:cNvSpPr txBox="1"/>
+          <p:nvPr/>
+        </p:nvSpPr>
+        <p:spPr>
+          <a:xfrm>
+            <a:off x="5379720" y="3406140"/>
+            <a:ext cx="2529840" cy="923330"/>
+          </a:xfrm>
+          <a:prstGeom prst="rect">
+            <a:avLst/>
+          </a:prstGeom>
+          <a:noFill/>
+          <a:ln>
+            <a:solidFill>
+              <a:schemeClr val="tx1"/>
+            </a:solidFill>
+          </a:ln>
+        </p:spPr>
+        <p:txBody>
+          <a:bodyPr wrap="square" rtlCol="0">
+            <a:spAutoFit/>
+          </a:bodyPr>
+          <a:lstStyle/>
+          <a:p>
+            <a:r>
+              <a:rPr lang="de-CH" dirty="0" err="1" smtClean="0"/>
+              <a:t>releaseMotors</a:t>
+            </a:r>
+            <a:r>
+              <a:rPr lang="de-CH" dirty="0" smtClean="0"/>
+              <a:t>:</a:t>
+            </a:r>
+          </a:p>
+          <a:p>
+            <a:r>
+              <a:rPr lang="de-CH" dirty="0" smtClean="0"/>
+              <a:t>- Releases </a:t>
+            </a:r>
+            <a:r>
+              <a:rPr lang="de-CH" dirty="0" err="1" smtClean="0"/>
+              <a:t>the</a:t>
+            </a:r>
+            <a:r>
+              <a:rPr lang="de-CH" dirty="0"/>
+              <a:t> </a:t>
+            </a:r>
+            <a:r>
+              <a:rPr lang="de-CH" dirty="0" err="1" smtClean="0"/>
+              <a:t>robot</a:t>
+            </a:r>
+            <a:r>
+              <a:rPr lang="de-CH" dirty="0" smtClean="0"/>
+              <a:t>, so </a:t>
+            </a:r>
+            <a:r>
+              <a:rPr lang="de-CH" dirty="0" err="1" smtClean="0"/>
+              <a:t>it</a:t>
+            </a:r>
+            <a:r>
+              <a:rPr lang="de-CH" dirty="0" smtClean="0"/>
+              <a:t> </a:t>
+            </a:r>
+            <a:r>
+              <a:rPr lang="de-CH" dirty="0" err="1" smtClean="0"/>
+              <a:t>can</a:t>
+            </a:r>
+            <a:r>
+              <a:rPr lang="de-CH" dirty="0" smtClean="0"/>
+              <a:t> </a:t>
+            </a:r>
+            <a:r>
+              <a:rPr lang="de-CH" dirty="0" err="1" smtClean="0"/>
+              <a:t>move</a:t>
+            </a:r>
+            <a:r>
+              <a:rPr lang="de-CH" dirty="0" smtClean="0"/>
+              <a:t> </a:t>
+            </a:r>
+            <a:r>
+              <a:rPr lang="de-CH" dirty="0" err="1" smtClean="0"/>
+              <a:t>again</a:t>
+            </a:r>
+            <a:r>
+              <a:rPr lang="de-CH" dirty="0" smtClean="0"/>
+              <a:t>.</a:t>
+            </a:r>
+            <a:endParaRPr lang="de-CH" dirty="0"/>
+          </a:p>
+        </p:txBody>
+      </p:sp>
+    </p:spTree>
+    <p:extLst>
+      <p:ext uri="{BB962C8B-B14F-4D97-AF65-F5344CB8AC3E}">
+        <p14:creationId xmlns:p14="http://schemas.microsoft.com/office/powerpoint/2010/main" val="2783955317"/>
+      </p:ext>
+    </p:extLst>
+  </p:cSld>
+  <p:clrMapOvr>
+    <a:masterClrMapping/>
+  </p:clrMapOvr>
+</p:sld>
+</file>
+
+<file path=ppt/slides/slide4.xml><?xml version="1.0" encoding="utf-8"?>
+<p:sld xmlns:a="http://schemas.openxmlformats.org/drawingml/2006/main" xmlns:r="http://schemas.openxmlformats.org/officeDocument/2006/relationships" xmlns:p="http://schemas.openxmlformats.org/presentationml/2006/main">
+  <p:cSld>
+    <p:spTree>
+      <p:nvGrpSpPr>
+        <p:cNvPr id="1" name=""/>
+        <p:cNvGrpSpPr/>
+        <p:nvPr/>
+      </p:nvGrpSpPr>
+      <p:grpSpPr>
+        <a:xfrm>
+          <a:off x="0" y="0"/>
+          <a:ext cx="0" cy="0"/>
+          <a:chOff x="0" y="0"/>
+          <a:chExt cx="0" cy="0"/>
+        </a:xfrm>
+      </p:grpSpPr>
+      <p:sp>
+        <p:nvSpPr>
+          <p:cNvPr id="4" name="Textfeld 3"/>
+          <p:cNvSpPr txBox="1"/>
+          <p:nvPr/>
+        </p:nvSpPr>
+        <p:spPr>
+          <a:xfrm>
+            <a:off x="472440" y="320040"/>
+            <a:ext cx="2903220" cy="369332"/>
+          </a:xfrm>
+          <a:prstGeom prst="rect">
+            <a:avLst/>
+          </a:prstGeom>
+          <a:noFill/>
+        </p:spPr>
+        <p:txBody>
+          <a:bodyPr wrap="square" rtlCol="0">
+            <a:spAutoFit/>
+          </a:bodyPr>
+          <a:lstStyle/>
+          <a:p>
+            <a:r>
+              <a:rPr lang="de-CH" dirty="0" smtClean="0"/>
+              <a:t>Motor-thread</a:t>
+            </a:r>
+            <a:endParaRPr lang="de-CH" dirty="0"/>
+          </a:p>
+        </p:txBody>
+      </p:sp>
+      <p:sp>
+        <p:nvSpPr>
+          <p:cNvPr id="5" name="Textfeld 4"/>
+          <p:cNvSpPr txBox="1"/>
+          <p:nvPr/>
+        </p:nvSpPr>
+        <p:spPr>
+          <a:xfrm>
+            <a:off x="556260" y="754380"/>
+            <a:ext cx="4320540" cy="2862322"/>
+          </a:xfrm>
+          <a:prstGeom prst="rect">
+            <a:avLst/>
+          </a:prstGeom>
+          <a:noFill/>
+          <a:ln>
+            <a:solidFill>
+              <a:schemeClr val="tx1"/>
+            </a:solidFill>
+          </a:ln>
+        </p:spPr>
+        <p:txBody>
+          <a:bodyPr wrap="square" rtlCol="0">
+            <a:spAutoFit/>
+          </a:bodyPr>
+          <a:lstStyle/>
+          <a:p>
+            <a:r>
+              <a:rPr lang="de-CH" dirty="0" smtClean="0"/>
+              <a:t>Motor-thread </a:t>
+            </a:r>
+            <a:r>
+              <a:rPr lang="de-CH" dirty="0" err="1" smtClean="0"/>
+              <a:t>function</a:t>
+            </a:r>
+            <a:r>
+              <a:rPr lang="de-CH" dirty="0" smtClean="0"/>
+              <a:t>:</a:t>
+            </a:r>
+          </a:p>
+          <a:p>
+            <a:r>
+              <a:rPr lang="de-CH" dirty="0" smtClean="0"/>
+              <a:t>+x-</a:t>
+            </a:r>
+            <a:r>
+              <a:rPr lang="de-CH" dirty="0" err="1" smtClean="0"/>
+              <a:t>position,y</a:t>
+            </a:r>
+            <a:r>
+              <a:rPr lang="de-CH" dirty="0" smtClean="0"/>
+              <a:t>-position, </a:t>
+            </a:r>
+            <a:r>
+              <a:rPr lang="de-CH" dirty="0" err="1" smtClean="0"/>
+              <a:t>phi</a:t>
+            </a:r>
+            <a:r>
+              <a:rPr lang="de-CH" dirty="0" smtClean="0"/>
+              <a:t>-variable</a:t>
+            </a:r>
+          </a:p>
+          <a:p>
+            <a:r>
+              <a:rPr lang="de-CH" dirty="0" smtClean="0"/>
+              <a:t>-</a:t>
+            </a:r>
+            <a:r>
+              <a:rPr lang="de-CH" dirty="0" err="1" smtClean="0"/>
+              <a:t>is</a:t>
+            </a:r>
+            <a:r>
+              <a:rPr lang="de-CH" dirty="0" smtClean="0"/>
+              <a:t> a </a:t>
+            </a:r>
+            <a:r>
+              <a:rPr lang="de-CH" dirty="0" err="1" smtClean="0"/>
+              <a:t>regulator</a:t>
+            </a:r>
+            <a:r>
+              <a:rPr lang="de-CH" dirty="0" smtClean="0"/>
+              <a:t>(PI)</a:t>
+            </a:r>
+          </a:p>
+          <a:p>
+            <a:r>
+              <a:rPr lang="de-CH" dirty="0" smtClean="0"/>
+              <a:t>-</a:t>
+            </a:r>
+            <a:r>
+              <a:rPr lang="de-CH" dirty="0" err="1" smtClean="0"/>
+              <a:t>init</a:t>
+            </a:r>
+            <a:r>
+              <a:rPr lang="de-CH" dirty="0" smtClean="0"/>
+              <a:t> </a:t>
+            </a:r>
+            <a:r>
+              <a:rPr lang="de-CH" dirty="0" err="1" smtClean="0"/>
+              <a:t>motors</a:t>
+            </a:r>
+            <a:endParaRPr lang="de-CH" dirty="0" smtClean="0"/>
+          </a:p>
+          <a:p>
+            <a:r>
+              <a:rPr lang="de-CH" dirty="0" smtClean="0"/>
+              <a:t>-</a:t>
+            </a:r>
+            <a:r>
+              <a:rPr lang="de-CH" dirty="0" err="1" smtClean="0"/>
+              <a:t>calls</a:t>
+            </a:r>
+            <a:r>
+              <a:rPr lang="de-CH" dirty="0" smtClean="0"/>
+              <a:t> </a:t>
+            </a:r>
+            <a:r>
+              <a:rPr lang="de-CH" dirty="0" err="1" smtClean="0"/>
+              <a:t>function</a:t>
+            </a:r>
+            <a:r>
+              <a:rPr lang="de-CH" dirty="0" smtClean="0"/>
+              <a:t> </a:t>
+            </a:r>
+            <a:r>
+              <a:rPr lang="de-CH" dirty="0" err="1" smtClean="0"/>
+              <a:t>to</a:t>
+            </a:r>
+            <a:r>
+              <a:rPr lang="de-CH" dirty="0" smtClean="0"/>
+              <a:t> </a:t>
+            </a:r>
+            <a:r>
+              <a:rPr lang="de-CH" dirty="0" err="1" smtClean="0"/>
+              <a:t>calculate</a:t>
+            </a:r>
+            <a:r>
+              <a:rPr lang="de-CH" dirty="0" smtClean="0"/>
+              <a:t> Orientation</a:t>
+            </a:r>
+          </a:p>
+          <a:p>
+            <a:r>
+              <a:rPr lang="de-CH" dirty="0" smtClean="0"/>
+              <a:t>-</a:t>
+            </a:r>
+            <a:r>
+              <a:rPr lang="de-CH" dirty="0" err="1" smtClean="0"/>
+              <a:t>calls</a:t>
+            </a:r>
+            <a:r>
+              <a:rPr lang="de-CH" dirty="0" smtClean="0"/>
+              <a:t> </a:t>
+            </a:r>
+            <a:r>
+              <a:rPr lang="de-CH" dirty="0" err="1" smtClean="0"/>
+              <a:t>function</a:t>
+            </a:r>
+            <a:r>
+              <a:rPr lang="de-CH" dirty="0" smtClean="0"/>
+              <a:t> </a:t>
+            </a:r>
+            <a:r>
+              <a:rPr lang="de-CH" dirty="0" err="1" smtClean="0"/>
+              <a:t>to</a:t>
+            </a:r>
+            <a:r>
+              <a:rPr lang="de-CH" dirty="0" smtClean="0"/>
+              <a:t> </a:t>
+            </a:r>
+            <a:r>
+              <a:rPr lang="de-CH" dirty="0" err="1" smtClean="0"/>
+              <a:t>calculate</a:t>
+            </a:r>
+            <a:r>
+              <a:rPr lang="de-CH" dirty="0" smtClean="0"/>
+              <a:t> </a:t>
+            </a:r>
+            <a:r>
+              <a:rPr lang="de-CH" dirty="0" err="1" smtClean="0"/>
+              <a:t>x,y</a:t>
+            </a:r>
+            <a:r>
+              <a:rPr lang="de-CH" dirty="0" smtClean="0"/>
+              <a:t> </a:t>
+            </a:r>
+            <a:r>
+              <a:rPr lang="de-CH" dirty="0" err="1" smtClean="0"/>
+              <a:t>position</a:t>
+            </a:r>
+            <a:endParaRPr lang="de-CH" dirty="0" smtClean="0"/>
+          </a:p>
+          <a:p>
+            <a:r>
+              <a:rPr lang="de-CH" dirty="0" smtClean="0"/>
+              <a:t>-</a:t>
+            </a:r>
+            <a:r>
+              <a:rPr lang="de-CH" dirty="0" err="1" smtClean="0"/>
+              <a:t>regulate</a:t>
+            </a:r>
+            <a:r>
+              <a:rPr lang="de-CH" dirty="0" smtClean="0"/>
+              <a:t> </a:t>
+            </a:r>
+            <a:r>
+              <a:rPr lang="de-CH" dirty="0" err="1" smtClean="0"/>
+              <a:t>bearing</a:t>
+            </a:r>
+            <a:r>
+              <a:rPr lang="de-CH" dirty="0" smtClean="0"/>
+              <a:t>, so </a:t>
+            </a:r>
+            <a:r>
+              <a:rPr lang="de-CH" dirty="0" err="1" smtClean="0"/>
+              <a:t>robot</a:t>
+            </a:r>
+            <a:r>
+              <a:rPr lang="de-CH" dirty="0" smtClean="0"/>
+              <a:t> </a:t>
+            </a:r>
+            <a:r>
+              <a:rPr lang="de-CH" dirty="0" err="1" smtClean="0"/>
+              <a:t>points</a:t>
+            </a:r>
+            <a:r>
+              <a:rPr lang="de-CH" dirty="0" smtClean="0"/>
+              <a:t> in </a:t>
+            </a:r>
+            <a:r>
+              <a:rPr lang="de-CH" dirty="0" err="1" smtClean="0"/>
+              <a:t>the</a:t>
+            </a:r>
+            <a:r>
+              <a:rPr lang="de-CH" dirty="0" smtClean="0"/>
+              <a:t> </a:t>
+            </a:r>
+            <a:r>
+              <a:rPr lang="de-CH" dirty="0" err="1" smtClean="0"/>
+              <a:t>desired</a:t>
+            </a:r>
+            <a:r>
+              <a:rPr lang="de-CH" dirty="0" smtClean="0"/>
+              <a:t> </a:t>
+            </a:r>
+            <a:r>
+              <a:rPr lang="de-CH" dirty="0" err="1" smtClean="0"/>
+              <a:t>bearing</a:t>
+            </a:r>
+            <a:endParaRPr lang="de-CH" dirty="0" smtClean="0"/>
+          </a:p>
+          <a:p>
+            <a:r>
+              <a:rPr lang="de-CH" dirty="0" smtClean="0"/>
+              <a:t>-sets </a:t>
+            </a:r>
+            <a:r>
+              <a:rPr lang="de-CH" dirty="0" err="1" smtClean="0"/>
+              <a:t>motor</a:t>
+            </a:r>
+            <a:r>
+              <a:rPr lang="de-CH" dirty="0" smtClean="0"/>
+              <a:t> </a:t>
+            </a:r>
+            <a:r>
+              <a:rPr lang="de-CH" dirty="0" err="1" smtClean="0"/>
+              <a:t>speed</a:t>
+            </a:r>
+            <a:r>
+              <a:rPr lang="de-CH" dirty="0" smtClean="0"/>
+              <a:t> </a:t>
+            </a:r>
+            <a:r>
+              <a:rPr lang="de-CH" dirty="0" err="1" smtClean="0"/>
+              <a:t>to</a:t>
+            </a:r>
+            <a:r>
+              <a:rPr lang="de-CH" dirty="0" smtClean="0"/>
+              <a:t> </a:t>
+            </a:r>
+            <a:r>
+              <a:rPr lang="de-CH" dirty="0" err="1" smtClean="0"/>
+              <a:t>get</a:t>
+            </a:r>
+            <a:r>
+              <a:rPr lang="de-CH" dirty="0" smtClean="0"/>
+              <a:t> </a:t>
+            </a:r>
+            <a:r>
+              <a:rPr lang="de-CH" dirty="0" err="1" smtClean="0"/>
+              <a:t>desired</a:t>
+            </a:r>
+            <a:r>
+              <a:rPr lang="de-CH" dirty="0" smtClean="0"/>
+              <a:t> </a:t>
+            </a:r>
+            <a:r>
+              <a:rPr lang="de-CH" dirty="0" err="1" smtClean="0"/>
+              <a:t>orientation</a:t>
+            </a:r>
+            <a:endParaRPr lang="de-CH" dirty="0" smtClean="0"/>
+          </a:p>
+          <a:p>
+            <a:endParaRPr lang="de-CH" dirty="0"/>
+          </a:p>
+        </p:txBody>
+      </p:sp>
+      <p:sp>
+        <p:nvSpPr>
+          <p:cNvPr id="6" name="Textfeld 5"/>
+          <p:cNvSpPr txBox="1"/>
+          <p:nvPr/>
+        </p:nvSpPr>
+        <p:spPr>
+          <a:xfrm>
+            <a:off x="6172200" y="763787"/>
+            <a:ext cx="3093720" cy="923330"/>
+          </a:xfrm>
+          <a:prstGeom prst="rect">
+            <a:avLst/>
+          </a:prstGeom>
+          <a:noFill/>
+          <a:ln>
+            <a:solidFill>
+              <a:schemeClr val="tx1"/>
+            </a:solidFill>
+          </a:ln>
+        </p:spPr>
+        <p:txBody>
+          <a:bodyPr wrap="square" rtlCol="0">
+            <a:spAutoFit/>
+          </a:bodyPr>
+          <a:lstStyle/>
+          <a:p>
+            <a:r>
+              <a:rPr lang="de-CH" dirty="0" err="1" smtClean="0"/>
+              <a:t>calculateBearing</a:t>
+            </a:r>
+            <a:r>
+              <a:rPr lang="de-CH" dirty="0" smtClean="0"/>
+              <a:t>:</a:t>
+            </a:r>
+          </a:p>
+          <a:p>
+            <a:r>
+              <a:rPr lang="de-CH" dirty="0" smtClean="0"/>
+              <a:t>-takes </a:t>
+            </a:r>
+            <a:r>
+              <a:rPr lang="de-CH" dirty="0" err="1" smtClean="0"/>
+              <a:t>motor</a:t>
+            </a:r>
+            <a:r>
+              <a:rPr lang="de-CH" dirty="0" smtClean="0"/>
+              <a:t> </a:t>
+            </a:r>
+            <a:r>
+              <a:rPr lang="de-CH" dirty="0" err="1" smtClean="0"/>
+              <a:t>steps</a:t>
+            </a:r>
+            <a:r>
+              <a:rPr lang="de-CH" dirty="0" smtClean="0"/>
+              <a:t> </a:t>
+            </a:r>
+          </a:p>
+          <a:p>
+            <a:r>
+              <a:rPr lang="de-CH" dirty="0" smtClean="0"/>
+              <a:t>-</a:t>
+            </a:r>
+            <a:r>
+              <a:rPr lang="de-CH" dirty="0" err="1" smtClean="0"/>
+              <a:t>calculates</a:t>
+            </a:r>
+            <a:r>
+              <a:rPr lang="de-CH" dirty="0" smtClean="0"/>
+              <a:t> </a:t>
+            </a:r>
+            <a:r>
+              <a:rPr lang="de-CH" dirty="0" err="1" smtClean="0"/>
+              <a:t>current</a:t>
+            </a:r>
+            <a:r>
+              <a:rPr lang="de-CH" dirty="0" smtClean="0"/>
+              <a:t> </a:t>
+            </a:r>
+            <a:r>
+              <a:rPr lang="de-CH" dirty="0" err="1" smtClean="0"/>
+              <a:t>bearing</a:t>
+            </a:r>
+            <a:endParaRPr lang="de-CH" dirty="0"/>
+          </a:p>
+        </p:txBody>
+      </p:sp>
+      <p:sp>
+        <p:nvSpPr>
+          <p:cNvPr id="7" name="Textfeld 6"/>
+          <p:cNvSpPr txBox="1"/>
+          <p:nvPr/>
+        </p:nvSpPr>
+        <p:spPr>
+          <a:xfrm>
+            <a:off x="6172200" y="1922712"/>
+            <a:ext cx="2895600" cy="1200329"/>
+          </a:xfrm>
+          <a:prstGeom prst="rect">
+            <a:avLst/>
+          </a:prstGeom>
+          <a:noFill/>
+          <a:ln>
+            <a:solidFill>
+              <a:schemeClr val="tx1"/>
+            </a:solidFill>
+          </a:ln>
+        </p:spPr>
+        <p:txBody>
+          <a:bodyPr wrap="square" rtlCol="0">
+            <a:spAutoFit/>
+          </a:bodyPr>
+          <a:lstStyle/>
+          <a:p>
+            <a:r>
+              <a:rPr lang="de-CH" dirty="0" err="1" smtClean="0"/>
+              <a:t>calculateXYPosition</a:t>
+            </a:r>
+            <a:r>
+              <a:rPr lang="de-CH" dirty="0" smtClean="0"/>
+              <a:t>:</a:t>
+            </a:r>
+          </a:p>
+          <a:p>
+            <a:r>
+              <a:rPr lang="de-CH" dirty="0" smtClean="0"/>
+              <a:t>-takes </a:t>
+            </a:r>
+            <a:r>
+              <a:rPr lang="de-CH" dirty="0" err="1" smtClean="0"/>
+              <a:t>motorsteps</a:t>
+            </a:r>
+            <a:endParaRPr lang="de-CH" dirty="0" smtClean="0"/>
+          </a:p>
+          <a:p>
+            <a:r>
+              <a:rPr lang="de-CH" dirty="0" smtClean="0"/>
+              <a:t>-</a:t>
+            </a:r>
+            <a:r>
+              <a:rPr lang="de-CH" dirty="0" err="1" smtClean="0"/>
+              <a:t>calculates</a:t>
+            </a:r>
+            <a:r>
+              <a:rPr lang="de-CH" dirty="0" smtClean="0"/>
+              <a:t> </a:t>
+            </a:r>
+            <a:r>
+              <a:rPr lang="de-CH" dirty="0" err="1" smtClean="0"/>
+              <a:t>x,y</a:t>
+            </a:r>
+            <a:r>
+              <a:rPr lang="de-CH" dirty="0" smtClean="0"/>
+              <a:t>-Position</a:t>
+            </a:r>
+          </a:p>
+          <a:p>
+            <a:endParaRPr lang="de-CH" dirty="0"/>
+          </a:p>
+        </p:txBody>
+      </p:sp>
+      <p:sp>
+        <p:nvSpPr>
+          <p:cNvPr id="8" name="Textfeld 7"/>
+          <p:cNvSpPr txBox="1"/>
+          <p:nvPr/>
+        </p:nvSpPr>
+        <p:spPr>
+          <a:xfrm>
+            <a:off x="556260" y="4995982"/>
+            <a:ext cx="3253740" cy="923330"/>
+          </a:xfrm>
+          <a:prstGeom prst="rect">
+            <a:avLst/>
+          </a:prstGeom>
+          <a:noFill/>
+          <a:ln>
+            <a:solidFill>
+              <a:schemeClr val="tx1"/>
+            </a:solidFill>
+          </a:ln>
+        </p:spPr>
+        <p:txBody>
+          <a:bodyPr wrap="square" rtlCol="0">
+            <a:spAutoFit/>
+          </a:bodyPr>
+          <a:lstStyle/>
+          <a:p>
+            <a:r>
+              <a:rPr lang="de-CH" dirty="0" err="1" smtClean="0"/>
+              <a:t>isAllowedToDrive</a:t>
+            </a:r>
+            <a:r>
+              <a:rPr lang="de-CH" dirty="0" smtClean="0"/>
+              <a:t>:</a:t>
+            </a:r>
+          </a:p>
+          <a:p>
+            <a:r>
+              <a:rPr lang="de-CH" dirty="0" smtClean="0"/>
+              <a:t>-</a:t>
+            </a:r>
+            <a:r>
+              <a:rPr lang="de-CH" dirty="0" err="1" smtClean="0"/>
+              <a:t>lets</a:t>
+            </a:r>
+            <a:r>
+              <a:rPr lang="de-CH" dirty="0"/>
+              <a:t> </a:t>
+            </a:r>
+            <a:r>
+              <a:rPr lang="de-CH" dirty="0" err="1" smtClean="0"/>
+              <a:t>functions</a:t>
+            </a:r>
+            <a:r>
+              <a:rPr lang="de-CH" dirty="0" smtClean="0"/>
+              <a:t> </a:t>
+            </a:r>
+            <a:r>
+              <a:rPr lang="de-CH" dirty="0" err="1" smtClean="0"/>
+              <a:t>enable</a:t>
+            </a:r>
+            <a:r>
+              <a:rPr lang="de-CH" dirty="0" smtClean="0"/>
+              <a:t> </a:t>
+            </a:r>
+            <a:r>
+              <a:rPr lang="de-CH" dirty="0" err="1" smtClean="0"/>
+              <a:t>or</a:t>
+            </a:r>
+            <a:r>
+              <a:rPr lang="de-CH" dirty="0" smtClean="0"/>
+              <a:t> </a:t>
+            </a:r>
+            <a:r>
+              <a:rPr lang="de-CH" dirty="0" err="1" smtClean="0"/>
+              <a:t>disable</a:t>
+            </a:r>
+            <a:r>
+              <a:rPr lang="de-CH" dirty="0" smtClean="0"/>
+              <a:t> </a:t>
+            </a:r>
+            <a:r>
+              <a:rPr lang="de-CH" dirty="0" err="1" smtClean="0"/>
+              <a:t>forward</a:t>
+            </a:r>
+            <a:r>
+              <a:rPr lang="de-CH" dirty="0" smtClean="0"/>
+              <a:t> </a:t>
+            </a:r>
+            <a:r>
+              <a:rPr lang="de-CH" dirty="0" err="1" smtClean="0"/>
+              <a:t>driving</a:t>
+            </a:r>
+            <a:endParaRPr lang="de-CH" dirty="0"/>
+          </a:p>
+        </p:txBody>
+      </p:sp>
+      <p:sp>
+        <p:nvSpPr>
+          <p:cNvPr id="9" name="Textfeld 8"/>
+          <p:cNvSpPr txBox="1"/>
+          <p:nvPr/>
+        </p:nvSpPr>
+        <p:spPr>
+          <a:xfrm>
+            <a:off x="556260" y="3872746"/>
+            <a:ext cx="2712720" cy="923330"/>
+          </a:xfrm>
+          <a:prstGeom prst="rect">
+            <a:avLst/>
+          </a:prstGeom>
+          <a:noFill/>
+          <a:ln>
+            <a:solidFill>
+              <a:schemeClr val="tx1"/>
+            </a:solidFill>
+          </a:ln>
+        </p:spPr>
+        <p:txBody>
+          <a:bodyPr wrap="square" rtlCol="0">
+            <a:spAutoFit/>
+          </a:bodyPr>
+          <a:lstStyle/>
+          <a:p>
+            <a:r>
+              <a:rPr lang="de-CH" dirty="0" err="1" smtClean="0"/>
+              <a:t>setDesiredBearing</a:t>
+            </a:r>
+            <a:r>
+              <a:rPr lang="de-CH" dirty="0" smtClean="0"/>
+              <a:t>(</a:t>
+            </a:r>
+            <a:r>
+              <a:rPr lang="de-CH" dirty="0" err="1" smtClean="0">
+                <a:solidFill>
+                  <a:srgbClr val="FF0000"/>
+                </a:solidFill>
+              </a:rPr>
+              <a:t>fanny</a:t>
+            </a:r>
+            <a:r>
+              <a:rPr lang="de-CH" dirty="0" smtClean="0"/>
+              <a:t>):</a:t>
+            </a:r>
+          </a:p>
+          <a:p>
+            <a:r>
+              <a:rPr lang="de-CH" dirty="0" smtClean="0"/>
+              <a:t>-</a:t>
+            </a:r>
+            <a:r>
+              <a:rPr lang="de-CH" dirty="0" err="1" smtClean="0"/>
+              <a:t>lets</a:t>
+            </a:r>
+            <a:r>
+              <a:rPr lang="de-CH" dirty="0" smtClean="0"/>
+              <a:t> </a:t>
+            </a:r>
+            <a:r>
+              <a:rPr lang="de-CH" dirty="0" err="1" smtClean="0"/>
+              <a:t>functions</a:t>
+            </a:r>
+            <a:r>
+              <a:rPr lang="de-CH" dirty="0" smtClean="0"/>
+              <a:t> </a:t>
+            </a:r>
+            <a:r>
+              <a:rPr lang="de-CH" dirty="0" err="1" smtClean="0"/>
+              <a:t>set</a:t>
+            </a:r>
+            <a:r>
+              <a:rPr lang="de-CH" dirty="0" smtClean="0"/>
+              <a:t> </a:t>
+            </a:r>
+            <a:r>
+              <a:rPr lang="de-CH" dirty="0" err="1" smtClean="0"/>
+              <a:t>the</a:t>
+            </a:r>
+            <a:r>
+              <a:rPr lang="de-CH" dirty="0" smtClean="0"/>
+              <a:t> </a:t>
+            </a:r>
+            <a:r>
+              <a:rPr lang="de-CH" dirty="0" err="1" smtClean="0"/>
+              <a:t>desiredBearing</a:t>
+            </a:r>
+            <a:endParaRPr lang="de-CH" dirty="0"/>
+          </a:p>
+        </p:txBody>
+      </p:sp>
+      <p:sp>
+        <p:nvSpPr>
+          <p:cNvPr id="10" name="Textfeld 9"/>
+          <p:cNvSpPr txBox="1"/>
+          <p:nvPr/>
+        </p:nvSpPr>
+        <p:spPr>
+          <a:xfrm>
+            <a:off x="6172200" y="3351223"/>
+            <a:ext cx="2895600" cy="646331"/>
+          </a:xfrm>
+          <a:prstGeom prst="rect">
+            <a:avLst/>
+          </a:prstGeom>
+          <a:noFill/>
+          <a:ln>
+            <a:solidFill>
+              <a:schemeClr val="tx1"/>
+            </a:solidFill>
+          </a:ln>
+        </p:spPr>
+        <p:txBody>
+          <a:bodyPr wrap="square" rtlCol="0">
+            <a:spAutoFit/>
+          </a:bodyPr>
+          <a:lstStyle/>
+          <a:p>
+            <a:r>
+              <a:rPr lang="de-CH" dirty="0" err="1" smtClean="0"/>
+              <a:t>getXPosition</a:t>
+            </a:r>
+            <a:r>
+              <a:rPr lang="de-CH" dirty="0"/>
+              <a:t>(</a:t>
+            </a:r>
+            <a:r>
+              <a:rPr lang="de-CH" dirty="0" err="1">
+                <a:solidFill>
+                  <a:srgbClr val="FF0000"/>
+                </a:solidFill>
+              </a:rPr>
+              <a:t>fanny</a:t>
+            </a:r>
+            <a:r>
+              <a:rPr lang="de-CH" dirty="0"/>
+              <a:t>):</a:t>
+            </a:r>
+            <a:endParaRPr lang="de-CH" dirty="0" smtClean="0"/>
+          </a:p>
+          <a:p>
+            <a:r>
+              <a:rPr lang="de-CH" dirty="0" smtClean="0"/>
+              <a:t>-</a:t>
+            </a:r>
+            <a:r>
+              <a:rPr lang="de-CH" dirty="0" err="1" smtClean="0"/>
+              <a:t>gives</a:t>
+            </a:r>
+            <a:r>
+              <a:rPr lang="de-CH" dirty="0" smtClean="0"/>
+              <a:t> x-Position </a:t>
+            </a:r>
+            <a:r>
+              <a:rPr lang="de-CH" dirty="0" err="1" smtClean="0"/>
+              <a:t>of</a:t>
+            </a:r>
+            <a:r>
+              <a:rPr lang="de-CH" dirty="0" smtClean="0"/>
+              <a:t> </a:t>
+            </a:r>
+            <a:r>
+              <a:rPr lang="de-CH" dirty="0" err="1" smtClean="0"/>
+              <a:t>robot</a:t>
+            </a:r>
+            <a:endParaRPr lang="de-CH" dirty="0"/>
+          </a:p>
+        </p:txBody>
+      </p:sp>
+      <p:sp>
+        <p:nvSpPr>
+          <p:cNvPr id="11" name="Textfeld 10"/>
+          <p:cNvSpPr txBox="1"/>
+          <p:nvPr/>
+        </p:nvSpPr>
+        <p:spPr>
+          <a:xfrm>
+            <a:off x="6172200" y="4134922"/>
+            <a:ext cx="2895600" cy="646331"/>
+          </a:xfrm>
+          <a:prstGeom prst="rect">
+            <a:avLst/>
+          </a:prstGeom>
+          <a:noFill/>
+          <a:ln>
+            <a:solidFill>
+              <a:schemeClr val="tx1"/>
+            </a:solidFill>
+          </a:ln>
+        </p:spPr>
+        <p:txBody>
+          <a:bodyPr wrap="square" rtlCol="0">
+            <a:spAutoFit/>
+          </a:bodyPr>
+          <a:lstStyle/>
+          <a:p>
+            <a:r>
+              <a:rPr lang="de-CH" dirty="0" err="1" smtClean="0"/>
+              <a:t>getYPosition</a:t>
+            </a:r>
+            <a:r>
+              <a:rPr lang="de-CH" dirty="0"/>
+              <a:t>(</a:t>
+            </a:r>
+            <a:r>
+              <a:rPr lang="de-CH" dirty="0" err="1">
+                <a:solidFill>
+                  <a:srgbClr val="FF0000"/>
+                </a:solidFill>
+              </a:rPr>
+              <a:t>fanny</a:t>
+            </a:r>
+            <a:r>
+              <a:rPr lang="de-CH" dirty="0"/>
+              <a:t>):</a:t>
+            </a:r>
+            <a:r>
+              <a:rPr lang="de-CH" dirty="0" smtClean="0"/>
+              <a:t>:</a:t>
+            </a:r>
+          </a:p>
+          <a:p>
+            <a:r>
+              <a:rPr lang="de-CH" dirty="0" smtClean="0"/>
+              <a:t>-</a:t>
+            </a:r>
+            <a:r>
+              <a:rPr lang="de-CH" dirty="0" err="1" smtClean="0"/>
+              <a:t>gives</a:t>
+            </a:r>
+            <a:r>
+              <a:rPr lang="de-CH" dirty="0" smtClean="0"/>
+              <a:t> y-Position </a:t>
+            </a:r>
+            <a:r>
+              <a:rPr lang="de-CH" dirty="0" err="1" smtClean="0"/>
+              <a:t>of</a:t>
+            </a:r>
+            <a:r>
+              <a:rPr lang="de-CH" dirty="0" smtClean="0"/>
+              <a:t> </a:t>
+            </a:r>
+            <a:r>
+              <a:rPr lang="de-CH" dirty="0" err="1" smtClean="0"/>
+              <a:t>robot</a:t>
+            </a:r>
+            <a:endParaRPr lang="de-CH" dirty="0"/>
+          </a:p>
+        </p:txBody>
+      </p:sp>
+      <p:sp>
+        <p:nvSpPr>
+          <p:cNvPr id="12" name="Textfeld 11"/>
+          <p:cNvSpPr txBox="1"/>
+          <p:nvPr/>
+        </p:nvSpPr>
+        <p:spPr>
+          <a:xfrm>
+            <a:off x="6172200" y="5016848"/>
+            <a:ext cx="2895600" cy="646331"/>
+          </a:xfrm>
+          <a:prstGeom prst="rect">
+            <a:avLst/>
+          </a:prstGeom>
+          <a:noFill/>
+          <a:ln>
+            <a:solidFill>
+              <a:schemeClr val="tx1"/>
+            </a:solidFill>
+          </a:ln>
+        </p:spPr>
+        <p:txBody>
+          <a:bodyPr wrap="square" rtlCol="0">
+            <a:spAutoFit/>
+          </a:bodyPr>
+          <a:lstStyle/>
+          <a:p>
+            <a:r>
+              <a:rPr lang="de-CH" dirty="0" err="1" smtClean="0"/>
+              <a:t>getBearing</a:t>
+            </a:r>
+            <a:r>
+              <a:rPr lang="de-CH" dirty="0"/>
+              <a:t>(</a:t>
+            </a:r>
+            <a:r>
+              <a:rPr lang="de-CH" dirty="0" err="1">
+                <a:solidFill>
+                  <a:srgbClr val="FF0000"/>
+                </a:solidFill>
+              </a:rPr>
+              <a:t>fanny</a:t>
+            </a:r>
+            <a:r>
+              <a:rPr lang="de-CH" dirty="0" smtClean="0"/>
+              <a:t>):</a:t>
+            </a:r>
+          </a:p>
+          <a:p>
+            <a:r>
+              <a:rPr lang="de-CH" dirty="0" smtClean="0"/>
+              <a:t>-</a:t>
+            </a:r>
+            <a:r>
+              <a:rPr lang="de-CH" dirty="0" err="1" smtClean="0"/>
+              <a:t>gives</a:t>
+            </a:r>
+            <a:r>
+              <a:rPr lang="de-CH" dirty="0" smtClean="0"/>
+              <a:t> </a:t>
+            </a:r>
+            <a:r>
+              <a:rPr lang="de-CH" dirty="0" err="1" smtClean="0"/>
+              <a:t>bearing</a:t>
+            </a:r>
+            <a:r>
+              <a:rPr lang="de-CH" dirty="0" smtClean="0"/>
+              <a:t>(</a:t>
+            </a:r>
+            <a:r>
+              <a:rPr lang="de-CH" dirty="0" err="1" smtClean="0"/>
+              <a:t>phi</a:t>
+            </a:r>
+            <a:r>
+              <a:rPr lang="de-CH" dirty="0" smtClean="0"/>
+              <a:t>) </a:t>
+            </a:r>
+            <a:r>
+              <a:rPr lang="de-CH" dirty="0" err="1" smtClean="0"/>
+              <a:t>of</a:t>
+            </a:r>
+            <a:r>
+              <a:rPr lang="de-CH" dirty="0" smtClean="0"/>
+              <a:t> </a:t>
+            </a:r>
+            <a:r>
+              <a:rPr lang="de-CH" dirty="0" err="1" smtClean="0"/>
+              <a:t>robot</a:t>
+            </a:r>
+            <a:endParaRPr lang="de-CH" dirty="0"/>
+          </a:p>
+        </p:txBody>
+      </p:sp>
+    </p:spTree>
+    <p:extLst>
+      <p:ext uri="{BB962C8B-B14F-4D97-AF65-F5344CB8AC3E}">
+        <p14:creationId xmlns:p14="http://schemas.microsoft.com/office/powerpoint/2010/main" val="1188510734"/>
       </p:ext>
     </p:extLst>
   </p:cSld>

</xml_diff>

<commit_message>
finalized the overview how the programm works
</commit_message>
<xml_diff>
--- a/ProjectDescribtions/MicroinformaticProgrammDescribtion.pptx
+++ b/ProjectDescribtions/MicroinformaticProgrammDescribtion.pptx
@@ -9,6 +9,8 @@
     <p:sldId id="257" r:id="rId3"/>
     <p:sldId id="258" r:id="rId4"/>
     <p:sldId id="259" r:id="rId5"/>
+    <p:sldId id="260" r:id="rId6"/>
+    <p:sldId id="261" r:id="rId7"/>
   </p:sldIdLst>
   <p:sldSz cx="12192000" cy="6858000"/>
   <p:notesSz cx="6858000" cy="9144000"/>
@@ -246,7 +248,7 @@
           <a:p>
             <a:fld id="{4B81FC2C-06AA-4CA1-9EDF-0E3D25B84E21}" type="datetimeFigureOut">
               <a:rPr lang="de-CH" smtClean="0"/>
-              <a:t>09.04.2020</a:t>
+              <a:t>23.04.2020</a:t>
             </a:fld>
             <a:endParaRPr lang="de-CH"/>
           </a:p>
@@ -416,7 +418,7 @@
           <a:p>
             <a:fld id="{4B81FC2C-06AA-4CA1-9EDF-0E3D25B84E21}" type="datetimeFigureOut">
               <a:rPr lang="de-CH" smtClean="0"/>
-              <a:t>09.04.2020</a:t>
+              <a:t>23.04.2020</a:t>
             </a:fld>
             <a:endParaRPr lang="de-CH"/>
           </a:p>
@@ -596,7 +598,7 @@
           <a:p>
             <a:fld id="{4B81FC2C-06AA-4CA1-9EDF-0E3D25B84E21}" type="datetimeFigureOut">
               <a:rPr lang="de-CH" smtClean="0"/>
-              <a:t>09.04.2020</a:t>
+              <a:t>23.04.2020</a:t>
             </a:fld>
             <a:endParaRPr lang="de-CH"/>
           </a:p>
@@ -766,7 +768,7 @@
           <a:p>
             <a:fld id="{4B81FC2C-06AA-4CA1-9EDF-0E3D25B84E21}" type="datetimeFigureOut">
               <a:rPr lang="de-CH" smtClean="0"/>
-              <a:t>09.04.2020</a:t>
+              <a:t>23.04.2020</a:t>
             </a:fld>
             <a:endParaRPr lang="de-CH"/>
           </a:p>
@@ -1012,7 +1014,7 @@
           <a:p>
             <a:fld id="{4B81FC2C-06AA-4CA1-9EDF-0E3D25B84E21}" type="datetimeFigureOut">
               <a:rPr lang="de-CH" smtClean="0"/>
-              <a:t>09.04.2020</a:t>
+              <a:t>23.04.2020</a:t>
             </a:fld>
             <a:endParaRPr lang="de-CH"/>
           </a:p>
@@ -1244,7 +1246,7 @@
           <a:p>
             <a:fld id="{4B81FC2C-06AA-4CA1-9EDF-0E3D25B84E21}" type="datetimeFigureOut">
               <a:rPr lang="de-CH" smtClean="0"/>
-              <a:t>09.04.2020</a:t>
+              <a:t>23.04.2020</a:t>
             </a:fld>
             <a:endParaRPr lang="de-CH"/>
           </a:p>
@@ -1611,7 +1613,7 @@
           <a:p>
             <a:fld id="{4B81FC2C-06AA-4CA1-9EDF-0E3D25B84E21}" type="datetimeFigureOut">
               <a:rPr lang="de-CH" smtClean="0"/>
-              <a:t>09.04.2020</a:t>
+              <a:t>23.04.2020</a:t>
             </a:fld>
             <a:endParaRPr lang="de-CH"/>
           </a:p>
@@ -1729,7 +1731,7 @@
           <a:p>
             <a:fld id="{4B81FC2C-06AA-4CA1-9EDF-0E3D25B84E21}" type="datetimeFigureOut">
               <a:rPr lang="de-CH" smtClean="0"/>
-              <a:t>09.04.2020</a:t>
+              <a:t>23.04.2020</a:t>
             </a:fld>
             <a:endParaRPr lang="de-CH"/>
           </a:p>
@@ -1824,7 +1826,7 @@
           <a:p>
             <a:fld id="{4B81FC2C-06AA-4CA1-9EDF-0E3D25B84E21}" type="datetimeFigureOut">
               <a:rPr lang="de-CH" smtClean="0"/>
-              <a:t>09.04.2020</a:t>
+              <a:t>23.04.2020</a:t>
             </a:fld>
             <a:endParaRPr lang="de-CH"/>
           </a:p>
@@ -2101,7 +2103,7 @@
           <a:p>
             <a:fld id="{4B81FC2C-06AA-4CA1-9EDF-0E3D25B84E21}" type="datetimeFigureOut">
               <a:rPr lang="de-CH" smtClean="0"/>
-              <a:t>09.04.2020</a:t>
+              <a:t>23.04.2020</a:t>
             </a:fld>
             <a:endParaRPr lang="de-CH"/>
           </a:p>
@@ -2354,7 +2356,7 @@
           <a:p>
             <a:fld id="{4B81FC2C-06AA-4CA1-9EDF-0E3D25B84E21}" type="datetimeFigureOut">
               <a:rPr lang="de-CH" smtClean="0"/>
-              <a:t>09.04.2020</a:t>
+              <a:t>23.04.2020</a:t>
             </a:fld>
             <a:endParaRPr lang="de-CH"/>
           </a:p>
@@ -2567,7 +2569,7 @@
           <a:p>
             <a:fld id="{4B81FC2C-06AA-4CA1-9EDF-0E3D25B84E21}" type="datetimeFigureOut">
               <a:rPr lang="de-CH" smtClean="0"/>
-              <a:t>09.04.2020</a:t>
+              <a:t>23.04.2020</a:t>
             </a:fld>
             <a:endParaRPr lang="de-CH"/>
           </a:p>
@@ -3530,11 +3532,7 @@
             <a:p>
               <a:r>
                 <a:rPr lang="en-GB" sz="1000" b="1" dirty="0" smtClean="0"/>
-                <a:t>Sound direction </a:t>
-              </a:r>
-              <a:r>
-                <a:rPr lang="en-GB" sz="1000" b="1" dirty="0" smtClean="0"/>
-                <a:t>detection-thread</a:t>
+                <a:t>Sound direction detection-thread</a:t>
               </a:r>
               <a:endParaRPr lang="en-GB" sz="1000" b="1" dirty="0"/>
             </a:p>
@@ -3722,11 +3720,7 @@
             <a:p>
               <a:r>
                 <a:rPr lang="en-GB" sz="1000" b="1" dirty="0" smtClean="0"/>
-                <a:t>Free direction </a:t>
-              </a:r>
-              <a:r>
-                <a:rPr lang="en-GB" sz="1000" b="1" dirty="0" smtClean="0"/>
-                <a:t>detection-thread</a:t>
+                <a:t>Free direction detection-thread</a:t>
               </a:r>
               <a:endParaRPr lang="en-GB" sz="1000" b="1" dirty="0"/>
             </a:p>
@@ -4673,11 +4667,7 @@
           <a:p>
             <a:r>
               <a:rPr lang="en-GB" sz="800" dirty="0" smtClean="0"/>
-              <a:t>Decide if treasure </a:t>
-            </a:r>
-            <a:r>
-              <a:rPr lang="en-GB" sz="800" dirty="0" smtClean="0"/>
-              <a:t>was found</a:t>
+              <a:t>Decide if treasure was found</a:t>
             </a:r>
             <a:endParaRPr lang="en-GB" sz="800" dirty="0"/>
           </a:p>
@@ -4801,7 +4791,7 @@
         </p:nvSpPr>
         <p:spPr>
           <a:xfrm>
-            <a:off x="3631009" y="2322281"/>
+            <a:off x="3631009" y="2381633"/>
             <a:ext cx="1243946" cy="276999"/>
           </a:xfrm>
           <a:prstGeom prst="rect">
@@ -4837,8 +4827,8 @@
         </p:nvSpPr>
         <p:spPr>
           <a:xfrm>
-            <a:off x="3700914" y="2931463"/>
-            <a:ext cx="1243946" cy="184666"/>
+            <a:off x="3390120" y="2924286"/>
+            <a:ext cx="1243946" cy="276999"/>
           </a:xfrm>
           <a:prstGeom prst="rect">
             <a:avLst/>
@@ -4853,7 +4843,15 @@
           <a:p>
             <a:r>
               <a:rPr lang="en-GB" sz="600" dirty="0" smtClean="0"/>
-              <a:t>Relative direction of the sound</a:t>
+              <a:t>Relative direction of the </a:t>
+            </a:r>
+            <a:r>
+              <a:rPr lang="en-GB" sz="600" dirty="0" smtClean="0"/>
+              <a:t>sound and </a:t>
+            </a:r>
+            <a:r>
+              <a:rPr lang="en-GB" sz="600" dirty="0" err="1" smtClean="0"/>
+              <a:t>soundlevel</a:t>
             </a:r>
             <a:endParaRPr lang="en-GB" sz="600" dirty="0"/>
           </a:p>
@@ -5198,7 +5196,11 @@
           <a:p>
             <a:r>
               <a:rPr lang="en-GB" sz="600" dirty="0" smtClean="0"/>
-              <a:t>Gives 2 bearing and distances to the next free space. </a:t>
+              <a:t>Gives 2 </a:t>
+            </a:r>
+            <a:r>
+              <a:rPr lang="en-GB" sz="600" dirty="0" smtClean="0"/>
+              <a:t>bearings of the direction  where no obstacle is present. </a:t>
             </a:r>
             <a:endParaRPr lang="en-GB" sz="600" dirty="0"/>
           </a:p>
@@ -5213,7 +5215,7 @@
         <p:spPr>
           <a:xfrm>
             <a:off x="5742679" y="4641785"/>
-            <a:ext cx="1243946" cy="184666"/>
+            <a:ext cx="1243946" cy="276999"/>
           </a:xfrm>
           <a:prstGeom prst="rect">
             <a:avLst/>
@@ -5228,7 +5230,7 @@
           <a:p>
             <a:r>
               <a:rPr lang="en-GB" sz="600" dirty="0" smtClean="0"/>
-              <a:t>Gives bearing of object</a:t>
+              <a:t>Sets scanning range and give command to start scanning</a:t>
             </a:r>
             <a:endParaRPr lang="en-GB" sz="600" dirty="0"/>
           </a:p>
@@ -6082,6 +6084,71 @@
           </a:p>
         </p:txBody>
       </p:sp>
+      <p:sp>
+        <p:nvSpPr>
+          <p:cNvPr id="9" name="Textfeld 8"/>
+          <p:cNvSpPr txBox="1"/>
+          <p:nvPr/>
+        </p:nvSpPr>
+        <p:spPr>
+          <a:xfrm>
+            <a:off x="556260" y="5370494"/>
+            <a:ext cx="2971800" cy="646331"/>
+          </a:xfrm>
+          <a:prstGeom prst="rect">
+            <a:avLst/>
+          </a:prstGeom>
+          <a:noFill/>
+          <a:ln>
+            <a:solidFill>
+              <a:schemeClr val="tx1"/>
+            </a:solidFill>
+          </a:ln>
+        </p:spPr>
+        <p:txBody>
+          <a:bodyPr wrap="square" rtlCol="0">
+            <a:spAutoFit/>
+          </a:bodyPr>
+          <a:lstStyle/>
+          <a:p>
+            <a:r>
+              <a:rPr lang="de-CH" dirty="0" err="1" smtClean="0"/>
+              <a:t>getAveragedSoundLevel</a:t>
+            </a:r>
+            <a:r>
+              <a:rPr lang="de-CH" dirty="0" smtClean="0"/>
+              <a:t>:</a:t>
+            </a:r>
+          </a:p>
+          <a:p>
+            <a:r>
+              <a:rPr lang="de-CH" dirty="0" smtClean="0"/>
+              <a:t>-returns </a:t>
+            </a:r>
+            <a:r>
+              <a:rPr lang="de-CH" dirty="0" err="1" smtClean="0"/>
+              <a:t>averaged</a:t>
+            </a:r>
+            <a:r>
+              <a:rPr lang="de-CH" dirty="0" smtClean="0"/>
+              <a:t> </a:t>
+            </a:r>
+            <a:r>
+              <a:rPr lang="de-CH" dirty="0" err="1" smtClean="0"/>
+              <a:t>sound</a:t>
+            </a:r>
+            <a:r>
+              <a:rPr lang="de-CH" dirty="0" smtClean="0"/>
+              <a:t> </a:t>
+            </a:r>
+            <a:r>
+              <a:rPr lang="de-CH" dirty="0" err="1" smtClean="0"/>
+              <a:t>level</a:t>
+            </a:r>
+            <a:endParaRPr lang="de-CH" dirty="0"/>
+          </a:p>
+        </p:txBody>
+      </p:sp>
     </p:spTree>
     <p:extLst>
       <p:ext uri="{BB962C8B-B14F-4D97-AF65-F5344CB8AC3E}">
@@ -7655,6 +7722,1045 @@
     <p:extLst>
       <p:ext uri="{BB962C8B-B14F-4D97-AF65-F5344CB8AC3E}">
         <p14:creationId xmlns:p14="http://schemas.microsoft.com/office/powerpoint/2010/main" val="1188510734"/>
+      </p:ext>
+    </p:extLst>
+  </p:cSld>
+  <p:clrMapOvr>
+    <a:masterClrMapping/>
+  </p:clrMapOvr>
+</p:sld>
+</file>
+
+<file path=ppt/slides/slide5.xml><?xml version="1.0" encoding="utf-8"?>
+<p:sld xmlns:a="http://schemas.openxmlformats.org/drawingml/2006/main" xmlns:r="http://schemas.openxmlformats.org/officeDocument/2006/relationships" xmlns:p="http://schemas.openxmlformats.org/presentationml/2006/main">
+  <p:cSld>
+    <p:spTree>
+      <p:nvGrpSpPr>
+        <p:cNvPr id="1" name=""/>
+        <p:cNvGrpSpPr/>
+        <p:nvPr/>
+      </p:nvGrpSpPr>
+      <p:grpSpPr>
+        <a:xfrm>
+          <a:off x="0" y="0"/>
+          <a:ext cx="0" cy="0"/>
+          <a:chOff x="0" y="0"/>
+          <a:chExt cx="0" cy="0"/>
+        </a:xfrm>
+      </p:grpSpPr>
+      <p:sp>
+        <p:nvSpPr>
+          <p:cNvPr id="4" name="Textfeld 3"/>
+          <p:cNvSpPr txBox="1"/>
+          <p:nvPr/>
+        </p:nvSpPr>
+        <p:spPr>
+          <a:xfrm>
+            <a:off x="472439" y="320040"/>
+            <a:ext cx="3349917" cy="369332"/>
+          </a:xfrm>
+          <a:prstGeom prst="rect">
+            <a:avLst/>
+          </a:prstGeom>
+          <a:noFill/>
+        </p:spPr>
+        <p:txBody>
+          <a:bodyPr wrap="square" rtlCol="0">
+            <a:spAutoFit/>
+          </a:bodyPr>
+          <a:lstStyle/>
+          <a:p>
+            <a:r>
+              <a:rPr lang="de-CH" dirty="0" smtClean="0"/>
+              <a:t>Free-</a:t>
+            </a:r>
+            <a:r>
+              <a:rPr lang="de-CH" dirty="0" err="1" smtClean="0"/>
+              <a:t>direction</a:t>
+            </a:r>
+            <a:r>
+              <a:rPr lang="de-CH" dirty="0" smtClean="0"/>
+              <a:t> </a:t>
+            </a:r>
+            <a:r>
+              <a:rPr lang="de-CH" dirty="0" err="1" smtClean="0"/>
+              <a:t>detection</a:t>
+            </a:r>
+            <a:r>
+              <a:rPr lang="de-CH" dirty="0" smtClean="0"/>
+              <a:t> </a:t>
+            </a:r>
+            <a:r>
+              <a:rPr lang="de-CH" dirty="0" err="1" smtClean="0"/>
+              <a:t>thread</a:t>
+            </a:r>
+            <a:endParaRPr lang="de-CH" dirty="0"/>
+          </a:p>
+        </p:txBody>
+      </p:sp>
+      <p:sp>
+        <p:nvSpPr>
+          <p:cNvPr id="5" name="Textfeld 4"/>
+          <p:cNvSpPr txBox="1"/>
+          <p:nvPr/>
+        </p:nvSpPr>
+        <p:spPr>
+          <a:xfrm>
+            <a:off x="556260" y="754380"/>
+            <a:ext cx="4320540" cy="2585323"/>
+          </a:xfrm>
+          <a:prstGeom prst="rect">
+            <a:avLst/>
+          </a:prstGeom>
+          <a:noFill/>
+          <a:ln>
+            <a:solidFill>
+              <a:schemeClr val="tx1"/>
+            </a:solidFill>
+          </a:ln>
+        </p:spPr>
+        <p:txBody>
+          <a:bodyPr wrap="square" rtlCol="0">
+            <a:spAutoFit/>
+          </a:bodyPr>
+          <a:lstStyle/>
+          <a:p>
+            <a:r>
+              <a:rPr lang="de-CH" dirty="0" err="1" smtClean="0"/>
+              <a:t>Detection</a:t>
+            </a:r>
+            <a:r>
+              <a:rPr lang="de-CH" dirty="0" smtClean="0"/>
+              <a:t> </a:t>
+            </a:r>
+            <a:r>
+              <a:rPr lang="de-CH" dirty="0" err="1" smtClean="0"/>
+              <a:t>thread</a:t>
+            </a:r>
+            <a:r>
+              <a:rPr lang="de-CH" dirty="0" smtClean="0"/>
+              <a:t>:</a:t>
+            </a:r>
+          </a:p>
+          <a:p>
+            <a:r>
+              <a:rPr lang="de-CH" dirty="0" smtClean="0"/>
+              <a:t>-scans </a:t>
+            </a:r>
+            <a:r>
+              <a:rPr lang="de-CH" dirty="0" err="1" smtClean="0"/>
+              <a:t>from</a:t>
+            </a:r>
+            <a:r>
+              <a:rPr lang="de-CH" dirty="0" smtClean="0"/>
+              <a:t> </a:t>
+            </a:r>
+            <a:r>
+              <a:rPr lang="de-CH" dirty="0" err="1" smtClean="0"/>
+              <a:t>one</a:t>
+            </a:r>
+            <a:r>
+              <a:rPr lang="de-CH" dirty="0" smtClean="0"/>
+              <a:t> </a:t>
+            </a:r>
+            <a:r>
+              <a:rPr lang="de-CH" dirty="0" err="1" smtClean="0"/>
+              <a:t>bearing</a:t>
+            </a:r>
+            <a:r>
+              <a:rPr lang="de-CH" dirty="0" smtClean="0"/>
+              <a:t> </a:t>
+            </a:r>
+            <a:r>
+              <a:rPr lang="de-CH" dirty="0" err="1" smtClean="0"/>
+              <a:t>to</a:t>
+            </a:r>
+            <a:r>
+              <a:rPr lang="de-CH" dirty="0" smtClean="0"/>
+              <a:t> </a:t>
+            </a:r>
+            <a:r>
+              <a:rPr lang="de-CH" dirty="0" err="1" smtClean="0"/>
+              <a:t>the</a:t>
+            </a:r>
+            <a:r>
+              <a:rPr lang="de-CH" dirty="0" smtClean="0"/>
+              <a:t> </a:t>
+            </a:r>
+            <a:r>
+              <a:rPr lang="de-CH" dirty="0" err="1" smtClean="0"/>
+              <a:t>other</a:t>
+            </a:r>
+            <a:r>
+              <a:rPr lang="de-CH" dirty="0" smtClean="0"/>
+              <a:t> </a:t>
+            </a:r>
+            <a:r>
+              <a:rPr lang="de-CH" dirty="0" err="1" smtClean="0"/>
+              <a:t>to</a:t>
+            </a:r>
+            <a:r>
+              <a:rPr lang="de-CH" dirty="0" smtClean="0"/>
+              <a:t> find </a:t>
+            </a:r>
+            <a:r>
+              <a:rPr lang="de-CH" dirty="0" err="1" smtClean="0"/>
+              <a:t>free</a:t>
+            </a:r>
+            <a:r>
+              <a:rPr lang="de-CH" dirty="0" smtClean="0"/>
+              <a:t> </a:t>
+            </a:r>
+            <a:r>
+              <a:rPr lang="de-CH" dirty="0" err="1" smtClean="0"/>
+              <a:t>passage</a:t>
+            </a:r>
+            <a:r>
+              <a:rPr lang="de-CH" dirty="0" smtClean="0"/>
+              <a:t>.</a:t>
+            </a:r>
+          </a:p>
+          <a:p>
+            <a:r>
+              <a:rPr lang="de-CH" dirty="0" smtClean="0"/>
+              <a:t>-</a:t>
+            </a:r>
+            <a:r>
+              <a:rPr lang="de-CH" dirty="0" err="1" smtClean="0"/>
+              <a:t>uses</a:t>
+            </a:r>
+            <a:r>
+              <a:rPr lang="de-CH" dirty="0" smtClean="0"/>
+              <a:t> TOF-</a:t>
+            </a:r>
+            <a:r>
+              <a:rPr lang="de-CH" dirty="0" err="1" smtClean="0"/>
+              <a:t>data</a:t>
+            </a:r>
+            <a:r>
+              <a:rPr lang="de-CH" dirty="0" smtClean="0"/>
+              <a:t> </a:t>
+            </a:r>
+            <a:r>
+              <a:rPr lang="de-CH" dirty="0" err="1" smtClean="0"/>
+              <a:t>to</a:t>
+            </a:r>
+            <a:r>
+              <a:rPr lang="de-CH" dirty="0" smtClean="0"/>
+              <a:t> find </a:t>
+            </a:r>
+            <a:r>
+              <a:rPr lang="de-CH" dirty="0" err="1" smtClean="0"/>
+              <a:t>bearing</a:t>
+            </a:r>
+            <a:r>
+              <a:rPr lang="de-CH" dirty="0" smtClean="0"/>
+              <a:t> </a:t>
+            </a:r>
+            <a:r>
+              <a:rPr lang="de-CH" dirty="0" err="1" smtClean="0"/>
+              <a:t>of</a:t>
+            </a:r>
+            <a:r>
+              <a:rPr lang="de-CH" dirty="0" smtClean="0"/>
+              <a:t> </a:t>
+            </a:r>
+            <a:r>
+              <a:rPr lang="de-CH" dirty="0" err="1" smtClean="0"/>
+              <a:t>free</a:t>
+            </a:r>
+            <a:r>
+              <a:rPr lang="de-CH" dirty="0" smtClean="0"/>
+              <a:t> </a:t>
+            </a:r>
+            <a:r>
+              <a:rPr lang="de-CH" dirty="0" err="1" smtClean="0"/>
+              <a:t>passage</a:t>
+            </a:r>
+            <a:endParaRPr lang="de-CH" dirty="0" smtClean="0"/>
+          </a:p>
+          <a:p>
+            <a:r>
+              <a:rPr lang="de-CH" dirty="0" smtClean="0"/>
+              <a:t>-</a:t>
+            </a:r>
+            <a:r>
+              <a:rPr lang="de-CH" dirty="0" err="1" smtClean="0"/>
+              <a:t>saves</a:t>
+            </a:r>
+            <a:r>
+              <a:rPr lang="de-CH" dirty="0" smtClean="0"/>
+              <a:t> 2 </a:t>
+            </a:r>
+            <a:r>
+              <a:rPr lang="de-CH" dirty="0" err="1" smtClean="0"/>
+              <a:t>direction</a:t>
+            </a:r>
+            <a:r>
+              <a:rPr lang="de-CH" dirty="0" smtClean="0"/>
+              <a:t>, </a:t>
+            </a:r>
+            <a:r>
+              <a:rPr lang="de-CH" dirty="0" err="1" smtClean="0"/>
+              <a:t>where</a:t>
+            </a:r>
+            <a:r>
+              <a:rPr lang="de-CH" dirty="0" smtClean="0"/>
+              <a:t> </a:t>
+            </a:r>
+            <a:r>
+              <a:rPr lang="de-CH" dirty="0" err="1" smtClean="0"/>
+              <a:t>the</a:t>
+            </a:r>
+            <a:r>
+              <a:rPr lang="de-CH" dirty="0" smtClean="0"/>
+              <a:t> </a:t>
+            </a:r>
+            <a:r>
+              <a:rPr lang="de-CH" dirty="0" err="1" smtClean="0"/>
+              <a:t>deteced</a:t>
+            </a:r>
+            <a:r>
+              <a:rPr lang="de-CH" dirty="0" smtClean="0"/>
+              <a:t> </a:t>
+            </a:r>
+            <a:r>
+              <a:rPr lang="de-CH" dirty="0" err="1" smtClean="0"/>
+              <a:t>distance</a:t>
+            </a:r>
+            <a:r>
+              <a:rPr lang="de-CH" dirty="0" smtClean="0"/>
+              <a:t> </a:t>
+            </a:r>
+            <a:r>
+              <a:rPr lang="de-CH" dirty="0" err="1" smtClean="0"/>
+              <a:t>change</a:t>
+            </a:r>
+            <a:r>
+              <a:rPr lang="de-CH" dirty="0" smtClean="0"/>
+              <a:t> abrupt </a:t>
+            </a:r>
+            <a:r>
+              <a:rPr lang="de-CH" dirty="0" err="1" smtClean="0"/>
+              <a:t>from</a:t>
+            </a:r>
+            <a:r>
+              <a:rPr lang="de-CH" dirty="0" smtClean="0"/>
+              <a:t> </a:t>
+            </a:r>
+            <a:r>
+              <a:rPr lang="de-CH" dirty="0" err="1" smtClean="0"/>
+              <a:t>short</a:t>
+            </a:r>
+            <a:r>
+              <a:rPr lang="de-CH" dirty="0" smtClean="0"/>
+              <a:t> </a:t>
+            </a:r>
+            <a:r>
+              <a:rPr lang="de-CH" dirty="0" err="1" smtClean="0"/>
+              <a:t>to</a:t>
+            </a:r>
+            <a:r>
+              <a:rPr lang="de-CH" dirty="0" smtClean="0"/>
+              <a:t> </a:t>
+            </a:r>
+            <a:r>
+              <a:rPr lang="de-CH" dirty="0" err="1" smtClean="0"/>
+              <a:t>long</a:t>
+            </a:r>
+            <a:r>
+              <a:rPr lang="de-CH" dirty="0" smtClean="0"/>
+              <a:t> </a:t>
+            </a:r>
+            <a:r>
+              <a:rPr lang="de-CH" dirty="0" err="1" smtClean="0"/>
+              <a:t>or</a:t>
+            </a:r>
+            <a:r>
+              <a:rPr lang="de-CH" dirty="0" smtClean="0"/>
+              <a:t> </a:t>
+            </a:r>
+            <a:r>
+              <a:rPr lang="de-CH" dirty="0" err="1" smtClean="0"/>
+              <a:t>long</a:t>
+            </a:r>
+            <a:r>
+              <a:rPr lang="de-CH" dirty="0" smtClean="0"/>
+              <a:t> </a:t>
+            </a:r>
+            <a:r>
+              <a:rPr lang="de-CH" dirty="0" err="1" smtClean="0"/>
+              <a:t>to</a:t>
+            </a:r>
+            <a:r>
+              <a:rPr lang="de-CH" dirty="0" smtClean="0"/>
+              <a:t> </a:t>
+            </a:r>
+            <a:r>
+              <a:rPr lang="de-CH" dirty="0" err="1" smtClean="0"/>
+              <a:t>short</a:t>
+            </a:r>
+            <a:endParaRPr lang="de-CH" dirty="0" smtClean="0"/>
+          </a:p>
+          <a:p>
+            <a:endParaRPr lang="de-CH" dirty="0" smtClean="0"/>
+          </a:p>
+        </p:txBody>
+      </p:sp>
+      <p:sp>
+        <p:nvSpPr>
+          <p:cNvPr id="6" name="Textfeld 5"/>
+          <p:cNvSpPr txBox="1"/>
+          <p:nvPr/>
+        </p:nvSpPr>
+        <p:spPr>
+          <a:xfrm>
+            <a:off x="556260" y="3451938"/>
+            <a:ext cx="4320540" cy="923330"/>
+          </a:xfrm>
+          <a:prstGeom prst="rect">
+            <a:avLst/>
+          </a:prstGeom>
+          <a:noFill/>
+          <a:ln>
+            <a:solidFill>
+              <a:schemeClr val="tx1"/>
+            </a:solidFill>
+          </a:ln>
+        </p:spPr>
+        <p:txBody>
+          <a:bodyPr wrap="square" rtlCol="0">
+            <a:spAutoFit/>
+          </a:bodyPr>
+          <a:lstStyle/>
+          <a:p>
+            <a:r>
+              <a:rPr lang="de-CH" dirty="0" err="1" smtClean="0"/>
+              <a:t>setScanningRange</a:t>
+            </a:r>
+            <a:r>
+              <a:rPr lang="de-CH" dirty="0" smtClean="0"/>
+              <a:t>:</a:t>
+            </a:r>
+          </a:p>
+          <a:p>
+            <a:r>
+              <a:rPr lang="de-CH" dirty="0" smtClean="0"/>
+              <a:t>-sets </a:t>
+            </a:r>
+            <a:r>
+              <a:rPr lang="de-CH" dirty="0" err="1" smtClean="0"/>
+              <a:t>start</a:t>
+            </a:r>
+            <a:r>
+              <a:rPr lang="de-CH" dirty="0" smtClean="0"/>
+              <a:t> </a:t>
+            </a:r>
+            <a:r>
+              <a:rPr lang="de-CH" dirty="0" err="1" smtClean="0"/>
+              <a:t>and</a:t>
+            </a:r>
+            <a:r>
+              <a:rPr lang="de-CH" dirty="0" smtClean="0"/>
+              <a:t> end </a:t>
+            </a:r>
+            <a:r>
+              <a:rPr lang="de-CH" dirty="0" err="1" smtClean="0"/>
+              <a:t>scanning</a:t>
+            </a:r>
+            <a:r>
+              <a:rPr lang="de-CH" dirty="0" smtClean="0"/>
+              <a:t> angle.</a:t>
+            </a:r>
+          </a:p>
+          <a:p>
+            <a:endParaRPr lang="de-CH" dirty="0" smtClean="0"/>
+          </a:p>
+        </p:txBody>
+      </p:sp>
+      <p:sp>
+        <p:nvSpPr>
+          <p:cNvPr id="7" name="Textfeld 6"/>
+          <p:cNvSpPr txBox="1"/>
+          <p:nvPr/>
+        </p:nvSpPr>
+        <p:spPr>
+          <a:xfrm>
+            <a:off x="556260" y="4497242"/>
+            <a:ext cx="4320540" cy="923330"/>
+          </a:xfrm>
+          <a:prstGeom prst="rect">
+            <a:avLst/>
+          </a:prstGeom>
+          <a:noFill/>
+          <a:ln>
+            <a:solidFill>
+              <a:schemeClr val="tx1"/>
+            </a:solidFill>
+          </a:ln>
+        </p:spPr>
+        <p:txBody>
+          <a:bodyPr wrap="square" rtlCol="0">
+            <a:spAutoFit/>
+          </a:bodyPr>
+          <a:lstStyle/>
+          <a:p>
+            <a:r>
+              <a:rPr lang="de-CH" dirty="0" err="1" smtClean="0"/>
+              <a:t>startScanning</a:t>
+            </a:r>
+            <a:endParaRPr lang="de-CH" dirty="0" smtClean="0"/>
+          </a:p>
+          <a:p>
+            <a:r>
+              <a:rPr lang="de-CH" dirty="0" smtClean="0"/>
+              <a:t>-starts </a:t>
+            </a:r>
+            <a:r>
+              <a:rPr lang="de-CH" dirty="0" err="1" smtClean="0"/>
+              <a:t>scanning</a:t>
+            </a:r>
+            <a:r>
+              <a:rPr lang="de-CH" dirty="0" smtClean="0"/>
+              <a:t> </a:t>
+            </a:r>
+            <a:r>
+              <a:rPr lang="de-CH" dirty="0" err="1" smtClean="0"/>
+              <a:t>movement</a:t>
+            </a:r>
+            <a:endParaRPr lang="de-CH" dirty="0" smtClean="0"/>
+          </a:p>
+          <a:p>
+            <a:endParaRPr lang="de-CH" dirty="0" smtClean="0"/>
+          </a:p>
+        </p:txBody>
+      </p:sp>
+      <p:sp>
+        <p:nvSpPr>
+          <p:cNvPr id="9" name="Textfeld 8"/>
+          <p:cNvSpPr txBox="1"/>
+          <p:nvPr/>
+        </p:nvSpPr>
+        <p:spPr>
+          <a:xfrm>
+            <a:off x="5347180" y="754380"/>
+            <a:ext cx="4320540" cy="923330"/>
+          </a:xfrm>
+          <a:prstGeom prst="rect">
+            <a:avLst/>
+          </a:prstGeom>
+          <a:noFill/>
+          <a:ln>
+            <a:solidFill>
+              <a:schemeClr val="tx1"/>
+            </a:solidFill>
+          </a:ln>
+        </p:spPr>
+        <p:txBody>
+          <a:bodyPr wrap="square" rtlCol="0">
+            <a:spAutoFit/>
+          </a:bodyPr>
+          <a:lstStyle/>
+          <a:p>
+            <a:r>
+              <a:rPr lang="de-CH" dirty="0" err="1" smtClean="0"/>
+              <a:t>getFreeBearings</a:t>
+            </a:r>
+            <a:endParaRPr lang="de-CH" dirty="0" smtClean="0"/>
+          </a:p>
+          <a:p>
+            <a:r>
+              <a:rPr lang="de-CH" dirty="0" smtClean="0"/>
+              <a:t>-</a:t>
+            </a:r>
+            <a:r>
+              <a:rPr lang="de-CH" dirty="0" err="1" smtClean="0"/>
+              <a:t>gets</a:t>
+            </a:r>
+            <a:r>
+              <a:rPr lang="de-CH" dirty="0" smtClean="0"/>
+              <a:t> all </a:t>
+            </a:r>
+            <a:r>
+              <a:rPr lang="de-CH" dirty="0" err="1" smtClean="0"/>
+              <a:t>free</a:t>
+            </a:r>
+            <a:r>
+              <a:rPr lang="de-CH" dirty="0" smtClean="0"/>
+              <a:t> </a:t>
+            </a:r>
+            <a:r>
+              <a:rPr lang="de-CH" dirty="0" err="1" smtClean="0"/>
+              <a:t>bearings</a:t>
+            </a:r>
+            <a:endParaRPr lang="de-CH" dirty="0" smtClean="0"/>
+          </a:p>
+          <a:p>
+            <a:endParaRPr lang="de-CH" dirty="0" smtClean="0"/>
+          </a:p>
+        </p:txBody>
+      </p:sp>
+    </p:spTree>
+    <p:extLst>
+      <p:ext uri="{BB962C8B-B14F-4D97-AF65-F5344CB8AC3E}">
+        <p14:creationId xmlns:p14="http://schemas.microsoft.com/office/powerpoint/2010/main" val="2508827211"/>
+      </p:ext>
+    </p:extLst>
+  </p:cSld>
+  <p:clrMapOvr>
+    <a:masterClrMapping/>
+  </p:clrMapOvr>
+</p:sld>
+</file>
+
+<file path=ppt/slides/slide6.xml><?xml version="1.0" encoding="utf-8"?>
+<p:sld xmlns:a="http://schemas.openxmlformats.org/drawingml/2006/main" xmlns:r="http://schemas.openxmlformats.org/officeDocument/2006/relationships" xmlns:p="http://schemas.openxmlformats.org/presentationml/2006/main">
+  <p:cSld>
+    <p:spTree>
+      <p:nvGrpSpPr>
+        <p:cNvPr id="1" name=""/>
+        <p:cNvGrpSpPr/>
+        <p:nvPr/>
+      </p:nvGrpSpPr>
+      <p:grpSpPr>
+        <a:xfrm>
+          <a:off x="0" y="0"/>
+          <a:ext cx="0" cy="0"/>
+          <a:chOff x="0" y="0"/>
+          <a:chExt cx="0" cy="0"/>
+        </a:xfrm>
+      </p:grpSpPr>
+      <p:sp>
+        <p:nvSpPr>
+          <p:cNvPr id="4" name="Titel 1"/>
+          <p:cNvSpPr>
+            <a:spLocks noGrp="1"/>
+          </p:cNvSpPr>
+          <p:nvPr>
+            <p:ph type="title"/>
+          </p:nvPr>
+        </p:nvSpPr>
+        <p:spPr>
+          <a:xfrm>
+            <a:off x="777240" y="800100"/>
+            <a:ext cx="10515600" cy="312420"/>
+          </a:xfrm>
+        </p:spPr>
+        <p:txBody>
+          <a:bodyPr>
+            <a:normAutofit fontScale="90000"/>
+          </a:bodyPr>
+          <a:lstStyle/>
+          <a:p>
+            <a:r>
+              <a:rPr lang="en-GB" sz="1800" b="1" dirty="0" smtClean="0"/>
+              <a:t>Main-Thread</a:t>
+            </a:r>
+            <a:endParaRPr lang="de-CH" sz="1800" dirty="0"/>
+          </a:p>
+        </p:txBody>
+      </p:sp>
+      <p:sp>
+        <p:nvSpPr>
+          <p:cNvPr id="5" name="Textfeld 4"/>
+          <p:cNvSpPr txBox="1"/>
+          <p:nvPr/>
+        </p:nvSpPr>
+        <p:spPr>
+          <a:xfrm>
+            <a:off x="777240" y="1112520"/>
+            <a:ext cx="4320540" cy="2585323"/>
+          </a:xfrm>
+          <a:prstGeom prst="rect">
+            <a:avLst/>
+          </a:prstGeom>
+          <a:noFill/>
+          <a:ln>
+            <a:solidFill>
+              <a:schemeClr val="tx1"/>
+            </a:solidFill>
+          </a:ln>
+        </p:spPr>
+        <p:txBody>
+          <a:bodyPr wrap="square" rtlCol="0">
+            <a:spAutoFit/>
+          </a:bodyPr>
+          <a:lstStyle/>
+          <a:p>
+            <a:r>
+              <a:rPr lang="de-CH" dirty="0" smtClean="0"/>
+              <a:t>Main-thread-</a:t>
+            </a:r>
+            <a:r>
+              <a:rPr lang="de-CH" dirty="0" err="1" smtClean="0"/>
+              <a:t>function</a:t>
+            </a:r>
+            <a:r>
+              <a:rPr lang="de-CH" dirty="0" smtClean="0"/>
+              <a:t>:</a:t>
+            </a:r>
+          </a:p>
+          <a:p>
+            <a:r>
+              <a:rPr lang="de-CH" dirty="0" smtClean="0"/>
+              <a:t>-</a:t>
+            </a:r>
+            <a:r>
+              <a:rPr lang="de-CH" dirty="0" err="1" smtClean="0"/>
+              <a:t>calculates</a:t>
+            </a:r>
+            <a:r>
+              <a:rPr lang="de-CH" dirty="0" smtClean="0"/>
+              <a:t> </a:t>
+            </a:r>
+            <a:r>
+              <a:rPr lang="de-CH" dirty="0" err="1" smtClean="0"/>
+              <a:t>direction</a:t>
+            </a:r>
+            <a:r>
+              <a:rPr lang="de-CH" dirty="0" smtClean="0"/>
+              <a:t> </a:t>
+            </a:r>
+            <a:r>
+              <a:rPr lang="de-CH" dirty="0" err="1" smtClean="0"/>
+              <a:t>of</a:t>
+            </a:r>
+            <a:r>
+              <a:rPr lang="de-CH" dirty="0" smtClean="0"/>
+              <a:t> </a:t>
+            </a:r>
+            <a:r>
+              <a:rPr lang="de-CH" dirty="0" err="1" smtClean="0"/>
+              <a:t>travel</a:t>
+            </a:r>
+            <a:r>
+              <a:rPr lang="de-CH" dirty="0" smtClean="0"/>
+              <a:t>.</a:t>
+            </a:r>
+          </a:p>
+          <a:p>
+            <a:r>
+              <a:rPr lang="de-CH" dirty="0" smtClean="0"/>
+              <a:t>-</a:t>
+            </a:r>
+            <a:r>
+              <a:rPr lang="de-CH" dirty="0" err="1" smtClean="0"/>
+              <a:t>fills</a:t>
+            </a:r>
+            <a:r>
+              <a:rPr lang="de-CH" dirty="0" smtClean="0"/>
+              <a:t> in </a:t>
+            </a:r>
+            <a:r>
+              <a:rPr lang="de-CH" dirty="0" err="1" smtClean="0"/>
+              <a:t>the</a:t>
+            </a:r>
+            <a:r>
+              <a:rPr lang="de-CH" dirty="0" smtClean="0"/>
+              <a:t> </a:t>
+            </a:r>
+            <a:r>
+              <a:rPr lang="de-CH" dirty="0" err="1" smtClean="0"/>
+              <a:t>structure</a:t>
+            </a:r>
+            <a:r>
+              <a:rPr lang="de-CH" dirty="0" smtClean="0"/>
+              <a:t> </a:t>
+            </a:r>
+            <a:r>
+              <a:rPr lang="de-CH" dirty="0" err="1" smtClean="0"/>
+              <a:t>where</a:t>
+            </a:r>
+            <a:r>
+              <a:rPr lang="de-CH" dirty="0" smtClean="0"/>
+              <a:t> </a:t>
+            </a:r>
+            <a:r>
+              <a:rPr lang="de-CH" dirty="0" err="1" smtClean="0"/>
+              <a:t>eventdata</a:t>
+            </a:r>
+            <a:r>
+              <a:rPr lang="de-CH" dirty="0" smtClean="0"/>
+              <a:t> </a:t>
+            </a:r>
+            <a:r>
+              <a:rPr lang="de-CH" dirty="0" err="1" smtClean="0"/>
+              <a:t>is</a:t>
+            </a:r>
+            <a:r>
+              <a:rPr lang="de-CH" dirty="0" smtClean="0"/>
+              <a:t> </a:t>
+            </a:r>
+            <a:r>
+              <a:rPr lang="de-CH" dirty="0" err="1" smtClean="0"/>
+              <a:t>saved</a:t>
+            </a:r>
+            <a:r>
+              <a:rPr lang="de-CH" dirty="0" smtClean="0"/>
+              <a:t>(</a:t>
+            </a:r>
+            <a:r>
+              <a:rPr lang="de-CH" dirty="0" err="1" smtClean="0"/>
+              <a:t>direction</a:t>
+            </a:r>
+            <a:r>
+              <a:rPr lang="de-CH" dirty="0" smtClean="0"/>
+              <a:t> </a:t>
+            </a:r>
+            <a:r>
+              <a:rPr lang="de-CH" dirty="0" err="1" smtClean="0"/>
+              <a:t>of</a:t>
+            </a:r>
+            <a:r>
+              <a:rPr lang="de-CH" dirty="0" smtClean="0"/>
+              <a:t> </a:t>
+            </a:r>
+            <a:r>
+              <a:rPr lang="de-CH" dirty="0" err="1" smtClean="0"/>
+              <a:t>obstacle</a:t>
+            </a:r>
+            <a:r>
+              <a:rPr lang="de-CH" dirty="0" smtClean="0"/>
+              <a:t>, </a:t>
+            </a:r>
+            <a:r>
+              <a:rPr lang="de-CH" dirty="0" err="1" smtClean="0"/>
+              <a:t>direction</a:t>
+            </a:r>
+            <a:r>
+              <a:rPr lang="de-CH" dirty="0" smtClean="0"/>
+              <a:t> </a:t>
+            </a:r>
+            <a:r>
+              <a:rPr lang="de-CH" dirty="0" err="1" smtClean="0"/>
+              <a:t>to</a:t>
+            </a:r>
+            <a:r>
+              <a:rPr lang="de-CH" dirty="0" smtClean="0"/>
+              <a:t> </a:t>
+            </a:r>
+            <a:r>
+              <a:rPr lang="de-CH" dirty="0" err="1" smtClean="0"/>
+              <a:t>travel</a:t>
+            </a:r>
+            <a:r>
+              <a:rPr lang="de-CH" dirty="0" smtClean="0"/>
+              <a:t>, </a:t>
+            </a:r>
+            <a:r>
+              <a:rPr lang="de-CH" dirty="0" err="1" smtClean="0"/>
+              <a:t>direction</a:t>
+            </a:r>
+            <a:r>
+              <a:rPr lang="de-CH" dirty="0" smtClean="0"/>
+              <a:t> </a:t>
+            </a:r>
+            <a:r>
+              <a:rPr lang="de-CH" dirty="0" err="1" smtClean="0"/>
+              <a:t>of</a:t>
+            </a:r>
+            <a:r>
+              <a:rPr lang="de-CH" dirty="0" smtClean="0"/>
+              <a:t> </a:t>
+            </a:r>
+            <a:r>
+              <a:rPr lang="de-CH" dirty="0" err="1" smtClean="0"/>
+              <a:t>sound,etc</a:t>
+            </a:r>
+            <a:r>
+              <a:rPr lang="de-CH" dirty="0" smtClean="0"/>
+              <a:t>.)</a:t>
+            </a:r>
+          </a:p>
+          <a:p>
+            <a:r>
+              <a:rPr lang="de-CH" dirty="0" smtClean="0"/>
+              <a:t>-</a:t>
+            </a:r>
+            <a:r>
+              <a:rPr lang="de-CH" dirty="0" err="1" smtClean="0"/>
+              <a:t>if</a:t>
+            </a:r>
+            <a:r>
+              <a:rPr lang="de-CH" dirty="0" smtClean="0"/>
+              <a:t> </a:t>
+            </a:r>
+            <a:r>
+              <a:rPr lang="de-CH" dirty="0" err="1" smtClean="0"/>
+              <a:t>event</a:t>
+            </a:r>
+            <a:r>
+              <a:rPr lang="de-CH" dirty="0" smtClean="0"/>
+              <a:t> </a:t>
+            </a:r>
+            <a:r>
+              <a:rPr lang="de-CH" dirty="0" err="1" smtClean="0"/>
+              <a:t>occurs</a:t>
+            </a:r>
+            <a:r>
+              <a:rPr lang="de-CH" dirty="0" smtClean="0"/>
+              <a:t> send </a:t>
+            </a:r>
+            <a:r>
+              <a:rPr lang="de-CH" dirty="0" err="1" smtClean="0"/>
+              <a:t>event</a:t>
+            </a:r>
+            <a:r>
+              <a:rPr lang="de-CH" dirty="0" smtClean="0"/>
+              <a:t> </a:t>
+            </a:r>
+            <a:r>
+              <a:rPr lang="de-CH" dirty="0" err="1" smtClean="0"/>
+              <a:t>data</a:t>
+            </a:r>
+            <a:r>
+              <a:rPr lang="de-CH" dirty="0" smtClean="0"/>
+              <a:t> </a:t>
+            </a:r>
+            <a:r>
+              <a:rPr lang="de-CH" dirty="0" err="1" smtClean="0"/>
+              <a:t>to</a:t>
+            </a:r>
+            <a:r>
+              <a:rPr lang="de-CH" dirty="0" smtClean="0"/>
+              <a:t> </a:t>
+            </a:r>
+            <a:r>
+              <a:rPr lang="de-CH" dirty="0" err="1" smtClean="0"/>
+              <a:t>computer</a:t>
+            </a:r>
+            <a:r>
+              <a:rPr lang="de-CH" dirty="0" smtClean="0"/>
+              <a:t>.</a:t>
+            </a:r>
+            <a:endParaRPr lang="de-CH" dirty="0" smtClean="0"/>
+          </a:p>
+          <a:p>
+            <a:r>
+              <a:rPr lang="de-CH" dirty="0" smtClean="0"/>
+              <a:t>-</a:t>
+            </a:r>
+            <a:r>
+              <a:rPr lang="de-CH" dirty="0" err="1" smtClean="0"/>
+              <a:t>uses</a:t>
+            </a:r>
+            <a:r>
+              <a:rPr lang="de-CH" dirty="0" smtClean="0"/>
+              <a:t> </a:t>
+            </a:r>
+            <a:r>
+              <a:rPr lang="de-CH" dirty="0" err="1" smtClean="0"/>
+              <a:t>sound</a:t>
+            </a:r>
+            <a:r>
+              <a:rPr lang="de-CH" dirty="0" smtClean="0"/>
+              <a:t> </a:t>
+            </a:r>
+            <a:r>
+              <a:rPr lang="de-CH" dirty="0" err="1" smtClean="0"/>
+              <a:t>level</a:t>
+            </a:r>
+            <a:r>
+              <a:rPr lang="de-CH" dirty="0" smtClean="0"/>
+              <a:t> </a:t>
+            </a:r>
+            <a:r>
+              <a:rPr lang="de-CH" dirty="0" err="1" smtClean="0"/>
+              <a:t>to</a:t>
+            </a:r>
+            <a:r>
+              <a:rPr lang="de-CH" dirty="0" smtClean="0"/>
+              <a:t> </a:t>
+            </a:r>
+            <a:r>
+              <a:rPr lang="de-CH" dirty="0" err="1" smtClean="0"/>
+              <a:t>decide</a:t>
+            </a:r>
+            <a:r>
+              <a:rPr lang="de-CH" dirty="0" smtClean="0"/>
+              <a:t> </a:t>
+            </a:r>
+            <a:r>
+              <a:rPr lang="de-CH" dirty="0" err="1" smtClean="0"/>
+              <a:t>if</a:t>
+            </a:r>
+            <a:r>
+              <a:rPr lang="de-CH" dirty="0" smtClean="0"/>
+              <a:t> </a:t>
+            </a:r>
+            <a:r>
+              <a:rPr lang="de-CH" dirty="0" err="1" smtClean="0"/>
+              <a:t>near</a:t>
+            </a:r>
+            <a:r>
+              <a:rPr lang="de-CH" dirty="0" smtClean="0"/>
+              <a:t> </a:t>
+            </a:r>
+            <a:r>
+              <a:rPr lang="de-CH" dirty="0" err="1" smtClean="0"/>
+              <a:t>soundsource</a:t>
+            </a:r>
+            <a:r>
+              <a:rPr lang="de-CH" dirty="0" smtClean="0"/>
+              <a:t> </a:t>
+            </a:r>
+            <a:r>
+              <a:rPr lang="de-CH" dirty="0" err="1" smtClean="0"/>
+              <a:t>or</a:t>
+            </a:r>
+            <a:r>
+              <a:rPr lang="de-CH" dirty="0" smtClean="0"/>
+              <a:t> not</a:t>
+            </a:r>
+            <a:endParaRPr lang="de-CH" dirty="0"/>
+          </a:p>
+        </p:txBody>
+      </p:sp>
+      <p:sp>
+        <p:nvSpPr>
+          <p:cNvPr id="6" name="Textfeld 5"/>
+          <p:cNvSpPr txBox="1"/>
+          <p:nvPr/>
+        </p:nvSpPr>
+        <p:spPr>
+          <a:xfrm>
+            <a:off x="777240" y="3764280"/>
+            <a:ext cx="4320540" cy="646331"/>
+          </a:xfrm>
+          <a:prstGeom prst="rect">
+            <a:avLst/>
+          </a:prstGeom>
+          <a:noFill/>
+          <a:ln>
+            <a:solidFill>
+              <a:schemeClr val="tx1"/>
+            </a:solidFill>
+          </a:ln>
+        </p:spPr>
+        <p:txBody>
+          <a:bodyPr wrap="square" rtlCol="0">
+            <a:spAutoFit/>
+          </a:bodyPr>
+          <a:lstStyle/>
+          <a:p>
+            <a:r>
+              <a:rPr lang="de-CH" smtClean="0"/>
+              <a:t>sendDataToComupter</a:t>
+            </a:r>
+          </a:p>
+          <a:p>
+            <a:r>
+              <a:rPr lang="de-CH" smtClean="0"/>
+              <a:t>-send to comupter in specified format.</a:t>
+            </a:r>
+            <a:endParaRPr lang="de-CH" dirty="0"/>
+          </a:p>
+        </p:txBody>
+      </p:sp>
+    </p:spTree>
+    <p:extLst>
+      <p:ext uri="{BB962C8B-B14F-4D97-AF65-F5344CB8AC3E}">
+        <p14:creationId xmlns:p14="http://schemas.microsoft.com/office/powerpoint/2010/main" val="3814045719"/>
       </p:ext>
     </p:extLst>
   </p:cSld>

</xml_diff>

<commit_message>
added short describtion of what to send over bluetooth
</commit_message>
<xml_diff>
--- a/ProjectDescribtions/MicroinformaticProgrammDescribtion.pptx
+++ b/ProjectDescribtions/MicroinformaticProgrammDescribtion.pptx
@@ -248,7 +248,7 @@
           <a:p>
             <a:fld id="{4B81FC2C-06AA-4CA1-9EDF-0E3D25B84E21}" type="datetimeFigureOut">
               <a:rPr lang="de-CH" smtClean="0"/>
-              <a:t>23.04.2020</a:t>
+              <a:t>01.05.2020</a:t>
             </a:fld>
             <a:endParaRPr lang="de-CH"/>
           </a:p>
@@ -418,7 +418,7 @@
           <a:p>
             <a:fld id="{4B81FC2C-06AA-4CA1-9EDF-0E3D25B84E21}" type="datetimeFigureOut">
               <a:rPr lang="de-CH" smtClean="0"/>
-              <a:t>23.04.2020</a:t>
+              <a:t>01.05.2020</a:t>
             </a:fld>
             <a:endParaRPr lang="de-CH"/>
           </a:p>
@@ -598,7 +598,7 @@
           <a:p>
             <a:fld id="{4B81FC2C-06AA-4CA1-9EDF-0E3D25B84E21}" type="datetimeFigureOut">
               <a:rPr lang="de-CH" smtClean="0"/>
-              <a:t>23.04.2020</a:t>
+              <a:t>01.05.2020</a:t>
             </a:fld>
             <a:endParaRPr lang="de-CH"/>
           </a:p>
@@ -768,7 +768,7 @@
           <a:p>
             <a:fld id="{4B81FC2C-06AA-4CA1-9EDF-0E3D25B84E21}" type="datetimeFigureOut">
               <a:rPr lang="de-CH" smtClean="0"/>
-              <a:t>23.04.2020</a:t>
+              <a:t>01.05.2020</a:t>
             </a:fld>
             <a:endParaRPr lang="de-CH"/>
           </a:p>
@@ -1014,7 +1014,7 @@
           <a:p>
             <a:fld id="{4B81FC2C-06AA-4CA1-9EDF-0E3D25B84E21}" type="datetimeFigureOut">
               <a:rPr lang="de-CH" smtClean="0"/>
-              <a:t>23.04.2020</a:t>
+              <a:t>01.05.2020</a:t>
             </a:fld>
             <a:endParaRPr lang="de-CH"/>
           </a:p>
@@ -1246,7 +1246,7 @@
           <a:p>
             <a:fld id="{4B81FC2C-06AA-4CA1-9EDF-0E3D25B84E21}" type="datetimeFigureOut">
               <a:rPr lang="de-CH" smtClean="0"/>
-              <a:t>23.04.2020</a:t>
+              <a:t>01.05.2020</a:t>
             </a:fld>
             <a:endParaRPr lang="de-CH"/>
           </a:p>
@@ -1613,7 +1613,7 @@
           <a:p>
             <a:fld id="{4B81FC2C-06AA-4CA1-9EDF-0E3D25B84E21}" type="datetimeFigureOut">
               <a:rPr lang="de-CH" smtClean="0"/>
-              <a:t>23.04.2020</a:t>
+              <a:t>01.05.2020</a:t>
             </a:fld>
             <a:endParaRPr lang="de-CH"/>
           </a:p>
@@ -1731,7 +1731,7 @@
           <a:p>
             <a:fld id="{4B81FC2C-06AA-4CA1-9EDF-0E3D25B84E21}" type="datetimeFigureOut">
               <a:rPr lang="de-CH" smtClean="0"/>
-              <a:t>23.04.2020</a:t>
+              <a:t>01.05.2020</a:t>
             </a:fld>
             <a:endParaRPr lang="de-CH"/>
           </a:p>
@@ -1826,7 +1826,7 @@
           <a:p>
             <a:fld id="{4B81FC2C-06AA-4CA1-9EDF-0E3D25B84E21}" type="datetimeFigureOut">
               <a:rPr lang="de-CH" smtClean="0"/>
-              <a:t>23.04.2020</a:t>
+              <a:t>01.05.2020</a:t>
             </a:fld>
             <a:endParaRPr lang="de-CH"/>
           </a:p>
@@ -2103,7 +2103,7 @@
           <a:p>
             <a:fld id="{4B81FC2C-06AA-4CA1-9EDF-0E3D25B84E21}" type="datetimeFigureOut">
               <a:rPr lang="de-CH" smtClean="0"/>
-              <a:t>23.04.2020</a:t>
+              <a:t>01.05.2020</a:t>
             </a:fld>
             <a:endParaRPr lang="de-CH"/>
           </a:p>
@@ -2356,7 +2356,7 @@
           <a:p>
             <a:fld id="{4B81FC2C-06AA-4CA1-9EDF-0E3D25B84E21}" type="datetimeFigureOut">
               <a:rPr lang="de-CH" smtClean="0"/>
-              <a:t>23.04.2020</a:t>
+              <a:t>01.05.2020</a:t>
             </a:fld>
             <a:endParaRPr lang="de-CH"/>
           </a:p>
@@ -2569,7 +2569,7 @@
           <a:p>
             <a:fld id="{4B81FC2C-06AA-4CA1-9EDF-0E3D25B84E21}" type="datetimeFigureOut">
               <a:rPr lang="de-CH" smtClean="0"/>
-              <a:t>23.04.2020</a:t>
+              <a:t>01.05.2020</a:t>
             </a:fld>
             <a:endParaRPr lang="de-CH"/>
           </a:p>
@@ -4843,11 +4843,7 @@
           <a:p>
             <a:r>
               <a:rPr lang="en-GB" sz="600" dirty="0" smtClean="0"/>
-              <a:t>Relative direction of the </a:t>
-            </a:r>
-            <a:r>
-              <a:rPr lang="en-GB" sz="600" dirty="0" smtClean="0"/>
-              <a:t>sound and </a:t>
+              <a:t>Relative direction of the sound and </a:t>
             </a:r>
             <a:r>
               <a:rPr lang="en-GB" sz="600" dirty="0" err="1" smtClean="0"/>
@@ -5196,11 +5192,7 @@
           <a:p>
             <a:r>
               <a:rPr lang="en-GB" sz="600" dirty="0" smtClean="0"/>
-              <a:t>Gives 2 </a:t>
-            </a:r>
-            <a:r>
-              <a:rPr lang="en-GB" sz="600" dirty="0" smtClean="0"/>
-              <a:t>bearings of the direction  where no obstacle is present. </a:t>
+              <a:t>Gives 2 bearings of the direction  where no obstacle is present. </a:t>
             </a:r>
             <a:endParaRPr lang="en-GB" sz="600" dirty="0"/>
           </a:p>
@@ -5770,7 +5762,7 @@
         </p:nvSpPr>
         <p:spPr>
           <a:xfrm>
-            <a:off x="6301740" y="940475"/>
+            <a:off x="6301740" y="966550"/>
             <a:ext cx="4732020" cy="1754326"/>
           </a:xfrm>
           <a:prstGeom prst="rect">
@@ -5831,7 +5823,7 @@
         </p:nvSpPr>
         <p:spPr>
           <a:xfrm>
-            <a:off x="6301740" y="2979955"/>
+            <a:off x="6301740" y="3525798"/>
             <a:ext cx="4732020" cy="1200329"/>
           </a:xfrm>
           <a:prstGeom prst="rect">
@@ -8018,7 +8010,7 @@
             </a:r>
             <a:r>
               <a:rPr lang="de-CH" dirty="0" err="1" smtClean="0"/>
-              <a:t>deteced</a:t>
+              <a:t>detected</a:t>
             </a:r>
             <a:r>
               <a:rPr lang="de-CH" dirty="0" smtClean="0"/>
@@ -8209,7 +8201,10 @@
               <a:rPr lang="de-CH" dirty="0" err="1" smtClean="0"/>
               <a:t>startScanning</a:t>
             </a:r>
-            <a:endParaRPr lang="de-CH" dirty="0" smtClean="0"/>
+            <a:r>
+              <a:rPr lang="de-CH" dirty="0" smtClean="0"/>
+              <a:t>:</a:t>
+            </a:r>
           </a:p>
           <a:p>
             <a:r>
@@ -8633,7 +8628,6 @@
               <a:rPr lang="de-CH" dirty="0" smtClean="0"/>
               <a:t>.</a:t>
             </a:r>
-            <a:endParaRPr lang="de-CH" dirty="0" smtClean="0"/>
           </a:p>
           <a:p>
             <a:r>
@@ -8744,15 +8738,203 @@
           <a:lstStyle/>
           <a:p>
             <a:r>
-              <a:rPr lang="de-CH" smtClean="0"/>
+              <a:rPr lang="de-CH" dirty="0" err="1" smtClean="0"/>
               <a:t>sendDataToComupter</a:t>
             </a:r>
-          </a:p>
-          <a:p>
-            <a:r>
-              <a:rPr lang="de-CH" smtClean="0"/>
-              <a:t>-send to comupter in specified format.</a:t>
-            </a:r>
+            <a:endParaRPr lang="de-CH" dirty="0" smtClean="0"/>
+          </a:p>
+          <a:p>
+            <a:r>
+              <a:rPr lang="de-CH" dirty="0" smtClean="0"/>
+              <a:t>-send </a:t>
+            </a:r>
+            <a:r>
+              <a:rPr lang="de-CH" dirty="0" err="1" smtClean="0"/>
+              <a:t>to</a:t>
+            </a:r>
+            <a:r>
+              <a:rPr lang="de-CH" dirty="0" smtClean="0"/>
+              <a:t> </a:t>
+            </a:r>
+            <a:r>
+              <a:rPr lang="de-CH" dirty="0" err="1" smtClean="0"/>
+              <a:t>comupter</a:t>
+            </a:r>
+            <a:r>
+              <a:rPr lang="de-CH" dirty="0" smtClean="0"/>
+              <a:t> in </a:t>
+            </a:r>
+            <a:r>
+              <a:rPr lang="de-CH" dirty="0" err="1" smtClean="0"/>
+              <a:t>specified</a:t>
+            </a:r>
+            <a:r>
+              <a:rPr lang="de-CH" dirty="0" smtClean="0"/>
+              <a:t> </a:t>
+            </a:r>
+            <a:r>
+              <a:rPr lang="de-CH" dirty="0" err="1" smtClean="0"/>
+              <a:t>format</a:t>
+            </a:r>
+            <a:r>
+              <a:rPr lang="de-CH" dirty="0" smtClean="0"/>
+              <a:t>.</a:t>
+            </a:r>
+            <a:endParaRPr lang="de-CH" dirty="0"/>
+          </a:p>
+        </p:txBody>
+      </p:sp>
+      <p:sp>
+        <p:nvSpPr>
+          <p:cNvPr id="2" name="Textfeld 1"/>
+          <p:cNvSpPr txBox="1"/>
+          <p:nvPr/>
+        </p:nvSpPr>
+        <p:spPr>
+          <a:xfrm>
+            <a:off x="723900" y="4477048"/>
+            <a:ext cx="4686300" cy="1754326"/>
+          </a:xfrm>
+          <a:prstGeom prst="rect">
+            <a:avLst/>
+          </a:prstGeom>
+          <a:noFill/>
+        </p:spPr>
+        <p:txBody>
+          <a:bodyPr wrap="square" rtlCol="0">
+            <a:spAutoFit/>
+          </a:bodyPr>
+          <a:lstStyle/>
+          <a:p>
+            <a:r>
+              <a:rPr lang="de-CH" dirty="0" err="1" smtClean="0"/>
+              <a:t>What</a:t>
+            </a:r>
+            <a:r>
+              <a:rPr lang="de-CH" dirty="0" smtClean="0"/>
+              <a:t> </a:t>
+            </a:r>
+            <a:r>
+              <a:rPr lang="de-CH" dirty="0" err="1" smtClean="0"/>
+              <a:t>to</a:t>
+            </a:r>
+            <a:r>
+              <a:rPr lang="de-CH" dirty="0" smtClean="0"/>
+              <a:t> send:</a:t>
+            </a:r>
+          </a:p>
+          <a:p>
+            <a:r>
+              <a:rPr lang="de-CH" dirty="0" smtClean="0"/>
+              <a:t>-</a:t>
+            </a:r>
+            <a:r>
+              <a:rPr lang="de-CH" dirty="0" err="1" smtClean="0"/>
+              <a:t>x,y</a:t>
+            </a:r>
+            <a:r>
+              <a:rPr lang="de-CH" dirty="0" smtClean="0"/>
+              <a:t>-Position</a:t>
+            </a:r>
+          </a:p>
+          <a:p>
+            <a:r>
+              <a:rPr lang="de-CH" dirty="0" smtClean="0"/>
+              <a:t>-</a:t>
+            </a:r>
+            <a:r>
+              <a:rPr lang="de-CH" dirty="0" err="1" smtClean="0"/>
+              <a:t>sounddirection</a:t>
+            </a:r>
+            <a:endParaRPr lang="de-CH" dirty="0" smtClean="0"/>
+          </a:p>
+          <a:p>
+            <a:r>
+              <a:rPr lang="de-CH" dirty="0" smtClean="0"/>
+              <a:t>-</a:t>
+            </a:r>
+            <a:r>
+              <a:rPr lang="de-CH" dirty="0" err="1" smtClean="0"/>
+              <a:t>direction</a:t>
+            </a:r>
+            <a:r>
+              <a:rPr lang="de-CH" dirty="0" smtClean="0"/>
+              <a:t> in </a:t>
+            </a:r>
+            <a:r>
+              <a:rPr lang="de-CH" dirty="0" err="1" smtClean="0"/>
+              <a:t>which</a:t>
+            </a:r>
+            <a:r>
+              <a:rPr lang="de-CH" dirty="0" smtClean="0"/>
+              <a:t> </a:t>
+            </a:r>
+            <a:r>
+              <a:rPr lang="de-CH" dirty="0" err="1" smtClean="0"/>
+              <a:t>te</a:t>
+            </a:r>
+            <a:r>
+              <a:rPr lang="de-CH" dirty="0" smtClean="0"/>
+              <a:t> </a:t>
+            </a:r>
+            <a:r>
+              <a:rPr lang="de-CH" dirty="0" err="1" smtClean="0"/>
+              <a:t>robot</a:t>
+            </a:r>
+            <a:r>
+              <a:rPr lang="de-CH" dirty="0" smtClean="0"/>
+              <a:t> </a:t>
+            </a:r>
+            <a:r>
+              <a:rPr lang="de-CH" dirty="0" err="1" smtClean="0"/>
+              <a:t>wants</a:t>
+            </a:r>
+            <a:r>
+              <a:rPr lang="de-CH" dirty="0" smtClean="0"/>
+              <a:t> </a:t>
+            </a:r>
+            <a:r>
+              <a:rPr lang="de-CH" dirty="0" err="1" smtClean="0"/>
+              <a:t>to</a:t>
+            </a:r>
+            <a:r>
+              <a:rPr lang="de-CH" dirty="0" smtClean="0"/>
+              <a:t> </a:t>
+            </a:r>
+            <a:r>
+              <a:rPr lang="de-CH" dirty="0" err="1" smtClean="0"/>
+              <a:t>travel</a:t>
+            </a:r>
+            <a:r>
+              <a:rPr lang="de-CH" dirty="0" smtClean="0"/>
+              <a:t> </a:t>
+            </a:r>
+            <a:r>
+              <a:rPr lang="de-CH" dirty="0" err="1" smtClean="0"/>
+              <a:t>next</a:t>
+            </a:r>
+            <a:endParaRPr lang="de-CH" dirty="0" smtClean="0"/>
+          </a:p>
+          <a:p>
+            <a:r>
+              <a:rPr lang="de-CH" dirty="0" smtClean="0"/>
+              <a:t>-</a:t>
+            </a:r>
+            <a:r>
+              <a:rPr lang="de-CH" dirty="0" err="1" smtClean="0"/>
+              <a:t>obstacle</a:t>
+            </a:r>
+            <a:r>
+              <a:rPr lang="de-CH" dirty="0" smtClean="0"/>
+              <a:t> </a:t>
+            </a:r>
+            <a:r>
+              <a:rPr lang="de-CH" dirty="0" err="1" smtClean="0"/>
+              <a:t>direction</a:t>
+            </a:r>
+            <a:endParaRPr lang="de-CH" dirty="0" smtClean="0"/>
+          </a:p>
+          <a:p>
             <a:endParaRPr lang="de-CH" dirty="0"/>
           </a:p>
         </p:txBody>

</xml_diff>